<commit_message>
Reupload of end files
</commit_message>
<xml_diff>
--- a/Group_16_Presentation.pptx
+++ b/Group_16_Presentation.pptx
@@ -1,34 +1,41 @@
 
 <file path=ppt/presentation.xml><?xml version="1.0" encoding="utf-8"?>
-<p:presentation xmlns:a="http://schemas.openxmlformats.org/drawingml/2006/main" xmlns:r="http://schemas.openxmlformats.org/officeDocument/2006/relationships" xmlns:mc="http://schemas.openxmlformats.org/markup-compatibility/2006" xmlns:mv="urn:schemas-microsoft-com:mac:vml" xmlns:p="http://schemas.openxmlformats.org/presentationml/2006/main" xmlns:c="http://schemas.openxmlformats.org/drawingml/2006/chart" xmlns:dgm="http://schemas.openxmlformats.org/drawingml/2006/diagram" xmlns:o="urn:schemas-microsoft-com:office:office" xmlns:v="urn:schemas-microsoft-com:vml" xmlns:pvml="urn:schemas-microsoft-com:office:powerpoint" xmlns:com="http://schemas.openxmlformats.org/drawingml/2006/compatibility" xmlns:p14="http://schemas.microsoft.com/office/powerpoint/2010/main" autoCompressPictures="0" embedTrueTypeFonts="1" strictFirstAndLastChars="0" saveSubsetFonts="1">
+<p:presentation xmlns:a="http://schemas.openxmlformats.org/drawingml/2006/main" xmlns:r="http://schemas.openxmlformats.org/officeDocument/2006/relationships" xmlns:p="http://schemas.openxmlformats.org/presentationml/2006/main" strictFirstAndLastChars="0" embedTrueTypeFonts="1" saveSubsetFonts="1" autoCompressPictures="0">
   <p:sldMasterIdLst>
-    <p:sldMasterId id="2147483659" r:id="rId3"/>
+    <p:sldMasterId id="2147483659" r:id="rId1"/>
   </p:sldMasterIdLst>
   <p:notesMasterIdLst>
-    <p:notesMasterId r:id="rId4"/>
+    <p:notesMasterId r:id="rId11"/>
   </p:notesMasterIdLst>
   <p:sldIdLst>
-    <p:sldId id="256" r:id="rId5"/>
-    <p:sldId id="257" r:id="rId6"/>
-    <p:sldId id="258" r:id="rId7"/>
-    <p:sldId id="259" r:id="rId8"/>
-    <p:sldId id="260" r:id="rId9"/>
-    <p:sldId id="261" r:id="rId10"/>
-    <p:sldId id="262" r:id="rId11"/>
-    <p:sldId id="263" r:id="rId12"/>
-    <p:sldId id="264" r:id="rId13"/>
+    <p:sldId id="256" r:id="rId2"/>
+    <p:sldId id="257" r:id="rId3"/>
+    <p:sldId id="258" r:id="rId4"/>
+    <p:sldId id="259" r:id="rId5"/>
+    <p:sldId id="260" r:id="rId6"/>
+    <p:sldId id="261" r:id="rId7"/>
+    <p:sldId id="262" r:id="rId8"/>
+    <p:sldId id="263" r:id="rId9"/>
+    <p:sldId id="264" r:id="rId10"/>
   </p:sldIdLst>
-  <p:sldSz cy="5143500" cx="9144000"/>
+  <p:sldSz cx="9144000" cy="5143500" type="screen16x9"/>
   <p:notesSz cx="6858000" cy="9144000"/>
   <p:embeddedFontLst>
     <p:embeddedFont>
-      <p:font typeface="Muli"/>
-      <p:regular r:id="rId14"/>
-      <p:italic r:id="rId15"/>
+      <p:font typeface="Georgia" panose="02040502050405020303" pitchFamily="18" charset="0"/>
+      <p:regular r:id="rId12"/>
+      <p:bold r:id="rId13"/>
+      <p:italic r:id="rId14"/>
+      <p:boldItalic r:id="rId15"/>
+    </p:embeddedFont>
+    <p:embeddedFont>
+      <p:font typeface="Muli" panose="020B0604020202020204" charset="0"/>
+      <p:regular r:id="rId16"/>
+      <p:italic r:id="rId17"/>
     </p:embeddedFont>
   </p:embeddedFontLst>
   <p:defaultTextStyle>
-    <a:defPPr lvl="0" marR="0" rtl="0" algn="l">
+    <a:defPPr marR="0" lvl="0" algn="l" rtl="0">
       <a:lnSpc>
         <a:spcPct val="100000"/>
       </a:lnSpc>
@@ -39,7 +46,7 @@
         <a:spcPts val="0"/>
       </a:spcAft>
     </a:defPPr>
-    <a:lvl1pPr lvl="0" marR="0" rtl="0" algn="l">
+    <a:lvl1pPr marR="0" lvl="0" algn="l" rtl="0">
       <a:lnSpc>
         <a:spcPct val="100000"/>
       </a:lnSpc>
@@ -50,7 +57,7 @@
         <a:spcPts val="0"/>
       </a:spcAft>
       <a:buNone/>
-      <a:defRPr b="0" i="0" sz="1400" u="none" cap="none" strike="noStrike">
+      <a:defRPr sz="1400" b="0" i="0" u="none" strike="noStrike" cap="none">
         <a:solidFill>
           <a:srgbClr val="000000"/>
         </a:solidFill>
@@ -60,7 +67,7 @@
         <a:sym typeface="Arial"/>
       </a:defRPr>
     </a:lvl1pPr>
-    <a:lvl2pPr lvl="1" marR="0" rtl="0" algn="l">
+    <a:lvl2pPr marR="0" lvl="1" algn="l" rtl="0">
       <a:lnSpc>
         <a:spcPct val="100000"/>
       </a:lnSpc>
@@ -71,7 +78,7 @@
         <a:spcPts val="0"/>
       </a:spcAft>
       <a:buNone/>
-      <a:defRPr b="0" i="0" sz="1400" u="none" cap="none" strike="noStrike">
+      <a:defRPr sz="1400" b="0" i="0" u="none" strike="noStrike" cap="none">
         <a:solidFill>
           <a:srgbClr val="000000"/>
         </a:solidFill>
@@ -81,7 +88,7 @@
         <a:sym typeface="Arial"/>
       </a:defRPr>
     </a:lvl2pPr>
-    <a:lvl3pPr lvl="2" marR="0" rtl="0" algn="l">
+    <a:lvl3pPr marR="0" lvl="2" algn="l" rtl="0">
       <a:lnSpc>
         <a:spcPct val="100000"/>
       </a:lnSpc>
@@ -92,7 +99,7 @@
         <a:spcPts val="0"/>
       </a:spcAft>
       <a:buNone/>
-      <a:defRPr b="0" i="0" sz="1400" u="none" cap="none" strike="noStrike">
+      <a:defRPr sz="1400" b="0" i="0" u="none" strike="noStrike" cap="none">
         <a:solidFill>
           <a:srgbClr val="000000"/>
         </a:solidFill>
@@ -102,7 +109,7 @@
         <a:sym typeface="Arial"/>
       </a:defRPr>
     </a:lvl3pPr>
-    <a:lvl4pPr lvl="3" marR="0" rtl="0" algn="l">
+    <a:lvl4pPr marR="0" lvl="3" algn="l" rtl="0">
       <a:lnSpc>
         <a:spcPct val="100000"/>
       </a:lnSpc>
@@ -113,7 +120,7 @@
         <a:spcPts val="0"/>
       </a:spcAft>
       <a:buNone/>
-      <a:defRPr b="0" i="0" sz="1400" u="none" cap="none" strike="noStrike">
+      <a:defRPr sz="1400" b="0" i="0" u="none" strike="noStrike" cap="none">
         <a:solidFill>
           <a:srgbClr val="000000"/>
         </a:solidFill>
@@ -123,7 +130,7 @@
         <a:sym typeface="Arial"/>
       </a:defRPr>
     </a:lvl4pPr>
-    <a:lvl5pPr lvl="4" marR="0" rtl="0" algn="l">
+    <a:lvl5pPr marR="0" lvl="4" algn="l" rtl="0">
       <a:lnSpc>
         <a:spcPct val="100000"/>
       </a:lnSpc>
@@ -134,7 +141,7 @@
         <a:spcPts val="0"/>
       </a:spcAft>
       <a:buNone/>
-      <a:defRPr b="0" i="0" sz="1400" u="none" cap="none" strike="noStrike">
+      <a:defRPr sz="1400" b="0" i="0" u="none" strike="noStrike" cap="none">
         <a:solidFill>
           <a:srgbClr val="000000"/>
         </a:solidFill>
@@ -144,7 +151,7 @@
         <a:sym typeface="Arial"/>
       </a:defRPr>
     </a:lvl5pPr>
-    <a:lvl6pPr lvl="5" marR="0" rtl="0" algn="l">
+    <a:lvl6pPr marR="0" lvl="5" algn="l" rtl="0">
       <a:lnSpc>
         <a:spcPct val="100000"/>
       </a:lnSpc>
@@ -155,7 +162,7 @@
         <a:spcPts val="0"/>
       </a:spcAft>
       <a:buNone/>
-      <a:defRPr b="0" i="0" sz="1400" u="none" cap="none" strike="noStrike">
+      <a:defRPr sz="1400" b="0" i="0" u="none" strike="noStrike" cap="none">
         <a:solidFill>
           <a:srgbClr val="000000"/>
         </a:solidFill>
@@ -165,7 +172,7 @@
         <a:sym typeface="Arial"/>
       </a:defRPr>
     </a:lvl6pPr>
-    <a:lvl7pPr lvl="6" marR="0" rtl="0" algn="l">
+    <a:lvl7pPr marR="0" lvl="6" algn="l" rtl="0">
       <a:lnSpc>
         <a:spcPct val="100000"/>
       </a:lnSpc>
@@ -176,7 +183,7 @@
         <a:spcPts val="0"/>
       </a:spcAft>
       <a:buNone/>
-      <a:defRPr b="0" i="0" sz="1400" u="none" cap="none" strike="noStrike">
+      <a:defRPr sz="1400" b="0" i="0" u="none" strike="noStrike" cap="none">
         <a:solidFill>
           <a:srgbClr val="000000"/>
         </a:solidFill>
@@ -186,7 +193,7 @@
         <a:sym typeface="Arial"/>
       </a:defRPr>
     </a:lvl7pPr>
-    <a:lvl8pPr lvl="7" marR="0" rtl="0" algn="l">
+    <a:lvl8pPr marR="0" lvl="7" algn="l" rtl="0">
       <a:lnSpc>
         <a:spcPct val="100000"/>
       </a:lnSpc>
@@ -197,7 +204,7 @@
         <a:spcPts val="0"/>
       </a:spcAft>
       <a:buNone/>
-      <a:defRPr b="0" i="0" sz="1400" u="none" cap="none" strike="noStrike">
+      <a:defRPr sz="1400" b="0" i="0" u="none" strike="noStrike" cap="none">
         <a:solidFill>
           <a:srgbClr val="000000"/>
         </a:solidFill>
@@ -207,7 +214,7 @@
         <a:sym typeface="Arial"/>
       </a:defRPr>
     </a:lvl8pPr>
-    <a:lvl9pPr lvl="8" marR="0" rtl="0" algn="l">
+    <a:lvl9pPr marR="0" lvl="8" algn="l" rtl="0">
       <a:lnSpc>
         <a:spcPct val="100000"/>
       </a:lnSpc>
@@ -218,7 +225,7 @@
         <a:spcPts val="0"/>
       </a:spcAft>
       <a:buNone/>
-      <a:defRPr b="0" i="0" sz="1400" u="none" cap="none" strike="noStrike">
+      <a:defRPr sz="1400" b="0" i="0" u="none" strike="noStrike" cap="none">
         <a:solidFill>
           <a:srgbClr val="000000"/>
         </a:solidFill>
@@ -233,11 +240,16 @@
 </file>
 
 <file path=ppt/notesMasters/notesMaster1.xml><?xml version="1.0" encoding="utf-8"?>
-<p:notesMaster xmlns:a="http://schemas.openxmlformats.org/drawingml/2006/main" xmlns:r="http://schemas.openxmlformats.org/officeDocument/2006/relationships" xmlns:mc="http://schemas.openxmlformats.org/markup-compatibility/2006" xmlns:mv="urn:schemas-microsoft-com:mac:vml" xmlns:p="http://schemas.openxmlformats.org/presentationml/2006/main" xmlns:c="http://schemas.openxmlformats.org/drawingml/2006/chart" xmlns:dgm="http://schemas.openxmlformats.org/drawingml/2006/diagram" xmlns:o="urn:schemas-microsoft-com:office:office" xmlns:v="urn:schemas-microsoft-com:vml" xmlns:pvml="urn:schemas-microsoft-com:office:powerpoint" xmlns:com="http://schemas.openxmlformats.org/drawingml/2006/compatibility" xmlns:p14="http://schemas.microsoft.com/office/powerpoint/2010/main">
+<p:notesMaster xmlns:a="http://schemas.openxmlformats.org/drawingml/2006/main" xmlns:r="http://schemas.openxmlformats.org/officeDocument/2006/relationships" xmlns:p="http://schemas.openxmlformats.org/presentationml/2006/main">
   <p:cSld>
+    <p:bg>
+      <p:bgRef idx="1001">
+        <a:schemeClr val="bg1"/>
+      </p:bgRef>
+    </p:bg>
     <p:spTree>
       <p:nvGrpSpPr>
-        <p:cNvPr id="2" name="Shape 2"/>
+        <p:cNvPr id="1" name="Shape 2"/>
         <p:cNvGrpSpPr/>
         <p:nvPr/>
       </p:nvGrpSpPr>
@@ -252,9 +264,11 @@
       <p:sp>
         <p:nvSpPr>
           <p:cNvPr id="3" name="Shape 3"/>
-          <p:cNvSpPr/>
+          <p:cNvSpPr>
+            <a:spLocks noGrp="1" noRot="1" noChangeAspect="1"/>
+          </p:cNvSpPr>
           <p:nvPr>
-            <p:ph idx="2" type="sldImg"/>
+            <p:ph type="sldImg" idx="2"/>
           </p:nvPr>
         </p:nvSpPr>
         <p:spPr>
@@ -263,8 +277,13 @@
             <a:ext cx="6096299" cy="3429000"/>
           </a:xfrm>
           <a:custGeom>
+            <a:avLst/>
+            <a:gdLst/>
+            <a:ahLst/>
+            <a:cxnLst/>
+            <a:rect l="0" t="0" r="0" b="0"/>
             <a:pathLst>
-              <a:path extrusionOk="0" h="120000" w="120000">
+              <a:path w="120000" h="120000" extrusionOk="0">
                 <a:moveTo>
                   <a:pt x="0" y="0"/>
                 </a:moveTo>
@@ -282,23 +301,25 @@
             </a:pathLst>
           </a:custGeom>
           <a:noFill/>
-          <a:ln cap="flat" cmpd="sng" w="9525">
+          <a:ln w="9525" cap="flat" cmpd="sng">
             <a:solidFill>
               <a:srgbClr val="000000"/>
             </a:solidFill>
             <a:prstDash val="solid"/>
             <a:round/>
-            <a:headEnd len="med" w="med" type="none"/>
-            <a:tailEnd len="med" w="med" type="none"/>
+            <a:headEnd type="none" w="med" len="med"/>
+            <a:tailEnd type="none" w="med" len="med"/>
           </a:ln>
         </p:spPr>
       </p:sp>
       <p:sp>
         <p:nvSpPr>
           <p:cNvPr id="4" name="Shape 4"/>
-          <p:cNvSpPr txBox="1"/>
+          <p:cNvSpPr txBox="1">
+            <a:spLocks noGrp="1"/>
+          </p:cNvSpPr>
           <p:nvPr>
-            <p:ph idx="1" type="body"/>
+            <p:ph type="body" idx="1"/>
           </p:nvPr>
         </p:nvSpPr>
         <p:spPr>
@@ -315,7 +336,7 @@
           </a:ln>
         </p:spPr>
         <p:txBody>
-          <a:bodyPr anchorCtr="0" anchor="t" bIns="91425" lIns="91425" rIns="91425" tIns="91425"/>
+          <a:bodyPr lIns="91425" tIns="91425" rIns="91425" bIns="91425" anchor="t" anchorCtr="0"/>
           <a:lstStyle>
             <a:lvl1pPr lvl="0">
               <a:spcBef>
@@ -372,21 +393,115 @@
               <a:defRPr sz="1100"/>
             </a:lvl9pPr>
           </a:lstStyle>
-          <a:p/>
+          <a:p>
+            <a:endParaRPr/>
+          </a:p>
         </p:txBody>
       </p:sp>
     </p:spTree>
   </p:cSld>
-  <p:clrMap accent1="accent1" accent2="accent2" accent3="accent3" accent4="accent4" accent5="accent5" accent6="accent6" bg1="lt1" bg2="dk2" tx1="dk1" tx2="lt2" folHlink="folHlink" hlink="hlink"/>
+  <p:clrMap bg1="lt1" tx1="dk1" bg2="dk2" tx2="lt2" accent1="accent1" accent2="accent2" accent3="accent3" accent4="accent4" accent5="accent5" accent6="accent6" hlink="hlink" folHlink="folHlink"/>
+  <p:notesStyle>
+    <a:lvl1pPr marL="0" algn="l" defTabSz="914400" rtl="0" eaLnBrk="1" latinLnBrk="0" hangingPunct="1">
+      <a:defRPr sz="1200" kern="1200">
+        <a:solidFill>
+          <a:schemeClr val="tx1"/>
+        </a:solidFill>
+        <a:latin typeface="+mn-lt"/>
+        <a:ea typeface="+mn-ea"/>
+        <a:cs typeface="+mn-cs"/>
+      </a:defRPr>
+    </a:lvl1pPr>
+    <a:lvl2pPr marL="457200" algn="l" defTabSz="914400" rtl="0" eaLnBrk="1" latinLnBrk="0" hangingPunct="1">
+      <a:defRPr sz="1200" kern="1200">
+        <a:solidFill>
+          <a:schemeClr val="tx1"/>
+        </a:solidFill>
+        <a:latin typeface="+mn-lt"/>
+        <a:ea typeface="+mn-ea"/>
+        <a:cs typeface="+mn-cs"/>
+      </a:defRPr>
+    </a:lvl2pPr>
+    <a:lvl3pPr marL="914400" algn="l" defTabSz="914400" rtl="0" eaLnBrk="1" latinLnBrk="0" hangingPunct="1">
+      <a:defRPr sz="1200" kern="1200">
+        <a:solidFill>
+          <a:schemeClr val="tx1"/>
+        </a:solidFill>
+        <a:latin typeface="+mn-lt"/>
+        <a:ea typeface="+mn-ea"/>
+        <a:cs typeface="+mn-cs"/>
+      </a:defRPr>
+    </a:lvl3pPr>
+    <a:lvl4pPr marL="1371600" algn="l" defTabSz="914400" rtl="0" eaLnBrk="1" latinLnBrk="0" hangingPunct="1">
+      <a:defRPr sz="1200" kern="1200">
+        <a:solidFill>
+          <a:schemeClr val="tx1"/>
+        </a:solidFill>
+        <a:latin typeface="+mn-lt"/>
+        <a:ea typeface="+mn-ea"/>
+        <a:cs typeface="+mn-cs"/>
+      </a:defRPr>
+    </a:lvl4pPr>
+    <a:lvl5pPr marL="1828800" algn="l" defTabSz="914400" rtl="0" eaLnBrk="1" latinLnBrk="0" hangingPunct="1">
+      <a:defRPr sz="1200" kern="1200">
+        <a:solidFill>
+          <a:schemeClr val="tx1"/>
+        </a:solidFill>
+        <a:latin typeface="+mn-lt"/>
+        <a:ea typeface="+mn-ea"/>
+        <a:cs typeface="+mn-cs"/>
+      </a:defRPr>
+    </a:lvl5pPr>
+    <a:lvl6pPr marL="2286000" algn="l" defTabSz="914400" rtl="0" eaLnBrk="1" latinLnBrk="0" hangingPunct="1">
+      <a:defRPr sz="1200" kern="1200">
+        <a:solidFill>
+          <a:schemeClr val="tx1"/>
+        </a:solidFill>
+        <a:latin typeface="+mn-lt"/>
+        <a:ea typeface="+mn-ea"/>
+        <a:cs typeface="+mn-cs"/>
+      </a:defRPr>
+    </a:lvl6pPr>
+    <a:lvl7pPr marL="2743200" algn="l" defTabSz="914400" rtl="0" eaLnBrk="1" latinLnBrk="0" hangingPunct="1">
+      <a:defRPr sz="1200" kern="1200">
+        <a:solidFill>
+          <a:schemeClr val="tx1"/>
+        </a:solidFill>
+        <a:latin typeface="+mn-lt"/>
+        <a:ea typeface="+mn-ea"/>
+        <a:cs typeface="+mn-cs"/>
+      </a:defRPr>
+    </a:lvl7pPr>
+    <a:lvl8pPr marL="3200400" algn="l" defTabSz="914400" rtl="0" eaLnBrk="1" latinLnBrk="0" hangingPunct="1">
+      <a:defRPr sz="1200" kern="1200">
+        <a:solidFill>
+          <a:schemeClr val="tx1"/>
+        </a:solidFill>
+        <a:latin typeface="+mn-lt"/>
+        <a:ea typeface="+mn-ea"/>
+        <a:cs typeface="+mn-cs"/>
+      </a:defRPr>
+    </a:lvl8pPr>
+    <a:lvl9pPr marL="3657600" algn="l" defTabSz="914400" rtl="0" eaLnBrk="1" latinLnBrk="0" hangingPunct="1">
+      <a:defRPr sz="1200" kern="1200">
+        <a:solidFill>
+          <a:schemeClr val="tx1"/>
+        </a:solidFill>
+        <a:latin typeface="+mn-lt"/>
+        <a:ea typeface="+mn-ea"/>
+        <a:cs typeface="+mn-cs"/>
+      </a:defRPr>
+    </a:lvl9pPr>
+  </p:notesStyle>
 </p:notesMaster>
 </file>
 
 <file path=ppt/notesSlides/notesSlide1.xml><?xml version="1.0" encoding="utf-8"?>
-<p:notes xmlns:a="http://schemas.openxmlformats.org/drawingml/2006/main" xmlns:r="http://schemas.openxmlformats.org/officeDocument/2006/relationships" xmlns:mc="http://schemas.openxmlformats.org/markup-compatibility/2006" xmlns:mv="urn:schemas-microsoft-com:mac:vml" xmlns:p="http://schemas.openxmlformats.org/presentationml/2006/main" xmlns:c="http://schemas.openxmlformats.org/drawingml/2006/chart" xmlns:dgm="http://schemas.openxmlformats.org/drawingml/2006/diagram" xmlns:o="urn:schemas-microsoft-com:office:office" xmlns:v="urn:schemas-microsoft-com:vml" xmlns:pvml="urn:schemas-microsoft-com:office:powerpoint" xmlns:com="http://schemas.openxmlformats.org/drawingml/2006/compatibility" xmlns:p14="http://schemas.microsoft.com/office/powerpoint/2010/main" showMasterPhAnim="0" showMasterSp="0">
+<p:notes xmlns:a="http://schemas.openxmlformats.org/drawingml/2006/main" xmlns:r="http://schemas.openxmlformats.org/officeDocument/2006/relationships" xmlns:p="http://schemas.openxmlformats.org/presentationml/2006/main" showMasterSp="0" showMasterPhAnim="0">
   <p:cSld>
     <p:spTree>
       <p:nvGrpSpPr>
-        <p:cNvPr id="56" name="Shape 56"/>
+        <p:cNvPr id="1" name="Shape 56"/>
         <p:cNvGrpSpPr/>
         <p:nvPr/>
       </p:nvGrpSpPr>
@@ -401,19 +516,26 @@
       <p:sp>
         <p:nvSpPr>
           <p:cNvPr id="57" name="Shape 57"/>
-          <p:cNvSpPr/>
+          <p:cNvSpPr>
+            <a:spLocks noGrp="1" noRot="1" noChangeAspect="1"/>
+          </p:cNvSpPr>
           <p:nvPr>
-            <p:ph idx="2" type="sldImg"/>
+            <p:ph type="sldImg" idx="2"/>
           </p:nvPr>
         </p:nvSpPr>
         <p:spPr>
           <a:xfrm>
-            <a:off x="381175" y="685800"/>
-            <a:ext cx="6096299" cy="3429000"/>
+            <a:off x="381000" y="685800"/>
+            <a:ext cx="6096000" cy="3429000"/>
           </a:xfrm>
           <a:custGeom>
+            <a:avLst/>
+            <a:gdLst/>
+            <a:ahLst/>
+            <a:cxnLst/>
+            <a:rect l="0" t="0" r="0" b="0"/>
             <a:pathLst>
-              <a:path extrusionOk="0" h="120000" w="120000">
+              <a:path w="120000" h="120000" extrusionOk="0">
                 <a:moveTo>
                   <a:pt x="0" y="0"/>
                 </a:moveTo>
@@ -435,9 +557,11 @@
       <p:sp>
         <p:nvSpPr>
           <p:cNvPr id="58" name="Shape 58"/>
-          <p:cNvSpPr txBox="1"/>
+          <p:cNvSpPr txBox="1">
+            <a:spLocks noGrp="1"/>
+          </p:cNvSpPr>
           <p:nvPr>
-            <p:ph idx="1" type="body"/>
+            <p:ph type="body" idx="1"/>
           </p:nvPr>
         </p:nvSpPr>
         <p:spPr>
@@ -450,7 +574,7 @@
           </a:prstGeom>
         </p:spPr>
         <p:txBody>
-          <a:bodyPr anchorCtr="0" anchor="t" bIns="91425" lIns="91425" rIns="91425" tIns="91425">
+          <a:bodyPr lIns="91425" tIns="91425" rIns="91425" bIns="91425" anchor="t" anchorCtr="0">
             <a:noAutofit/>
           </a:bodyPr>
           <a:lstStyle/>
@@ -461,9 +585,6 @@
               </a:spcBef>
               <a:buNone/>
             </a:pPr>
-            <a:r>
-              <a:t/>
-            </a:r>
             <a:endParaRPr/>
           </a:p>
         </p:txBody>
@@ -477,11 +598,11 @@
 </file>
 
 <file path=ppt/notesSlides/notesSlide2.xml><?xml version="1.0" encoding="utf-8"?>
-<p:notes xmlns:a="http://schemas.openxmlformats.org/drawingml/2006/main" xmlns:r="http://schemas.openxmlformats.org/officeDocument/2006/relationships" xmlns:mc="http://schemas.openxmlformats.org/markup-compatibility/2006" xmlns:mv="urn:schemas-microsoft-com:mac:vml" xmlns:p="http://schemas.openxmlformats.org/presentationml/2006/main" xmlns:c="http://schemas.openxmlformats.org/drawingml/2006/chart" xmlns:dgm="http://schemas.openxmlformats.org/drawingml/2006/diagram" xmlns:o="urn:schemas-microsoft-com:office:office" xmlns:v="urn:schemas-microsoft-com:vml" xmlns:pvml="urn:schemas-microsoft-com:office:powerpoint" xmlns:com="http://schemas.openxmlformats.org/drawingml/2006/compatibility" xmlns:p14="http://schemas.microsoft.com/office/powerpoint/2010/main" showMasterPhAnim="0" showMasterSp="0">
+<p:notes xmlns:a="http://schemas.openxmlformats.org/drawingml/2006/main" xmlns:r="http://schemas.openxmlformats.org/officeDocument/2006/relationships" xmlns:p="http://schemas.openxmlformats.org/presentationml/2006/main" showMasterSp="0" showMasterPhAnim="0">
   <p:cSld>
     <p:spTree>
       <p:nvGrpSpPr>
-        <p:cNvPr id="61" name="Shape 61"/>
+        <p:cNvPr id="1" name="Shape 61"/>
         <p:cNvGrpSpPr/>
         <p:nvPr/>
       </p:nvGrpSpPr>
@@ -496,9 +617,11 @@
       <p:sp>
         <p:nvSpPr>
           <p:cNvPr id="62" name="Shape 62"/>
-          <p:cNvSpPr/>
+          <p:cNvSpPr>
+            <a:spLocks noGrp="1" noRot="1" noChangeAspect="1"/>
+          </p:cNvSpPr>
           <p:nvPr>
-            <p:ph idx="2" type="sldImg"/>
+            <p:ph type="sldImg" idx="2"/>
           </p:nvPr>
         </p:nvSpPr>
         <p:spPr>
@@ -507,8 +630,13 @@
             <a:ext cx="6096299" cy="3429000"/>
           </a:xfrm>
           <a:custGeom>
+            <a:avLst/>
+            <a:gdLst/>
+            <a:ahLst/>
+            <a:cxnLst/>
+            <a:rect l="0" t="0" r="0" b="0"/>
             <a:pathLst>
-              <a:path extrusionOk="0" h="120000" w="120000">
+              <a:path w="120000" h="120000" extrusionOk="0">
                 <a:moveTo>
                   <a:pt x="0" y="0"/>
                 </a:moveTo>
@@ -530,9 +658,11 @@
       <p:sp>
         <p:nvSpPr>
           <p:cNvPr id="63" name="Shape 63"/>
-          <p:cNvSpPr txBox="1"/>
+          <p:cNvSpPr txBox="1">
+            <a:spLocks noGrp="1"/>
+          </p:cNvSpPr>
           <p:nvPr>
-            <p:ph idx="1" type="body"/>
+            <p:ph type="body" idx="1"/>
           </p:nvPr>
         </p:nvSpPr>
         <p:spPr>
@@ -545,7 +675,7 @@
           </a:prstGeom>
         </p:spPr>
         <p:txBody>
-          <a:bodyPr anchorCtr="0" anchor="t" bIns="91425" lIns="91425" rIns="91425" tIns="91425">
+          <a:bodyPr lIns="91425" tIns="91425" rIns="91425" bIns="91425" anchor="t" anchorCtr="0">
             <a:noAutofit/>
           </a:bodyPr>
           <a:lstStyle/>
@@ -556,9 +686,6 @@
               </a:spcBef>
               <a:buNone/>
             </a:pPr>
-            <a:r>
-              <a:t/>
-            </a:r>
             <a:endParaRPr/>
           </a:p>
         </p:txBody>
@@ -572,11 +699,11 @@
 </file>
 
 <file path=ppt/notesSlides/notesSlide3.xml><?xml version="1.0" encoding="utf-8"?>
-<p:notes xmlns:a="http://schemas.openxmlformats.org/drawingml/2006/main" xmlns:r="http://schemas.openxmlformats.org/officeDocument/2006/relationships" xmlns:mc="http://schemas.openxmlformats.org/markup-compatibility/2006" xmlns:mv="urn:schemas-microsoft-com:mac:vml" xmlns:p="http://schemas.openxmlformats.org/presentationml/2006/main" xmlns:c="http://schemas.openxmlformats.org/drawingml/2006/chart" xmlns:dgm="http://schemas.openxmlformats.org/drawingml/2006/diagram" xmlns:o="urn:schemas-microsoft-com:office:office" xmlns:v="urn:schemas-microsoft-com:vml" xmlns:pvml="urn:schemas-microsoft-com:office:powerpoint" xmlns:com="http://schemas.openxmlformats.org/drawingml/2006/compatibility" xmlns:p14="http://schemas.microsoft.com/office/powerpoint/2010/main" showMasterPhAnim="0" showMasterSp="0">
+<p:notes xmlns:a="http://schemas.openxmlformats.org/drawingml/2006/main" xmlns:r="http://schemas.openxmlformats.org/officeDocument/2006/relationships" xmlns:p="http://schemas.openxmlformats.org/presentationml/2006/main" showMasterSp="0" showMasterPhAnim="0">
   <p:cSld>
     <p:spTree>
       <p:nvGrpSpPr>
-        <p:cNvPr id="66" name="Shape 66"/>
+        <p:cNvPr id="1" name="Shape 66"/>
         <p:cNvGrpSpPr/>
         <p:nvPr/>
       </p:nvGrpSpPr>
@@ -591,19 +718,26 @@
       <p:sp>
         <p:nvSpPr>
           <p:cNvPr id="67" name="Shape 67"/>
-          <p:cNvSpPr/>
+          <p:cNvSpPr>
+            <a:spLocks noGrp="1" noRot="1" noChangeAspect="1"/>
+          </p:cNvSpPr>
           <p:nvPr>
-            <p:ph idx="2" type="sldImg"/>
+            <p:ph type="sldImg" idx="2"/>
           </p:nvPr>
         </p:nvSpPr>
         <p:spPr>
           <a:xfrm>
-            <a:off x="381175" y="685800"/>
-            <a:ext cx="6096299" cy="3429000"/>
+            <a:off x="381000" y="685800"/>
+            <a:ext cx="6096000" cy="3429000"/>
           </a:xfrm>
           <a:custGeom>
+            <a:avLst/>
+            <a:gdLst/>
+            <a:ahLst/>
+            <a:cxnLst/>
+            <a:rect l="0" t="0" r="0" b="0"/>
             <a:pathLst>
-              <a:path extrusionOk="0" h="120000" w="120000">
+              <a:path w="120000" h="120000" extrusionOk="0">
                 <a:moveTo>
                   <a:pt x="0" y="0"/>
                 </a:moveTo>
@@ -625,9 +759,11 @@
       <p:sp>
         <p:nvSpPr>
           <p:cNvPr id="68" name="Shape 68"/>
-          <p:cNvSpPr txBox="1"/>
+          <p:cNvSpPr txBox="1">
+            <a:spLocks noGrp="1"/>
+          </p:cNvSpPr>
           <p:nvPr>
-            <p:ph idx="1" type="body"/>
+            <p:ph type="body" idx="1"/>
           </p:nvPr>
         </p:nvSpPr>
         <p:spPr>
@@ -640,7 +776,7 @@
           </a:prstGeom>
         </p:spPr>
         <p:txBody>
-          <a:bodyPr anchorCtr="0" anchor="t" bIns="91425" lIns="91425" rIns="91425" tIns="91425">
+          <a:bodyPr lIns="91425" tIns="91425" rIns="91425" bIns="91425" anchor="t" anchorCtr="0">
             <a:noAutofit/>
           </a:bodyPr>
           <a:lstStyle/>
@@ -651,9 +787,6 @@
               </a:spcBef>
               <a:buNone/>
             </a:pPr>
-            <a:r>
-              <a:t/>
-            </a:r>
             <a:endParaRPr/>
           </a:p>
         </p:txBody>
@@ -667,11 +800,11 @@
 </file>
 
 <file path=ppt/notesSlides/notesSlide4.xml><?xml version="1.0" encoding="utf-8"?>
-<p:notes xmlns:a="http://schemas.openxmlformats.org/drawingml/2006/main" xmlns:r="http://schemas.openxmlformats.org/officeDocument/2006/relationships" xmlns:mc="http://schemas.openxmlformats.org/markup-compatibility/2006" xmlns:mv="urn:schemas-microsoft-com:mac:vml" xmlns:p="http://schemas.openxmlformats.org/presentationml/2006/main" xmlns:c="http://schemas.openxmlformats.org/drawingml/2006/chart" xmlns:dgm="http://schemas.openxmlformats.org/drawingml/2006/diagram" xmlns:o="urn:schemas-microsoft-com:office:office" xmlns:v="urn:schemas-microsoft-com:vml" xmlns:pvml="urn:schemas-microsoft-com:office:powerpoint" xmlns:com="http://schemas.openxmlformats.org/drawingml/2006/compatibility" xmlns:p14="http://schemas.microsoft.com/office/powerpoint/2010/main" showMasterPhAnim="0" showMasterSp="0">
+<p:notes xmlns:a="http://schemas.openxmlformats.org/drawingml/2006/main" xmlns:r="http://schemas.openxmlformats.org/officeDocument/2006/relationships" xmlns:p="http://schemas.openxmlformats.org/presentationml/2006/main" showMasterSp="0" showMasterPhAnim="0">
   <p:cSld>
     <p:spTree>
       <p:nvGrpSpPr>
-        <p:cNvPr id="73" name="Shape 73"/>
+        <p:cNvPr id="1" name="Shape 73"/>
         <p:cNvGrpSpPr/>
         <p:nvPr/>
       </p:nvGrpSpPr>
@@ -686,9 +819,11 @@
       <p:sp>
         <p:nvSpPr>
           <p:cNvPr id="74" name="Shape 74"/>
-          <p:cNvSpPr/>
+          <p:cNvSpPr>
+            <a:spLocks noGrp="1" noRot="1" noChangeAspect="1"/>
+          </p:cNvSpPr>
           <p:nvPr>
-            <p:ph idx="2" type="sldImg"/>
+            <p:ph type="sldImg" idx="2"/>
           </p:nvPr>
         </p:nvSpPr>
         <p:spPr>
@@ -697,8 +832,13 @@
             <a:ext cx="6096299" cy="3429000"/>
           </a:xfrm>
           <a:custGeom>
+            <a:avLst/>
+            <a:gdLst/>
+            <a:ahLst/>
+            <a:cxnLst/>
+            <a:rect l="0" t="0" r="0" b="0"/>
             <a:pathLst>
-              <a:path extrusionOk="0" h="120000" w="120000">
+              <a:path w="120000" h="120000" extrusionOk="0">
                 <a:moveTo>
                   <a:pt x="0" y="0"/>
                 </a:moveTo>
@@ -720,9 +860,11 @@
       <p:sp>
         <p:nvSpPr>
           <p:cNvPr id="75" name="Shape 75"/>
-          <p:cNvSpPr txBox="1"/>
+          <p:cNvSpPr txBox="1">
+            <a:spLocks noGrp="1"/>
+          </p:cNvSpPr>
           <p:nvPr>
-            <p:ph idx="1" type="body"/>
+            <p:ph type="body" idx="1"/>
           </p:nvPr>
         </p:nvSpPr>
         <p:spPr>
@@ -735,7 +877,7 @@
           </a:prstGeom>
         </p:spPr>
         <p:txBody>
-          <a:bodyPr anchorCtr="0" anchor="t" bIns="91425" lIns="91425" rIns="91425" tIns="91425">
+          <a:bodyPr lIns="91425" tIns="91425" rIns="91425" bIns="91425" anchor="t" anchorCtr="0">
             <a:noAutofit/>
           </a:bodyPr>
           <a:lstStyle/>
@@ -746,9 +888,6 @@
               </a:spcBef>
               <a:buNone/>
             </a:pPr>
-            <a:r>
-              <a:t/>
-            </a:r>
             <a:endParaRPr/>
           </a:p>
         </p:txBody>
@@ -762,11 +901,11 @@
 </file>
 
 <file path=ppt/notesSlides/notesSlide5.xml><?xml version="1.0" encoding="utf-8"?>
-<p:notes xmlns:a="http://schemas.openxmlformats.org/drawingml/2006/main" xmlns:r="http://schemas.openxmlformats.org/officeDocument/2006/relationships" xmlns:mc="http://schemas.openxmlformats.org/markup-compatibility/2006" xmlns:mv="urn:schemas-microsoft-com:mac:vml" xmlns:p="http://schemas.openxmlformats.org/presentationml/2006/main" xmlns:c="http://schemas.openxmlformats.org/drawingml/2006/chart" xmlns:dgm="http://schemas.openxmlformats.org/drawingml/2006/diagram" xmlns:o="urn:schemas-microsoft-com:office:office" xmlns:v="urn:schemas-microsoft-com:vml" xmlns:pvml="urn:schemas-microsoft-com:office:powerpoint" xmlns:com="http://schemas.openxmlformats.org/drawingml/2006/compatibility" xmlns:p14="http://schemas.microsoft.com/office/powerpoint/2010/main" showMasterPhAnim="0" showMasterSp="0">
+<p:notes xmlns:a="http://schemas.openxmlformats.org/drawingml/2006/main" xmlns:r="http://schemas.openxmlformats.org/officeDocument/2006/relationships" xmlns:p="http://schemas.openxmlformats.org/presentationml/2006/main" showMasterSp="0" showMasterPhAnim="0">
   <p:cSld>
     <p:spTree>
       <p:nvGrpSpPr>
-        <p:cNvPr id="78" name="Shape 78"/>
+        <p:cNvPr id="1" name="Shape 78"/>
         <p:cNvGrpSpPr/>
         <p:nvPr/>
       </p:nvGrpSpPr>
@@ -781,9 +920,11 @@
       <p:sp>
         <p:nvSpPr>
           <p:cNvPr id="79" name="Shape 79"/>
-          <p:cNvSpPr/>
+          <p:cNvSpPr>
+            <a:spLocks noGrp="1" noRot="1" noChangeAspect="1"/>
+          </p:cNvSpPr>
           <p:nvPr>
-            <p:ph idx="2" type="sldImg"/>
+            <p:ph type="sldImg" idx="2"/>
           </p:nvPr>
         </p:nvSpPr>
         <p:spPr>
@@ -792,8 +933,13 @@
             <a:ext cx="6096299" cy="3429000"/>
           </a:xfrm>
           <a:custGeom>
+            <a:avLst/>
+            <a:gdLst/>
+            <a:ahLst/>
+            <a:cxnLst/>
+            <a:rect l="0" t="0" r="0" b="0"/>
             <a:pathLst>
-              <a:path extrusionOk="0" h="120000" w="120000">
+              <a:path w="120000" h="120000" extrusionOk="0">
                 <a:moveTo>
                   <a:pt x="0" y="0"/>
                 </a:moveTo>
@@ -815,9 +961,11 @@
       <p:sp>
         <p:nvSpPr>
           <p:cNvPr id="80" name="Shape 80"/>
-          <p:cNvSpPr txBox="1"/>
+          <p:cNvSpPr txBox="1">
+            <a:spLocks noGrp="1"/>
+          </p:cNvSpPr>
           <p:nvPr>
-            <p:ph idx="1" type="body"/>
+            <p:ph type="body" idx="1"/>
           </p:nvPr>
         </p:nvSpPr>
         <p:spPr>
@@ -830,7 +978,7 @@
           </a:prstGeom>
         </p:spPr>
         <p:txBody>
-          <a:bodyPr anchorCtr="0" anchor="t" bIns="91425" lIns="91425" rIns="91425" tIns="91425">
+          <a:bodyPr lIns="91425" tIns="91425" rIns="91425" bIns="91425" anchor="t" anchorCtr="0">
             <a:noAutofit/>
           </a:bodyPr>
           <a:lstStyle/>
@@ -841,9 +989,6 @@
               </a:spcBef>
               <a:buNone/>
             </a:pPr>
-            <a:r>
-              <a:t/>
-            </a:r>
             <a:endParaRPr/>
           </a:p>
         </p:txBody>
@@ -857,11 +1002,11 @@
 </file>
 
 <file path=ppt/notesSlides/notesSlide6.xml><?xml version="1.0" encoding="utf-8"?>
-<p:notes xmlns:a="http://schemas.openxmlformats.org/drawingml/2006/main" xmlns:r="http://schemas.openxmlformats.org/officeDocument/2006/relationships" xmlns:mc="http://schemas.openxmlformats.org/markup-compatibility/2006" xmlns:mv="urn:schemas-microsoft-com:mac:vml" xmlns:p="http://schemas.openxmlformats.org/presentationml/2006/main" xmlns:c="http://schemas.openxmlformats.org/drawingml/2006/chart" xmlns:dgm="http://schemas.openxmlformats.org/drawingml/2006/diagram" xmlns:o="urn:schemas-microsoft-com:office:office" xmlns:v="urn:schemas-microsoft-com:vml" xmlns:pvml="urn:schemas-microsoft-com:office:powerpoint" xmlns:com="http://schemas.openxmlformats.org/drawingml/2006/compatibility" xmlns:p14="http://schemas.microsoft.com/office/powerpoint/2010/main" showMasterPhAnim="0" showMasterSp="0">
+<p:notes xmlns:a="http://schemas.openxmlformats.org/drawingml/2006/main" xmlns:r="http://schemas.openxmlformats.org/officeDocument/2006/relationships" xmlns:p="http://schemas.openxmlformats.org/presentationml/2006/main" showMasterSp="0" showMasterPhAnim="0">
   <p:cSld>
     <p:spTree>
       <p:nvGrpSpPr>
-        <p:cNvPr id="83" name="Shape 83"/>
+        <p:cNvPr id="1" name="Shape 83"/>
         <p:cNvGrpSpPr/>
         <p:nvPr/>
       </p:nvGrpSpPr>
@@ -876,9 +1021,11 @@
       <p:sp>
         <p:nvSpPr>
           <p:cNvPr id="84" name="Shape 84"/>
-          <p:cNvSpPr/>
+          <p:cNvSpPr>
+            <a:spLocks noGrp="1" noRot="1" noChangeAspect="1"/>
+          </p:cNvSpPr>
           <p:nvPr>
-            <p:ph idx="2" type="sldImg"/>
+            <p:ph type="sldImg" idx="2"/>
           </p:nvPr>
         </p:nvSpPr>
         <p:spPr>
@@ -887,8 +1034,13 @@
             <a:ext cx="6096299" cy="3429000"/>
           </a:xfrm>
           <a:custGeom>
+            <a:avLst/>
+            <a:gdLst/>
+            <a:ahLst/>
+            <a:cxnLst/>
+            <a:rect l="0" t="0" r="0" b="0"/>
             <a:pathLst>
-              <a:path extrusionOk="0" h="120000" w="120000">
+              <a:path w="120000" h="120000" extrusionOk="0">
                 <a:moveTo>
                   <a:pt x="0" y="0"/>
                 </a:moveTo>
@@ -910,9 +1062,11 @@
       <p:sp>
         <p:nvSpPr>
           <p:cNvPr id="85" name="Shape 85"/>
-          <p:cNvSpPr txBox="1"/>
+          <p:cNvSpPr txBox="1">
+            <a:spLocks noGrp="1"/>
+          </p:cNvSpPr>
           <p:nvPr>
-            <p:ph idx="1" type="body"/>
+            <p:ph type="body" idx="1"/>
           </p:nvPr>
         </p:nvSpPr>
         <p:spPr>
@@ -925,7 +1079,7 @@
           </a:prstGeom>
         </p:spPr>
         <p:txBody>
-          <a:bodyPr anchorCtr="0" anchor="t" bIns="91425" lIns="91425" rIns="91425" tIns="91425">
+          <a:bodyPr lIns="91425" tIns="91425" rIns="91425" bIns="91425" anchor="t" anchorCtr="0">
             <a:noAutofit/>
           </a:bodyPr>
           <a:lstStyle/>
@@ -936,9 +1090,6 @@
               </a:spcBef>
               <a:buNone/>
             </a:pPr>
-            <a:r>
-              <a:t/>
-            </a:r>
             <a:endParaRPr/>
           </a:p>
         </p:txBody>
@@ -952,11 +1103,11 @@
 </file>
 
 <file path=ppt/notesSlides/notesSlide7.xml><?xml version="1.0" encoding="utf-8"?>
-<p:notes xmlns:a="http://schemas.openxmlformats.org/drawingml/2006/main" xmlns:r="http://schemas.openxmlformats.org/officeDocument/2006/relationships" xmlns:mc="http://schemas.openxmlformats.org/markup-compatibility/2006" xmlns:mv="urn:schemas-microsoft-com:mac:vml" xmlns:p="http://schemas.openxmlformats.org/presentationml/2006/main" xmlns:c="http://schemas.openxmlformats.org/drawingml/2006/chart" xmlns:dgm="http://schemas.openxmlformats.org/drawingml/2006/diagram" xmlns:o="urn:schemas-microsoft-com:office:office" xmlns:v="urn:schemas-microsoft-com:vml" xmlns:pvml="urn:schemas-microsoft-com:office:powerpoint" xmlns:com="http://schemas.openxmlformats.org/drawingml/2006/compatibility" xmlns:p14="http://schemas.microsoft.com/office/powerpoint/2010/main" showMasterPhAnim="0" showMasterSp="0">
+<p:notes xmlns:a="http://schemas.openxmlformats.org/drawingml/2006/main" xmlns:r="http://schemas.openxmlformats.org/officeDocument/2006/relationships" xmlns:p="http://schemas.openxmlformats.org/presentationml/2006/main" showMasterSp="0" showMasterPhAnim="0">
   <p:cSld>
     <p:spTree>
       <p:nvGrpSpPr>
-        <p:cNvPr id="88" name="Shape 88"/>
+        <p:cNvPr id="1" name="Shape 88"/>
         <p:cNvGrpSpPr/>
         <p:nvPr/>
       </p:nvGrpSpPr>
@@ -971,9 +1122,11 @@
       <p:sp>
         <p:nvSpPr>
           <p:cNvPr id="89" name="Shape 89"/>
-          <p:cNvSpPr/>
+          <p:cNvSpPr>
+            <a:spLocks noGrp="1" noRot="1" noChangeAspect="1"/>
+          </p:cNvSpPr>
           <p:nvPr>
-            <p:ph idx="2" type="sldImg"/>
+            <p:ph type="sldImg" idx="2"/>
           </p:nvPr>
         </p:nvSpPr>
         <p:spPr>
@@ -982,8 +1135,13 @@
             <a:ext cx="6096299" cy="3429000"/>
           </a:xfrm>
           <a:custGeom>
+            <a:avLst/>
+            <a:gdLst/>
+            <a:ahLst/>
+            <a:cxnLst/>
+            <a:rect l="0" t="0" r="0" b="0"/>
             <a:pathLst>
-              <a:path extrusionOk="0" h="120000" w="120000">
+              <a:path w="120000" h="120000" extrusionOk="0">
                 <a:moveTo>
                   <a:pt x="0" y="0"/>
                 </a:moveTo>
@@ -1005,9 +1163,11 @@
       <p:sp>
         <p:nvSpPr>
           <p:cNvPr id="90" name="Shape 90"/>
-          <p:cNvSpPr txBox="1"/>
+          <p:cNvSpPr txBox="1">
+            <a:spLocks noGrp="1"/>
+          </p:cNvSpPr>
           <p:nvPr>
-            <p:ph idx="1" type="body"/>
+            <p:ph type="body" idx="1"/>
           </p:nvPr>
         </p:nvSpPr>
         <p:spPr>
@@ -1020,7 +1180,7 @@
           </a:prstGeom>
         </p:spPr>
         <p:txBody>
-          <a:bodyPr anchorCtr="0" anchor="t" bIns="91425" lIns="91425" rIns="91425" tIns="91425">
+          <a:bodyPr lIns="91425" tIns="91425" rIns="91425" bIns="91425" anchor="t" anchorCtr="0">
             <a:noAutofit/>
           </a:bodyPr>
           <a:lstStyle/>
@@ -1031,9 +1191,6 @@
               </a:spcBef>
               <a:buNone/>
             </a:pPr>
-            <a:r>
-              <a:t/>
-            </a:r>
             <a:endParaRPr/>
           </a:p>
         </p:txBody>
@@ -1047,11 +1204,11 @@
 </file>
 
 <file path=ppt/notesSlides/notesSlide8.xml><?xml version="1.0" encoding="utf-8"?>
-<p:notes xmlns:a="http://schemas.openxmlformats.org/drawingml/2006/main" xmlns:r="http://schemas.openxmlformats.org/officeDocument/2006/relationships" xmlns:mc="http://schemas.openxmlformats.org/markup-compatibility/2006" xmlns:mv="urn:schemas-microsoft-com:mac:vml" xmlns:p="http://schemas.openxmlformats.org/presentationml/2006/main" xmlns:c="http://schemas.openxmlformats.org/drawingml/2006/chart" xmlns:dgm="http://schemas.openxmlformats.org/drawingml/2006/diagram" xmlns:o="urn:schemas-microsoft-com:office:office" xmlns:v="urn:schemas-microsoft-com:vml" xmlns:pvml="urn:schemas-microsoft-com:office:powerpoint" xmlns:com="http://schemas.openxmlformats.org/drawingml/2006/compatibility" xmlns:p14="http://schemas.microsoft.com/office/powerpoint/2010/main" showMasterPhAnim="0" showMasterSp="0">
+<p:notes xmlns:a="http://schemas.openxmlformats.org/drawingml/2006/main" xmlns:r="http://schemas.openxmlformats.org/officeDocument/2006/relationships" xmlns:p="http://schemas.openxmlformats.org/presentationml/2006/main" showMasterSp="0" showMasterPhAnim="0">
   <p:cSld>
     <p:spTree>
       <p:nvGrpSpPr>
-        <p:cNvPr id="94" name="Shape 94"/>
+        <p:cNvPr id="1" name="Shape 94"/>
         <p:cNvGrpSpPr/>
         <p:nvPr/>
       </p:nvGrpSpPr>
@@ -1066,19 +1223,26 @@
       <p:sp>
         <p:nvSpPr>
           <p:cNvPr id="95" name="Shape 95"/>
-          <p:cNvSpPr/>
+          <p:cNvSpPr>
+            <a:spLocks noGrp="1" noRot="1" noChangeAspect="1"/>
+          </p:cNvSpPr>
           <p:nvPr>
-            <p:ph idx="2" type="sldImg"/>
+            <p:ph type="sldImg" idx="2"/>
           </p:nvPr>
         </p:nvSpPr>
         <p:spPr>
           <a:xfrm>
-            <a:off x="381175" y="685800"/>
-            <a:ext cx="6096299" cy="3429000"/>
+            <a:off x="381000" y="685800"/>
+            <a:ext cx="6096000" cy="3429000"/>
           </a:xfrm>
           <a:custGeom>
+            <a:avLst/>
+            <a:gdLst/>
+            <a:ahLst/>
+            <a:cxnLst/>
+            <a:rect l="0" t="0" r="0" b="0"/>
             <a:pathLst>
-              <a:path extrusionOk="0" h="120000" w="120000">
+              <a:path w="120000" h="120000" extrusionOk="0">
                 <a:moveTo>
                   <a:pt x="0" y="0"/>
                 </a:moveTo>
@@ -1100,9 +1264,11 @@
       <p:sp>
         <p:nvSpPr>
           <p:cNvPr id="96" name="Shape 96"/>
-          <p:cNvSpPr txBox="1"/>
+          <p:cNvSpPr txBox="1">
+            <a:spLocks noGrp="1"/>
+          </p:cNvSpPr>
           <p:nvPr>
-            <p:ph idx="1" type="body"/>
+            <p:ph type="body" idx="1"/>
           </p:nvPr>
         </p:nvSpPr>
         <p:spPr>
@@ -1115,7 +1281,7 @@
           </a:prstGeom>
         </p:spPr>
         <p:txBody>
-          <a:bodyPr anchorCtr="0" anchor="t" bIns="91425" lIns="91425" rIns="91425" tIns="91425">
+          <a:bodyPr lIns="91425" tIns="91425" rIns="91425" bIns="91425" anchor="t" anchorCtr="0">
             <a:noAutofit/>
           </a:bodyPr>
           <a:lstStyle/>
@@ -1126,9 +1292,6 @@
               </a:spcBef>
               <a:buNone/>
             </a:pPr>
-            <a:r>
-              <a:t/>
-            </a:r>
             <a:endParaRPr/>
           </a:p>
         </p:txBody>
@@ -1142,11 +1305,11 @@
 </file>
 
 <file path=ppt/notesSlides/notesSlide9.xml><?xml version="1.0" encoding="utf-8"?>
-<p:notes xmlns:a="http://schemas.openxmlformats.org/drawingml/2006/main" xmlns:r="http://schemas.openxmlformats.org/officeDocument/2006/relationships" xmlns:mc="http://schemas.openxmlformats.org/markup-compatibility/2006" xmlns:mv="urn:schemas-microsoft-com:mac:vml" xmlns:p="http://schemas.openxmlformats.org/presentationml/2006/main" xmlns:c="http://schemas.openxmlformats.org/drawingml/2006/chart" xmlns:dgm="http://schemas.openxmlformats.org/drawingml/2006/diagram" xmlns:o="urn:schemas-microsoft-com:office:office" xmlns:v="urn:schemas-microsoft-com:vml" xmlns:pvml="urn:schemas-microsoft-com:office:powerpoint" xmlns:com="http://schemas.openxmlformats.org/drawingml/2006/compatibility" xmlns:p14="http://schemas.microsoft.com/office/powerpoint/2010/main" showMasterPhAnim="0" showMasterSp="0">
+<p:notes xmlns:a="http://schemas.openxmlformats.org/drawingml/2006/main" xmlns:r="http://schemas.openxmlformats.org/officeDocument/2006/relationships" xmlns:p="http://schemas.openxmlformats.org/presentationml/2006/main" showMasterSp="0" showMasterPhAnim="0">
   <p:cSld>
     <p:spTree>
       <p:nvGrpSpPr>
-        <p:cNvPr id="100" name="Shape 100"/>
+        <p:cNvPr id="1" name="Shape 100"/>
         <p:cNvGrpSpPr/>
         <p:nvPr/>
       </p:nvGrpSpPr>
@@ -1161,19 +1324,26 @@
       <p:sp>
         <p:nvSpPr>
           <p:cNvPr id="101" name="Shape 101"/>
-          <p:cNvSpPr/>
+          <p:cNvSpPr>
+            <a:spLocks noGrp="1" noRot="1" noChangeAspect="1"/>
+          </p:cNvSpPr>
           <p:nvPr>
-            <p:ph idx="2" type="sldImg"/>
+            <p:ph type="sldImg" idx="2"/>
           </p:nvPr>
         </p:nvSpPr>
         <p:spPr>
           <a:xfrm>
-            <a:off x="381175" y="685800"/>
-            <a:ext cx="6096299" cy="3429000"/>
+            <a:off x="381000" y="685800"/>
+            <a:ext cx="6096000" cy="3429000"/>
           </a:xfrm>
           <a:custGeom>
+            <a:avLst/>
+            <a:gdLst/>
+            <a:ahLst/>
+            <a:cxnLst/>
+            <a:rect l="0" t="0" r="0" b="0"/>
             <a:pathLst>
-              <a:path extrusionOk="0" h="120000" w="120000">
+              <a:path w="120000" h="120000" extrusionOk="0">
                 <a:moveTo>
                   <a:pt x="0" y="0"/>
                 </a:moveTo>
@@ -1195,9 +1365,11 @@
       <p:sp>
         <p:nvSpPr>
           <p:cNvPr id="102" name="Shape 102"/>
-          <p:cNvSpPr txBox="1"/>
+          <p:cNvSpPr txBox="1">
+            <a:spLocks noGrp="1"/>
+          </p:cNvSpPr>
           <p:nvPr>
-            <p:ph idx="1" type="body"/>
+            <p:ph type="body" idx="1"/>
           </p:nvPr>
         </p:nvSpPr>
         <p:spPr>
@@ -1210,7 +1382,7 @@
           </a:prstGeom>
         </p:spPr>
         <p:txBody>
-          <a:bodyPr anchorCtr="0" anchor="t" bIns="91425" lIns="91425" rIns="91425" tIns="91425">
+          <a:bodyPr lIns="91425" tIns="91425" rIns="91425" bIns="91425" anchor="t" anchorCtr="0">
             <a:noAutofit/>
           </a:bodyPr>
           <a:lstStyle/>
@@ -1221,9 +1393,6 @@
               </a:spcBef>
               <a:buNone/>
             </a:pPr>
-            <a:r>
-              <a:t/>
-            </a:r>
             <a:endParaRPr/>
           </a:p>
         </p:txBody>
@@ -1237,7 +1406,7 @@
 </file>
 
 <file path=ppt/slideLayouts/slideLayout1.xml><?xml version="1.0" encoding="utf-8"?>
-<p:sldLayout xmlns:a="http://schemas.openxmlformats.org/drawingml/2006/main" xmlns:r="http://schemas.openxmlformats.org/officeDocument/2006/relationships" xmlns:mc="http://schemas.openxmlformats.org/markup-compatibility/2006" xmlns:mv="urn:schemas-microsoft-com:mac:vml" xmlns:p="http://schemas.openxmlformats.org/presentationml/2006/main" xmlns:c="http://schemas.openxmlformats.org/drawingml/2006/chart" xmlns:dgm="http://schemas.openxmlformats.org/drawingml/2006/diagram" xmlns:o="urn:schemas-microsoft-com:office:office" xmlns:v="urn:schemas-microsoft-com:vml" xmlns:pvml="urn:schemas-microsoft-com:office:powerpoint" xmlns:com="http://schemas.openxmlformats.org/drawingml/2006/compatibility" xmlns:p14="http://schemas.microsoft.com/office/powerpoint/2010/main" type="title">
+<p:sldLayout xmlns:a="http://schemas.openxmlformats.org/drawingml/2006/main" xmlns:r="http://schemas.openxmlformats.org/officeDocument/2006/relationships" xmlns:p="http://schemas.openxmlformats.org/presentationml/2006/main" type="title">
   <p:cSld name="Title">
     <p:bg>
       <p:bgPr>
@@ -1249,11 +1418,12 @@
             <a:fillRect/>
           </a:stretch>
         </a:blipFill>
+        <a:effectLst/>
       </p:bgPr>
     </p:bg>
     <p:spTree>
       <p:nvGrpSpPr>
-        <p:cNvPr id="8" name="Shape 8"/>
+        <p:cNvPr id="1" name="Shape 8"/>
         <p:cNvGrpSpPr/>
         <p:nvPr/>
       </p:nvGrpSpPr>
@@ -1289,7 +1459,7 @@
           </a:ln>
         </p:spPr>
         <p:txBody>
-          <a:bodyPr anchorCtr="0" anchor="ctr" bIns="91425" lIns="91425" rIns="91425" tIns="91425">
+          <a:bodyPr lIns="91425" tIns="91425" rIns="91425" bIns="91425" anchor="ctr" anchorCtr="0">
             <a:noAutofit/>
           </a:bodyPr>
           <a:lstStyle/>
@@ -1300,9 +1470,6 @@
               </a:spcBef>
               <a:buNone/>
             </a:pPr>
-            <a:r>
-              <a:t/>
-            </a:r>
             <a:endParaRPr/>
           </a:p>
         </p:txBody>
@@ -1331,7 +1498,7 @@
           </a:ln>
         </p:spPr>
         <p:txBody>
-          <a:bodyPr anchorCtr="0" anchor="ctr" bIns="91425" lIns="91425" rIns="91425" tIns="91425">
+          <a:bodyPr lIns="91425" tIns="91425" rIns="91425" bIns="91425" anchor="ctr" anchorCtr="0">
             <a:noAutofit/>
           </a:bodyPr>
           <a:lstStyle/>
@@ -1342,9 +1509,6 @@
               </a:spcBef>
               <a:buNone/>
             </a:pPr>
-            <a:r>
-              <a:t/>
-            </a:r>
             <a:endParaRPr/>
           </a:p>
         </p:txBody>
@@ -1352,7 +1516,9 @@
       <p:sp>
         <p:nvSpPr>
           <p:cNvPr id="11" name="Shape 11"/>
-          <p:cNvSpPr txBox="1"/>
+          <p:cNvSpPr txBox="1">
+            <a:spLocks noGrp="1"/>
+          </p:cNvSpPr>
           <p:nvPr>
             <p:ph type="title"/>
           </p:nvPr>
@@ -1367,9 +1533,9 @@
           </a:prstGeom>
         </p:spPr>
         <p:txBody>
-          <a:bodyPr anchorCtr="0" anchor="ctr" bIns="91425" lIns="91425" rIns="91425" tIns="91425"/>
+          <a:bodyPr lIns="91425" tIns="91425" rIns="91425" bIns="91425" anchor="ctr" anchorCtr="0"/>
           <a:lstStyle>
-            <a:lvl1pPr lvl="0" rtl="0" algn="ctr">
+            <a:lvl1pPr lvl="0" algn="ctr" rtl="0">
               <a:spcBef>
                 <a:spcPts val="0"/>
               </a:spcBef>
@@ -1437,7 +1603,9 @@
               <a:defRPr sz="2400"/>
             </a:lvl9pPr>
           </a:lstStyle>
-          <a:p/>
+          <a:p>
+            <a:endParaRPr/>
+          </a:p>
         </p:txBody>
       </p:sp>
     </p:spTree>
@@ -1449,7 +1617,7 @@
 </file>
 
 <file path=ppt/slideLayouts/slideLayout10.xml><?xml version="1.0" encoding="utf-8"?>
-<p:sldLayout xmlns:a="http://schemas.openxmlformats.org/drawingml/2006/main" xmlns:r="http://schemas.openxmlformats.org/officeDocument/2006/relationships" xmlns:mc="http://schemas.openxmlformats.org/markup-compatibility/2006" xmlns:mv="urn:schemas-microsoft-com:mac:vml" xmlns:p="http://schemas.openxmlformats.org/presentationml/2006/main" xmlns:c="http://schemas.openxmlformats.org/drawingml/2006/chart" xmlns:dgm="http://schemas.openxmlformats.org/drawingml/2006/diagram" xmlns:o="urn:schemas-microsoft-com:office:office" xmlns:v="urn:schemas-microsoft-com:vml" xmlns:pvml="urn:schemas-microsoft-com:office:powerpoint" xmlns:com="http://schemas.openxmlformats.org/drawingml/2006/compatibility" xmlns:p14="http://schemas.microsoft.com/office/powerpoint/2010/main">
+<p:sldLayout xmlns:a="http://schemas.openxmlformats.org/drawingml/2006/main" xmlns:r="http://schemas.openxmlformats.org/officeDocument/2006/relationships" xmlns:p="http://schemas.openxmlformats.org/presentationml/2006/main">
   <p:cSld name="Caption">
     <p:bg>
       <p:bgPr>
@@ -1461,11 +1629,12 @@
             <a:fillRect/>
           </a:stretch>
         </a:blipFill>
+        <a:effectLst/>
       </p:bgPr>
     </p:bg>
     <p:spTree>
       <p:nvGrpSpPr>
-        <p:cNvPr id="51" name="Shape 51"/>
+        <p:cNvPr id="1" name="Shape 51"/>
         <p:cNvGrpSpPr/>
         <p:nvPr/>
       </p:nvGrpSpPr>
@@ -1501,7 +1670,7 @@
           </a:ln>
         </p:spPr>
         <p:txBody>
-          <a:bodyPr anchorCtr="0" anchor="ctr" bIns="91425" lIns="91425" rIns="91425" tIns="91425">
+          <a:bodyPr lIns="91425" tIns="91425" rIns="91425" bIns="91425" anchor="ctr" anchorCtr="0">
             <a:noAutofit/>
           </a:bodyPr>
           <a:lstStyle/>
@@ -1512,9 +1681,6 @@
               </a:spcBef>
               <a:buNone/>
             </a:pPr>
-            <a:r>
-              <a:t/>
-            </a:r>
             <a:endParaRPr/>
           </a:p>
         </p:txBody>
@@ -1543,7 +1709,7 @@
           </a:ln>
         </p:spPr>
         <p:txBody>
-          <a:bodyPr anchorCtr="0" anchor="ctr" bIns="91425" lIns="91425" rIns="91425" tIns="91425">
+          <a:bodyPr lIns="91425" tIns="91425" rIns="91425" bIns="91425" anchor="ctr" anchorCtr="0">
             <a:noAutofit/>
           </a:bodyPr>
           <a:lstStyle/>
@@ -1554,9 +1720,6 @@
               </a:spcBef>
               <a:buNone/>
             </a:pPr>
-            <a:r>
-              <a:t/>
-            </a:r>
             <a:endParaRPr/>
           </a:p>
         </p:txBody>
@@ -1564,9 +1727,11 @@
       <p:sp>
         <p:nvSpPr>
           <p:cNvPr id="54" name="Shape 54"/>
-          <p:cNvSpPr txBox="1"/>
+          <p:cNvSpPr txBox="1">
+            <a:spLocks noGrp="1"/>
+          </p:cNvSpPr>
           <p:nvPr>
-            <p:ph idx="1" type="body"/>
+            <p:ph type="body" idx="1"/>
           </p:nvPr>
         </p:nvSpPr>
         <p:spPr>
@@ -1583,7 +1748,7 @@
           </a:ln>
         </p:spPr>
         <p:txBody>
-          <a:bodyPr anchorCtr="0" anchor="ctr" bIns="91425" lIns="91425" rIns="91425" tIns="91425"/>
+          <a:bodyPr lIns="91425" tIns="91425" rIns="91425" bIns="91425" anchor="ctr" anchorCtr="0"/>
           <a:lstStyle>
             <a:lvl1pPr lvl="0" algn="ctr">
               <a:spcBef>
@@ -1605,7 +1770,9 @@
               </a:defRPr>
             </a:lvl1pPr>
           </a:lstStyle>
-          <a:p/>
+          <a:p>
+            <a:endParaRPr/>
+          </a:p>
         </p:txBody>
       </p:sp>
     </p:spTree>
@@ -1617,18 +1784,19 @@
 </file>
 
 <file path=ppt/slideLayouts/slideLayout11.xml><?xml version="1.0" encoding="utf-8"?>
-<p:sldLayout xmlns:a="http://schemas.openxmlformats.org/drawingml/2006/main" xmlns:r="http://schemas.openxmlformats.org/officeDocument/2006/relationships" xmlns:mc="http://schemas.openxmlformats.org/markup-compatibility/2006" xmlns:mv="urn:schemas-microsoft-com:mac:vml" xmlns:p="http://schemas.openxmlformats.org/presentationml/2006/main" xmlns:c="http://schemas.openxmlformats.org/drawingml/2006/chart" xmlns:dgm="http://schemas.openxmlformats.org/drawingml/2006/diagram" xmlns:o="urn:schemas-microsoft-com:office:office" xmlns:v="urn:schemas-microsoft-com:vml" xmlns:pvml="urn:schemas-microsoft-com:office:powerpoint" xmlns:com="http://schemas.openxmlformats.org/drawingml/2006/compatibility" xmlns:p14="http://schemas.microsoft.com/office/powerpoint/2010/main" type="blank">
+<p:sldLayout xmlns:a="http://schemas.openxmlformats.org/drawingml/2006/main" xmlns:r="http://schemas.openxmlformats.org/officeDocument/2006/relationships" xmlns:p="http://schemas.openxmlformats.org/presentationml/2006/main" type="blank">
   <p:cSld name="Blank">
     <p:bg>
       <p:bgPr>
         <a:solidFill>
           <a:srgbClr val="FFFFFF"/>
         </a:solidFill>
+        <a:effectLst/>
       </p:bgPr>
     </p:bg>
     <p:spTree>
       <p:nvGrpSpPr>
-        <p:cNvPr id="55" name="Shape 55"/>
+        <p:cNvPr id="1" name="Shape 55"/>
         <p:cNvGrpSpPr/>
         <p:nvPr/>
       </p:nvGrpSpPr>
@@ -1649,7 +1817,7 @@
 </file>
 
 <file path=ppt/slideLayouts/slideLayout2.xml><?xml version="1.0" encoding="utf-8"?>
-<p:sldLayout xmlns:a="http://schemas.openxmlformats.org/drawingml/2006/main" xmlns:r="http://schemas.openxmlformats.org/officeDocument/2006/relationships" xmlns:mc="http://schemas.openxmlformats.org/markup-compatibility/2006" xmlns:mv="urn:schemas-microsoft-com:mac:vml" xmlns:p="http://schemas.openxmlformats.org/presentationml/2006/main" xmlns:c="http://schemas.openxmlformats.org/drawingml/2006/chart" xmlns:dgm="http://schemas.openxmlformats.org/drawingml/2006/diagram" xmlns:o="urn:schemas-microsoft-com:office:office" xmlns:v="urn:schemas-microsoft-com:vml" xmlns:pvml="urn:schemas-microsoft-com:office:powerpoint" xmlns:com="http://schemas.openxmlformats.org/drawingml/2006/compatibility" xmlns:p14="http://schemas.microsoft.com/office/powerpoint/2010/main">
+<p:sldLayout xmlns:a="http://schemas.openxmlformats.org/drawingml/2006/main" xmlns:r="http://schemas.openxmlformats.org/officeDocument/2006/relationships" xmlns:p="http://schemas.openxmlformats.org/presentationml/2006/main">
   <p:cSld name="Title 1">
     <p:bg>
       <p:bgPr>
@@ -1661,11 +1829,12 @@
             <a:fillRect/>
           </a:stretch>
         </a:blipFill>
+        <a:effectLst/>
       </p:bgPr>
     </p:bg>
     <p:spTree>
       <p:nvGrpSpPr>
-        <p:cNvPr id="12" name="Shape 12"/>
+        <p:cNvPr id="1" name="Shape 12"/>
         <p:cNvGrpSpPr/>
         <p:nvPr/>
       </p:nvGrpSpPr>
@@ -1701,7 +1870,7 @@
           </a:ln>
         </p:spPr>
         <p:txBody>
-          <a:bodyPr anchorCtr="0" anchor="ctr" bIns="91425" lIns="91425" rIns="91425" tIns="91425">
+          <a:bodyPr lIns="91425" tIns="91425" rIns="91425" bIns="91425" anchor="ctr" anchorCtr="0">
             <a:noAutofit/>
           </a:bodyPr>
           <a:lstStyle/>
@@ -1712,9 +1881,6 @@
               </a:spcBef>
               <a:buNone/>
             </a:pPr>
-            <a:r>
-              <a:t/>
-            </a:r>
             <a:endParaRPr/>
           </a:p>
         </p:txBody>
@@ -1743,7 +1909,7 @@
           </a:ln>
         </p:spPr>
         <p:txBody>
-          <a:bodyPr anchorCtr="0" anchor="ctr" bIns="91425" lIns="91425" rIns="91425" tIns="91425">
+          <a:bodyPr lIns="91425" tIns="91425" rIns="91425" bIns="91425" anchor="ctr" anchorCtr="0">
             <a:noAutofit/>
           </a:bodyPr>
           <a:lstStyle/>
@@ -1754,9 +1920,6 @@
               </a:spcBef>
               <a:buNone/>
             </a:pPr>
-            <a:r>
-              <a:t/>
-            </a:r>
             <a:endParaRPr/>
           </a:p>
         </p:txBody>
@@ -1764,7 +1927,9 @@
       <p:sp>
         <p:nvSpPr>
           <p:cNvPr id="15" name="Shape 15"/>
-          <p:cNvSpPr txBox="1"/>
+          <p:cNvSpPr txBox="1">
+            <a:spLocks noGrp="1"/>
+          </p:cNvSpPr>
           <p:nvPr>
             <p:ph type="title"/>
           </p:nvPr>
@@ -1779,9 +1944,9 @@
           </a:prstGeom>
         </p:spPr>
         <p:txBody>
-          <a:bodyPr anchorCtr="0" anchor="ctr" bIns="91425" lIns="91425" rIns="91425" tIns="91425"/>
+          <a:bodyPr lIns="91425" tIns="91425" rIns="91425" bIns="91425" anchor="ctr" anchorCtr="0"/>
           <a:lstStyle>
-            <a:lvl1pPr lvl="0" rtl="0" algn="ctr">
+            <a:lvl1pPr lvl="0" algn="ctr" rtl="0">
               <a:spcBef>
                 <a:spcPts val="0"/>
               </a:spcBef>
@@ -1849,7 +2014,9 @@
               <a:defRPr sz="2400"/>
             </a:lvl9pPr>
           </a:lstStyle>
-          <a:p/>
+          <a:p>
+            <a:endParaRPr/>
+          </a:p>
         </p:txBody>
       </p:sp>
     </p:spTree>
@@ -1861,7 +2028,7 @@
 </file>
 
 <file path=ppt/slideLayouts/slideLayout3.xml><?xml version="1.0" encoding="utf-8"?>
-<p:sldLayout xmlns:a="http://schemas.openxmlformats.org/drawingml/2006/main" xmlns:r="http://schemas.openxmlformats.org/officeDocument/2006/relationships" xmlns:mc="http://schemas.openxmlformats.org/markup-compatibility/2006" xmlns:mv="urn:schemas-microsoft-com:mac:vml" xmlns:p="http://schemas.openxmlformats.org/presentationml/2006/main" xmlns:c="http://schemas.openxmlformats.org/drawingml/2006/chart" xmlns:dgm="http://schemas.openxmlformats.org/drawingml/2006/diagram" xmlns:o="urn:schemas-microsoft-com:office:office" xmlns:v="urn:schemas-microsoft-com:vml" xmlns:pvml="urn:schemas-microsoft-com:office:powerpoint" xmlns:com="http://schemas.openxmlformats.org/drawingml/2006/compatibility" xmlns:p14="http://schemas.microsoft.com/office/powerpoint/2010/main">
+<p:sldLayout xmlns:a="http://schemas.openxmlformats.org/drawingml/2006/main" xmlns:r="http://schemas.openxmlformats.org/officeDocument/2006/relationships" xmlns:p="http://schemas.openxmlformats.org/presentationml/2006/main">
   <p:cSld name="Subtitle">
     <p:bg>
       <p:bgPr>
@@ -1873,11 +2040,12 @@
             <a:fillRect/>
           </a:stretch>
         </a:blipFill>
+        <a:effectLst/>
       </p:bgPr>
     </p:bg>
     <p:spTree>
       <p:nvGrpSpPr>
-        <p:cNvPr id="16" name="Shape 16"/>
+        <p:cNvPr id="1" name="Shape 16"/>
         <p:cNvGrpSpPr/>
         <p:nvPr/>
       </p:nvGrpSpPr>
@@ -1913,7 +2081,7 @@
           </a:ln>
         </p:spPr>
         <p:txBody>
-          <a:bodyPr anchorCtr="0" anchor="ctr" bIns="91425" lIns="91425" rIns="91425" tIns="91425">
+          <a:bodyPr lIns="91425" tIns="91425" rIns="91425" bIns="91425" anchor="ctr" anchorCtr="0">
             <a:noAutofit/>
           </a:bodyPr>
           <a:lstStyle/>
@@ -1924,9 +2092,6 @@
               </a:spcBef>
               <a:buNone/>
             </a:pPr>
-            <a:r>
-              <a:t/>
-            </a:r>
             <a:endParaRPr/>
           </a:p>
         </p:txBody>
@@ -1955,7 +2120,7 @@
           </a:ln>
         </p:spPr>
         <p:txBody>
-          <a:bodyPr anchorCtr="0" anchor="ctr" bIns="91425" lIns="91425" rIns="91425" tIns="91425">
+          <a:bodyPr lIns="91425" tIns="91425" rIns="91425" bIns="91425" anchor="ctr" anchorCtr="0">
             <a:noAutofit/>
           </a:bodyPr>
           <a:lstStyle/>
@@ -1966,9 +2131,6 @@
               </a:spcBef>
               <a:buNone/>
             </a:pPr>
-            <a:r>
-              <a:t/>
-            </a:r>
             <a:endParaRPr/>
           </a:p>
         </p:txBody>
@@ -1976,9 +2138,11 @@
       <p:sp>
         <p:nvSpPr>
           <p:cNvPr id="19" name="Shape 19"/>
-          <p:cNvSpPr txBox="1"/>
+          <p:cNvSpPr txBox="1">
+            <a:spLocks noGrp="1"/>
+          </p:cNvSpPr>
           <p:nvPr>
-            <p:ph idx="1" type="subTitle"/>
+            <p:ph type="subTitle" idx="1"/>
           </p:nvPr>
         </p:nvSpPr>
         <p:spPr>
@@ -1995,9 +2159,9 @@
           </a:ln>
         </p:spPr>
         <p:txBody>
-          <a:bodyPr anchorCtr="0" anchor="t" bIns="91425" lIns="91425" rIns="91425" tIns="91425"/>
+          <a:bodyPr lIns="91425" tIns="91425" rIns="91425" bIns="91425" anchor="t" anchorCtr="0"/>
           <a:lstStyle>
-            <a:lvl1pPr lvl="0" rtl="0" algn="ctr">
+            <a:lvl1pPr lvl="0" algn="ctr" rtl="0">
               <a:spcBef>
                 <a:spcPts val="0"/>
               </a:spcBef>
@@ -2016,7 +2180,7 @@
                 <a:sym typeface="Muli"/>
               </a:defRPr>
             </a:lvl1pPr>
-            <a:lvl2pPr lvl="1" rtl="0" algn="ctr">
+            <a:lvl2pPr lvl="1" algn="ctr" rtl="0">
               <a:spcBef>
                 <a:spcPts val="0"/>
               </a:spcBef>
@@ -2035,7 +2199,7 @@
                 <a:sym typeface="Muli"/>
               </a:defRPr>
             </a:lvl2pPr>
-            <a:lvl3pPr lvl="2" rtl="0" algn="ctr">
+            <a:lvl3pPr lvl="2" algn="ctr" rtl="0">
               <a:spcBef>
                 <a:spcPts val="0"/>
               </a:spcBef>
@@ -2054,7 +2218,7 @@
                 <a:sym typeface="Muli"/>
               </a:defRPr>
             </a:lvl3pPr>
-            <a:lvl4pPr lvl="3" rtl="0" algn="ctr">
+            <a:lvl4pPr lvl="3" algn="ctr" rtl="0">
               <a:spcBef>
                 <a:spcPts val="0"/>
               </a:spcBef>
@@ -2073,7 +2237,7 @@
                 <a:sym typeface="Muli"/>
               </a:defRPr>
             </a:lvl4pPr>
-            <a:lvl5pPr lvl="4" rtl="0" algn="ctr">
+            <a:lvl5pPr lvl="4" algn="ctr" rtl="0">
               <a:spcBef>
                 <a:spcPts val="0"/>
               </a:spcBef>
@@ -2092,7 +2256,7 @@
                 <a:sym typeface="Muli"/>
               </a:defRPr>
             </a:lvl5pPr>
-            <a:lvl6pPr lvl="5" rtl="0" algn="ctr">
+            <a:lvl6pPr lvl="5" algn="ctr" rtl="0">
               <a:spcBef>
                 <a:spcPts val="0"/>
               </a:spcBef>
@@ -2111,7 +2275,7 @@
                 <a:sym typeface="Muli"/>
               </a:defRPr>
             </a:lvl6pPr>
-            <a:lvl7pPr lvl="6" rtl="0" algn="ctr">
+            <a:lvl7pPr lvl="6" algn="ctr" rtl="0">
               <a:spcBef>
                 <a:spcPts val="0"/>
               </a:spcBef>
@@ -2130,7 +2294,7 @@
                 <a:sym typeface="Muli"/>
               </a:defRPr>
             </a:lvl7pPr>
-            <a:lvl8pPr lvl="7" rtl="0" algn="ctr">
+            <a:lvl8pPr lvl="7" algn="ctr" rtl="0">
               <a:spcBef>
                 <a:spcPts val="0"/>
               </a:spcBef>
@@ -2149,7 +2313,7 @@
                 <a:sym typeface="Muli"/>
               </a:defRPr>
             </a:lvl8pPr>
-            <a:lvl9pPr lvl="8" rtl="0" algn="ctr">
+            <a:lvl9pPr lvl="8" algn="ctr" rtl="0">
               <a:spcBef>
                 <a:spcPts val="0"/>
               </a:spcBef>
@@ -2169,13 +2333,17 @@
               </a:defRPr>
             </a:lvl9pPr>
           </a:lstStyle>
-          <a:p/>
+          <a:p>
+            <a:endParaRPr/>
+          </a:p>
         </p:txBody>
       </p:sp>
       <p:sp>
         <p:nvSpPr>
           <p:cNvPr id="20" name="Shape 20"/>
-          <p:cNvSpPr txBox="1"/>
+          <p:cNvSpPr txBox="1">
+            <a:spLocks noGrp="1"/>
+          </p:cNvSpPr>
           <p:nvPr>
             <p:ph type="title"/>
           </p:nvPr>
@@ -2194,9 +2362,9 @@
           </a:ln>
         </p:spPr>
         <p:txBody>
-          <a:bodyPr anchorCtr="0" anchor="b" bIns="91425" lIns="91425" rIns="91425" tIns="91425"/>
+          <a:bodyPr lIns="91425" tIns="91425" rIns="91425" bIns="91425" anchor="b" anchorCtr="0"/>
           <a:lstStyle>
-            <a:lvl1pPr lvl="0" rtl="0" algn="ctr">
+            <a:lvl1pPr lvl="0" algn="ctr" rtl="0">
               <a:spcBef>
                 <a:spcPts val="0"/>
               </a:spcBef>
@@ -2264,7 +2432,9 @@
               <a:defRPr sz="2400"/>
             </a:lvl9pPr>
           </a:lstStyle>
-          <a:p/>
+          <a:p>
+            <a:endParaRPr/>
+          </a:p>
         </p:txBody>
       </p:sp>
     </p:spTree>
@@ -2276,7 +2446,7 @@
 </file>
 
 <file path=ppt/slideLayouts/slideLayout4.xml><?xml version="1.0" encoding="utf-8"?>
-<p:sldLayout xmlns:a="http://schemas.openxmlformats.org/drawingml/2006/main" xmlns:r="http://schemas.openxmlformats.org/officeDocument/2006/relationships" xmlns:mc="http://schemas.openxmlformats.org/markup-compatibility/2006" xmlns:mv="urn:schemas-microsoft-com:mac:vml" xmlns:p="http://schemas.openxmlformats.org/presentationml/2006/main" xmlns:c="http://schemas.openxmlformats.org/drawingml/2006/chart" xmlns:dgm="http://schemas.openxmlformats.org/drawingml/2006/diagram" xmlns:o="urn:schemas-microsoft-com:office:office" xmlns:v="urn:schemas-microsoft-com:vml" xmlns:pvml="urn:schemas-microsoft-com:office:powerpoint" xmlns:com="http://schemas.openxmlformats.org/drawingml/2006/compatibility" xmlns:p14="http://schemas.microsoft.com/office/powerpoint/2010/main">
+<p:sldLayout xmlns:a="http://schemas.openxmlformats.org/drawingml/2006/main" xmlns:r="http://schemas.openxmlformats.org/officeDocument/2006/relationships" xmlns:p="http://schemas.openxmlformats.org/presentationml/2006/main">
   <p:cSld name="Quote">
     <p:bg>
       <p:bgPr>
@@ -2288,11 +2458,12 @@
             <a:fillRect/>
           </a:stretch>
         </a:blipFill>
+        <a:effectLst/>
       </p:bgPr>
     </p:bg>
     <p:spTree>
       <p:nvGrpSpPr>
-        <p:cNvPr id="21" name="Shape 21"/>
+        <p:cNvPr id="1" name="Shape 21"/>
         <p:cNvGrpSpPr/>
         <p:nvPr/>
       </p:nvGrpSpPr>
@@ -2328,7 +2499,7 @@
           </a:ln>
         </p:spPr>
         <p:txBody>
-          <a:bodyPr anchorCtr="0" anchor="ctr" bIns="91425" lIns="91425" rIns="91425" tIns="91425">
+          <a:bodyPr lIns="91425" tIns="91425" rIns="91425" bIns="91425" anchor="ctr" anchorCtr="0">
             <a:noAutofit/>
           </a:bodyPr>
           <a:lstStyle/>
@@ -2339,9 +2510,6 @@
               </a:spcBef>
               <a:buNone/>
             </a:pPr>
-            <a:r>
-              <a:t/>
-            </a:r>
             <a:endParaRPr/>
           </a:p>
         </p:txBody>
@@ -2370,7 +2538,7 @@
           </a:ln>
         </p:spPr>
         <p:txBody>
-          <a:bodyPr anchorCtr="0" anchor="ctr" bIns="91425" lIns="91425" rIns="91425" tIns="91425">
+          <a:bodyPr lIns="91425" tIns="91425" rIns="91425" bIns="91425" anchor="ctr" anchorCtr="0">
             <a:noAutofit/>
           </a:bodyPr>
           <a:lstStyle/>
@@ -2381,9 +2549,6 @@
               </a:spcBef>
               <a:buNone/>
             </a:pPr>
-            <a:r>
-              <a:t/>
-            </a:r>
             <a:endParaRPr/>
           </a:p>
         </p:txBody>
@@ -2391,9 +2556,11 @@
       <p:sp>
         <p:nvSpPr>
           <p:cNvPr id="24" name="Shape 24"/>
-          <p:cNvSpPr txBox="1"/>
+          <p:cNvSpPr txBox="1">
+            <a:spLocks noGrp="1"/>
+          </p:cNvSpPr>
           <p:nvPr>
-            <p:ph idx="1" type="body"/>
+            <p:ph type="body" idx="1"/>
           </p:nvPr>
         </p:nvSpPr>
         <p:spPr>
@@ -2410,9 +2577,9 @@
           </a:ln>
         </p:spPr>
         <p:txBody>
-          <a:bodyPr anchorCtr="0" anchor="ctr" bIns="91425" lIns="91425" rIns="91425" tIns="91425"/>
+          <a:bodyPr lIns="91425" tIns="91425" rIns="91425" bIns="91425" anchor="ctr" anchorCtr="0"/>
           <a:lstStyle>
-            <a:lvl1pPr lvl="0" rtl="0" algn="ctr">
+            <a:lvl1pPr lvl="0" algn="ctr" rtl="0">
               <a:spcBef>
                 <a:spcPts val="0"/>
               </a:spcBef>
@@ -2421,7 +2588,7 @@
               </a:buClr>
               <a:buSzPct val="100000"/>
               <a:buFont typeface="Georgia"/>
-              <a:defRPr i="1" sz="1600">
+              <a:defRPr sz="1600" i="1">
                 <a:solidFill>
                   <a:srgbClr val="E0C391"/>
                 </a:solidFill>
@@ -2431,7 +2598,7 @@
                 <a:sym typeface="Georgia"/>
               </a:defRPr>
             </a:lvl1pPr>
-            <a:lvl2pPr lvl="1" rtl="0" algn="ctr">
+            <a:lvl2pPr lvl="1" algn="ctr" rtl="0">
               <a:spcBef>
                 <a:spcPts val="0"/>
               </a:spcBef>
@@ -2440,7 +2607,7 @@
               </a:buClr>
               <a:buSzPct val="100000"/>
               <a:buFont typeface="Georgia"/>
-              <a:defRPr i="1" sz="1600">
+              <a:defRPr sz="1600" i="1">
                 <a:solidFill>
                   <a:srgbClr val="E0C391"/>
                 </a:solidFill>
@@ -2450,7 +2617,7 @@
                 <a:sym typeface="Georgia"/>
               </a:defRPr>
             </a:lvl2pPr>
-            <a:lvl3pPr lvl="2" rtl="0" algn="ctr">
+            <a:lvl3pPr lvl="2" algn="ctr" rtl="0">
               <a:spcBef>
                 <a:spcPts val="0"/>
               </a:spcBef>
@@ -2459,7 +2626,7 @@
               </a:buClr>
               <a:buSzPct val="100000"/>
               <a:buFont typeface="Georgia"/>
-              <a:defRPr i="1" sz="1600">
+              <a:defRPr sz="1600" i="1">
                 <a:solidFill>
                   <a:srgbClr val="E0C391"/>
                 </a:solidFill>
@@ -2469,7 +2636,7 @@
                 <a:sym typeface="Georgia"/>
               </a:defRPr>
             </a:lvl3pPr>
-            <a:lvl4pPr lvl="3" rtl="0" algn="ctr">
+            <a:lvl4pPr lvl="3" algn="ctr" rtl="0">
               <a:spcBef>
                 <a:spcPts val="0"/>
               </a:spcBef>
@@ -2478,7 +2645,7 @@
               </a:buClr>
               <a:buSzPct val="100000"/>
               <a:buFont typeface="Georgia"/>
-              <a:defRPr i="1" sz="1600">
+              <a:defRPr sz="1600" i="1">
                 <a:solidFill>
                   <a:srgbClr val="E0C391"/>
                 </a:solidFill>
@@ -2488,7 +2655,7 @@
                 <a:sym typeface="Georgia"/>
               </a:defRPr>
             </a:lvl4pPr>
-            <a:lvl5pPr lvl="4" rtl="0" algn="ctr">
+            <a:lvl5pPr lvl="4" algn="ctr" rtl="0">
               <a:spcBef>
                 <a:spcPts val="0"/>
               </a:spcBef>
@@ -2497,7 +2664,7 @@
               </a:buClr>
               <a:buSzPct val="100000"/>
               <a:buFont typeface="Georgia"/>
-              <a:defRPr i="1" sz="1600">
+              <a:defRPr sz="1600" i="1">
                 <a:solidFill>
                   <a:srgbClr val="E0C391"/>
                 </a:solidFill>
@@ -2507,7 +2674,7 @@
                 <a:sym typeface="Georgia"/>
               </a:defRPr>
             </a:lvl5pPr>
-            <a:lvl6pPr lvl="5" rtl="0" algn="ctr">
+            <a:lvl6pPr lvl="5" algn="ctr" rtl="0">
               <a:spcBef>
                 <a:spcPts val="0"/>
               </a:spcBef>
@@ -2516,7 +2683,7 @@
               </a:buClr>
               <a:buSzPct val="100000"/>
               <a:buFont typeface="Georgia"/>
-              <a:defRPr i="1" sz="1600">
+              <a:defRPr sz="1600" i="1">
                 <a:solidFill>
                   <a:srgbClr val="E0C391"/>
                 </a:solidFill>
@@ -2526,7 +2693,7 @@
                 <a:sym typeface="Georgia"/>
               </a:defRPr>
             </a:lvl6pPr>
-            <a:lvl7pPr lvl="6" rtl="0" algn="ctr">
+            <a:lvl7pPr lvl="6" algn="ctr" rtl="0">
               <a:spcBef>
                 <a:spcPts val="0"/>
               </a:spcBef>
@@ -2535,7 +2702,7 @@
               </a:buClr>
               <a:buSzPct val="100000"/>
               <a:buFont typeface="Georgia"/>
-              <a:defRPr i="1" sz="1600">
+              <a:defRPr sz="1600" i="1">
                 <a:solidFill>
                   <a:srgbClr val="E0C391"/>
                 </a:solidFill>
@@ -2545,7 +2712,7 @@
                 <a:sym typeface="Georgia"/>
               </a:defRPr>
             </a:lvl7pPr>
-            <a:lvl8pPr lvl="7" rtl="0" algn="ctr">
+            <a:lvl8pPr lvl="7" algn="ctr" rtl="0">
               <a:spcBef>
                 <a:spcPts val="0"/>
               </a:spcBef>
@@ -2554,7 +2721,7 @@
               </a:buClr>
               <a:buSzPct val="100000"/>
               <a:buFont typeface="Georgia"/>
-              <a:defRPr i="1" sz="1600">
+              <a:defRPr sz="1600" i="1">
                 <a:solidFill>
                   <a:srgbClr val="E0C391"/>
                 </a:solidFill>
@@ -2573,7 +2740,7 @@
               </a:buClr>
               <a:buSzPct val="100000"/>
               <a:buFont typeface="Georgia"/>
-              <a:defRPr i="1" sz="1600">
+              <a:defRPr sz="1600" i="1">
                 <a:solidFill>
                   <a:srgbClr val="E0C391"/>
                 </a:solidFill>
@@ -2584,7 +2751,9 @@
               </a:defRPr>
             </a:lvl9pPr>
           </a:lstStyle>
-          <a:p/>
+          <a:p>
+            <a:endParaRPr/>
+          </a:p>
         </p:txBody>
       </p:sp>
     </p:spTree>
@@ -2596,7 +2765,7 @@
 </file>
 
 <file path=ppt/slideLayouts/slideLayout5.xml><?xml version="1.0" encoding="utf-8"?>
-<p:sldLayout xmlns:a="http://schemas.openxmlformats.org/drawingml/2006/main" xmlns:r="http://schemas.openxmlformats.org/officeDocument/2006/relationships" xmlns:mc="http://schemas.openxmlformats.org/markup-compatibility/2006" xmlns:mv="urn:schemas-microsoft-com:mac:vml" xmlns:p="http://schemas.openxmlformats.org/presentationml/2006/main" xmlns:c="http://schemas.openxmlformats.org/drawingml/2006/chart" xmlns:dgm="http://schemas.openxmlformats.org/drawingml/2006/diagram" xmlns:o="urn:schemas-microsoft-com:office:office" xmlns:v="urn:schemas-microsoft-com:vml" xmlns:pvml="urn:schemas-microsoft-com:office:powerpoint" xmlns:com="http://schemas.openxmlformats.org/drawingml/2006/compatibility" xmlns:p14="http://schemas.microsoft.com/office/powerpoint/2010/main" type="tx">
+<p:sldLayout xmlns:a="http://schemas.openxmlformats.org/drawingml/2006/main" xmlns:r="http://schemas.openxmlformats.org/officeDocument/2006/relationships" xmlns:p="http://schemas.openxmlformats.org/presentationml/2006/main" type="tx">
   <p:cSld name="Title + 1 column">
     <p:bg>
       <p:bgPr>
@@ -2608,11 +2777,12 @@
             <a:fillRect/>
           </a:stretch>
         </a:blipFill>
+        <a:effectLst/>
       </p:bgPr>
     </p:bg>
     <p:spTree>
       <p:nvGrpSpPr>
-        <p:cNvPr id="25" name="Shape 25"/>
+        <p:cNvPr id="1" name="Shape 25"/>
         <p:cNvGrpSpPr/>
         <p:nvPr/>
       </p:nvGrpSpPr>
@@ -2648,7 +2818,7 @@
           </a:ln>
         </p:spPr>
         <p:txBody>
-          <a:bodyPr anchorCtr="0" anchor="ctr" bIns="91425" lIns="91425" rIns="91425" tIns="91425">
+          <a:bodyPr lIns="91425" tIns="91425" rIns="91425" bIns="91425" anchor="ctr" anchorCtr="0">
             <a:noAutofit/>
           </a:bodyPr>
           <a:lstStyle/>
@@ -2659,9 +2829,6 @@
               </a:spcBef>
               <a:buNone/>
             </a:pPr>
-            <a:r>
-              <a:t/>
-            </a:r>
             <a:endParaRPr/>
           </a:p>
         </p:txBody>
@@ -2690,7 +2857,7 @@
           </a:ln>
         </p:spPr>
         <p:txBody>
-          <a:bodyPr anchorCtr="0" anchor="ctr" bIns="91425" lIns="91425" rIns="91425" tIns="91425">
+          <a:bodyPr lIns="91425" tIns="91425" rIns="91425" bIns="91425" anchor="ctr" anchorCtr="0">
             <a:noAutofit/>
           </a:bodyPr>
           <a:lstStyle/>
@@ -2701,9 +2868,6 @@
               </a:spcBef>
               <a:buNone/>
             </a:pPr>
-            <a:r>
-              <a:t/>
-            </a:r>
             <a:endParaRPr/>
           </a:p>
         </p:txBody>
@@ -2711,7 +2875,9 @@
       <p:sp>
         <p:nvSpPr>
           <p:cNvPr id="28" name="Shape 28"/>
-          <p:cNvSpPr txBox="1"/>
+          <p:cNvSpPr txBox="1">
+            <a:spLocks noGrp="1"/>
+          </p:cNvSpPr>
           <p:nvPr>
             <p:ph type="title"/>
           </p:nvPr>
@@ -2726,14 +2892,14 @@
           </a:prstGeom>
         </p:spPr>
         <p:txBody>
-          <a:bodyPr anchorCtr="0" anchor="t" bIns="91425" lIns="91425" rIns="91425" tIns="91425"/>
+          <a:bodyPr lIns="91425" tIns="91425" rIns="91425" bIns="91425" anchor="t" anchorCtr="0"/>
           <a:lstStyle>
             <a:lvl1pPr lvl="0" rtl="0">
               <a:spcBef>
                 <a:spcPts val="0"/>
               </a:spcBef>
               <a:buNone/>
-              <a:defRPr b="1" sz="1800">
+              <a:defRPr sz="1800" b="1">
                 <a:solidFill>
                   <a:srgbClr val="E0C391"/>
                 </a:solidFill>
@@ -2748,7 +2914,7 @@
                 <a:spcPts val="0"/>
               </a:spcBef>
               <a:buNone/>
-              <a:defRPr b="1" sz="1800">
+              <a:defRPr sz="1800" b="1">
                 <a:solidFill>
                   <a:srgbClr val="FFFFFF"/>
                 </a:solidFill>
@@ -2763,7 +2929,7 @@
                 <a:spcPts val="0"/>
               </a:spcBef>
               <a:buNone/>
-              <a:defRPr b="1" sz="1800">
+              <a:defRPr sz="1800" b="1">
                 <a:solidFill>
                   <a:srgbClr val="FFFFFF"/>
                 </a:solidFill>
@@ -2778,7 +2944,7 @@
                 <a:spcPts val="0"/>
               </a:spcBef>
               <a:buNone/>
-              <a:defRPr b="1" sz="1800">
+              <a:defRPr sz="1800" b="1">
                 <a:solidFill>
                   <a:srgbClr val="FFFFFF"/>
                 </a:solidFill>
@@ -2793,7 +2959,7 @@
                 <a:spcPts val="0"/>
               </a:spcBef>
               <a:buNone/>
-              <a:defRPr b="1" sz="1800">
+              <a:defRPr sz="1800" b="1">
                 <a:solidFill>
                   <a:srgbClr val="FFFFFF"/>
                 </a:solidFill>
@@ -2808,7 +2974,7 @@
                 <a:spcPts val="0"/>
               </a:spcBef>
               <a:buNone/>
-              <a:defRPr b="1" sz="1800">
+              <a:defRPr sz="1800" b="1">
                 <a:solidFill>
                   <a:srgbClr val="FFFFFF"/>
                 </a:solidFill>
@@ -2823,7 +2989,7 @@
                 <a:spcPts val="0"/>
               </a:spcBef>
               <a:buNone/>
-              <a:defRPr b="1" sz="1800">
+              <a:defRPr sz="1800" b="1">
                 <a:solidFill>
                   <a:srgbClr val="FFFFFF"/>
                 </a:solidFill>
@@ -2838,7 +3004,7 @@
                 <a:spcPts val="0"/>
               </a:spcBef>
               <a:buNone/>
-              <a:defRPr b="1" sz="1800">
+              <a:defRPr sz="1800" b="1">
                 <a:solidFill>
                   <a:srgbClr val="FFFFFF"/>
                 </a:solidFill>
@@ -2853,7 +3019,7 @@
                 <a:spcPts val="0"/>
               </a:spcBef>
               <a:buNone/>
-              <a:defRPr b="1" sz="1800">
+              <a:defRPr sz="1800" b="1">
                 <a:solidFill>
                   <a:srgbClr val="FFFFFF"/>
                 </a:solidFill>
@@ -2864,15 +3030,19 @@
               </a:defRPr>
             </a:lvl9pPr>
           </a:lstStyle>
-          <a:p/>
+          <a:p>
+            <a:endParaRPr/>
+          </a:p>
         </p:txBody>
       </p:sp>
       <p:sp>
         <p:nvSpPr>
           <p:cNvPr id="29" name="Shape 29"/>
-          <p:cNvSpPr txBox="1"/>
+          <p:cNvSpPr txBox="1">
+            <a:spLocks noGrp="1"/>
+          </p:cNvSpPr>
           <p:nvPr>
-            <p:ph idx="1" type="body"/>
+            <p:ph type="body" idx="1"/>
           </p:nvPr>
         </p:nvSpPr>
         <p:spPr>
@@ -2885,7 +3055,7 @@
           </a:prstGeom>
         </p:spPr>
         <p:txBody>
-          <a:bodyPr anchorCtr="0" anchor="t" bIns="91425" lIns="91425" rIns="91425" tIns="91425"/>
+          <a:bodyPr lIns="91425" tIns="91425" rIns="91425" bIns="91425" anchor="t" anchorCtr="0"/>
           <a:lstStyle>
             <a:lvl1pPr lvl="0" rtl="0">
               <a:spcBef>
@@ -3060,7 +3230,9 @@
               </a:defRPr>
             </a:lvl9pPr>
           </a:lstStyle>
-          <a:p/>
+          <a:p>
+            <a:endParaRPr/>
+          </a:p>
         </p:txBody>
       </p:sp>
     </p:spTree>
@@ -3072,7 +3244,7 @@
 </file>
 
 <file path=ppt/slideLayouts/slideLayout6.xml><?xml version="1.0" encoding="utf-8"?>
-<p:sldLayout xmlns:a="http://schemas.openxmlformats.org/drawingml/2006/main" xmlns:r="http://schemas.openxmlformats.org/officeDocument/2006/relationships" xmlns:mc="http://schemas.openxmlformats.org/markup-compatibility/2006" xmlns:mv="urn:schemas-microsoft-com:mac:vml" xmlns:p="http://schemas.openxmlformats.org/presentationml/2006/main" xmlns:c="http://schemas.openxmlformats.org/drawingml/2006/chart" xmlns:dgm="http://schemas.openxmlformats.org/drawingml/2006/diagram" xmlns:o="urn:schemas-microsoft-com:office:office" xmlns:v="urn:schemas-microsoft-com:vml" xmlns:pvml="urn:schemas-microsoft-com:office:powerpoint" xmlns:com="http://schemas.openxmlformats.org/drawingml/2006/compatibility" xmlns:p14="http://schemas.microsoft.com/office/powerpoint/2010/main">
+<p:sldLayout xmlns:a="http://schemas.openxmlformats.org/drawingml/2006/main" xmlns:r="http://schemas.openxmlformats.org/officeDocument/2006/relationships" xmlns:p="http://schemas.openxmlformats.org/presentationml/2006/main">
   <p:cSld name="Title + 1 column half">
     <p:bg>
       <p:bgPr>
@@ -3084,11 +3256,12 @@
             <a:fillRect/>
           </a:stretch>
         </a:blipFill>
+        <a:effectLst/>
       </p:bgPr>
     </p:bg>
     <p:spTree>
       <p:nvGrpSpPr>
-        <p:cNvPr id="30" name="Shape 30"/>
+        <p:cNvPr id="1" name="Shape 30"/>
         <p:cNvGrpSpPr/>
         <p:nvPr/>
       </p:nvGrpSpPr>
@@ -3124,7 +3297,7 @@
           </a:ln>
         </p:spPr>
         <p:txBody>
-          <a:bodyPr anchorCtr="0" anchor="ctr" bIns="91425" lIns="91425" rIns="91425" tIns="91425">
+          <a:bodyPr lIns="91425" tIns="91425" rIns="91425" bIns="91425" anchor="ctr" anchorCtr="0">
             <a:noAutofit/>
           </a:bodyPr>
           <a:lstStyle/>
@@ -3135,9 +3308,6 @@
               </a:spcBef>
               <a:buNone/>
             </a:pPr>
-            <a:r>
-              <a:t/>
-            </a:r>
             <a:endParaRPr/>
           </a:p>
         </p:txBody>
@@ -3145,7 +3315,9 @@
       <p:sp>
         <p:nvSpPr>
           <p:cNvPr id="32" name="Shape 32"/>
-          <p:cNvSpPr txBox="1"/>
+          <p:cNvSpPr txBox="1">
+            <a:spLocks noGrp="1"/>
+          </p:cNvSpPr>
           <p:nvPr>
             <p:ph type="title"/>
           </p:nvPr>
@@ -3160,14 +3332,14 @@
           </a:prstGeom>
         </p:spPr>
         <p:txBody>
-          <a:bodyPr anchorCtr="0" anchor="t" bIns="91425" lIns="91425" rIns="91425" tIns="91425"/>
+          <a:bodyPr lIns="91425" tIns="91425" rIns="91425" bIns="91425" anchor="t" anchorCtr="0"/>
           <a:lstStyle>
             <a:lvl1pPr lvl="0" rtl="0">
               <a:spcBef>
                 <a:spcPts val="0"/>
               </a:spcBef>
               <a:buNone/>
-              <a:defRPr b="1" sz="1800">
+              <a:defRPr sz="1800" b="1">
                 <a:solidFill>
                   <a:srgbClr val="E0C391"/>
                 </a:solidFill>
@@ -3182,7 +3354,7 @@
                 <a:spcPts val="0"/>
               </a:spcBef>
               <a:buNone/>
-              <a:defRPr b="1" sz="1800">
+              <a:defRPr sz="1800" b="1">
                 <a:solidFill>
                   <a:srgbClr val="FFFFFF"/>
                 </a:solidFill>
@@ -3197,7 +3369,7 @@
                 <a:spcPts val="0"/>
               </a:spcBef>
               <a:buNone/>
-              <a:defRPr b="1" sz="1800">
+              <a:defRPr sz="1800" b="1">
                 <a:solidFill>
                   <a:srgbClr val="FFFFFF"/>
                 </a:solidFill>
@@ -3212,7 +3384,7 @@
                 <a:spcPts val="0"/>
               </a:spcBef>
               <a:buNone/>
-              <a:defRPr b="1" sz="1800">
+              <a:defRPr sz="1800" b="1">
                 <a:solidFill>
                   <a:srgbClr val="FFFFFF"/>
                 </a:solidFill>
@@ -3227,7 +3399,7 @@
                 <a:spcPts val="0"/>
               </a:spcBef>
               <a:buNone/>
-              <a:defRPr b="1" sz="1800">
+              <a:defRPr sz="1800" b="1">
                 <a:solidFill>
                   <a:srgbClr val="FFFFFF"/>
                 </a:solidFill>
@@ -3242,7 +3414,7 @@
                 <a:spcPts val="0"/>
               </a:spcBef>
               <a:buNone/>
-              <a:defRPr b="1" sz="1800">
+              <a:defRPr sz="1800" b="1">
                 <a:solidFill>
                   <a:srgbClr val="FFFFFF"/>
                 </a:solidFill>
@@ -3257,7 +3429,7 @@
                 <a:spcPts val="0"/>
               </a:spcBef>
               <a:buNone/>
-              <a:defRPr b="1" sz="1800">
+              <a:defRPr sz="1800" b="1">
                 <a:solidFill>
                   <a:srgbClr val="FFFFFF"/>
                 </a:solidFill>
@@ -3272,7 +3444,7 @@
                 <a:spcPts val="0"/>
               </a:spcBef>
               <a:buNone/>
-              <a:defRPr b="1" sz="1800">
+              <a:defRPr sz="1800" b="1">
                 <a:solidFill>
                   <a:srgbClr val="FFFFFF"/>
                 </a:solidFill>
@@ -3287,7 +3459,7 @@
                 <a:spcPts val="0"/>
               </a:spcBef>
               <a:buNone/>
-              <a:defRPr b="1" sz="1800">
+              <a:defRPr sz="1800" b="1">
                 <a:solidFill>
                   <a:srgbClr val="FFFFFF"/>
                 </a:solidFill>
@@ -3298,15 +3470,19 @@
               </a:defRPr>
             </a:lvl9pPr>
           </a:lstStyle>
-          <a:p/>
+          <a:p>
+            <a:endParaRPr/>
+          </a:p>
         </p:txBody>
       </p:sp>
       <p:sp>
         <p:nvSpPr>
           <p:cNvPr id="33" name="Shape 33"/>
-          <p:cNvSpPr txBox="1"/>
+          <p:cNvSpPr txBox="1">
+            <a:spLocks noGrp="1"/>
+          </p:cNvSpPr>
           <p:nvPr>
-            <p:ph idx="1" type="body"/>
+            <p:ph type="body" idx="1"/>
           </p:nvPr>
         </p:nvSpPr>
         <p:spPr>
@@ -3319,7 +3495,7 @@
           </a:prstGeom>
         </p:spPr>
         <p:txBody>
-          <a:bodyPr anchorCtr="0" anchor="t" bIns="91425" lIns="91425" rIns="91425" tIns="91425"/>
+          <a:bodyPr lIns="91425" tIns="91425" rIns="91425" bIns="91425" anchor="t" anchorCtr="0"/>
           <a:lstStyle>
             <a:lvl1pPr lvl="0" rtl="0">
               <a:spcBef>
@@ -3494,7 +3670,9 @@
               </a:defRPr>
             </a:lvl9pPr>
           </a:lstStyle>
-          <a:p/>
+          <a:p>
+            <a:endParaRPr/>
+          </a:p>
         </p:txBody>
       </p:sp>
     </p:spTree>
@@ -3506,7 +3684,7 @@
 </file>
 
 <file path=ppt/slideLayouts/slideLayout7.xml><?xml version="1.0" encoding="utf-8"?>
-<p:sldLayout xmlns:a="http://schemas.openxmlformats.org/drawingml/2006/main" xmlns:r="http://schemas.openxmlformats.org/officeDocument/2006/relationships" xmlns:mc="http://schemas.openxmlformats.org/markup-compatibility/2006" xmlns:mv="urn:schemas-microsoft-com:mac:vml" xmlns:p="http://schemas.openxmlformats.org/presentationml/2006/main" xmlns:c="http://schemas.openxmlformats.org/drawingml/2006/chart" xmlns:dgm="http://schemas.openxmlformats.org/drawingml/2006/diagram" xmlns:o="urn:schemas-microsoft-com:office:office" xmlns:v="urn:schemas-microsoft-com:vml" xmlns:pvml="urn:schemas-microsoft-com:office:powerpoint" xmlns:com="http://schemas.openxmlformats.org/drawingml/2006/compatibility" xmlns:p14="http://schemas.microsoft.com/office/powerpoint/2010/main" type="twoColTx">
+<p:sldLayout xmlns:a="http://schemas.openxmlformats.org/drawingml/2006/main" xmlns:r="http://schemas.openxmlformats.org/officeDocument/2006/relationships" xmlns:p="http://schemas.openxmlformats.org/presentationml/2006/main" type="twoColTx">
   <p:cSld name="Title + 2 columns">
     <p:bg>
       <p:bgPr>
@@ -3518,11 +3696,12 @@
             <a:fillRect/>
           </a:stretch>
         </a:blipFill>
+        <a:effectLst/>
       </p:bgPr>
     </p:bg>
     <p:spTree>
       <p:nvGrpSpPr>
-        <p:cNvPr id="34" name="Shape 34"/>
+        <p:cNvPr id="1" name="Shape 34"/>
         <p:cNvGrpSpPr/>
         <p:nvPr/>
       </p:nvGrpSpPr>
@@ -3558,7 +3737,7 @@
           </a:ln>
         </p:spPr>
         <p:txBody>
-          <a:bodyPr anchorCtr="0" anchor="ctr" bIns="91425" lIns="91425" rIns="91425" tIns="91425">
+          <a:bodyPr lIns="91425" tIns="91425" rIns="91425" bIns="91425" anchor="ctr" anchorCtr="0">
             <a:noAutofit/>
           </a:bodyPr>
           <a:lstStyle/>
@@ -3569,9 +3748,6 @@
               </a:spcBef>
               <a:buNone/>
             </a:pPr>
-            <a:r>
-              <a:t/>
-            </a:r>
             <a:endParaRPr/>
           </a:p>
         </p:txBody>
@@ -3600,7 +3776,7 @@
           </a:ln>
         </p:spPr>
         <p:txBody>
-          <a:bodyPr anchorCtr="0" anchor="ctr" bIns="91425" lIns="91425" rIns="91425" tIns="91425">
+          <a:bodyPr lIns="91425" tIns="91425" rIns="91425" bIns="91425" anchor="ctr" anchorCtr="0">
             <a:noAutofit/>
           </a:bodyPr>
           <a:lstStyle/>
@@ -3611,9 +3787,6 @@
               </a:spcBef>
               <a:buNone/>
             </a:pPr>
-            <a:r>
-              <a:t/>
-            </a:r>
             <a:endParaRPr/>
           </a:p>
         </p:txBody>
@@ -3621,7 +3794,9 @@
       <p:sp>
         <p:nvSpPr>
           <p:cNvPr id="37" name="Shape 37"/>
-          <p:cNvSpPr txBox="1"/>
+          <p:cNvSpPr txBox="1">
+            <a:spLocks noGrp="1"/>
+          </p:cNvSpPr>
           <p:nvPr>
             <p:ph type="title"/>
           </p:nvPr>
@@ -3636,14 +3811,14 @@
           </a:prstGeom>
         </p:spPr>
         <p:txBody>
-          <a:bodyPr anchorCtr="0" anchor="t" bIns="91425" lIns="91425" rIns="91425" tIns="91425"/>
+          <a:bodyPr lIns="91425" tIns="91425" rIns="91425" bIns="91425" anchor="t" anchorCtr="0"/>
           <a:lstStyle>
             <a:lvl1pPr lvl="0" rtl="0">
               <a:spcBef>
                 <a:spcPts val="0"/>
               </a:spcBef>
               <a:buNone/>
-              <a:defRPr b="1" sz="1800">
+              <a:defRPr sz="1800" b="1">
                 <a:solidFill>
                   <a:srgbClr val="E0C391"/>
                 </a:solidFill>
@@ -3658,7 +3833,7 @@
                 <a:spcPts val="0"/>
               </a:spcBef>
               <a:buNone/>
-              <a:defRPr b="1" sz="1800">
+              <a:defRPr sz="1800" b="1">
                 <a:solidFill>
                   <a:srgbClr val="E0C391"/>
                 </a:solidFill>
@@ -3673,7 +3848,7 @@
                 <a:spcPts val="0"/>
               </a:spcBef>
               <a:buNone/>
-              <a:defRPr b="1" sz="1800">
+              <a:defRPr sz="1800" b="1">
                 <a:solidFill>
                   <a:srgbClr val="E0C391"/>
                 </a:solidFill>
@@ -3688,7 +3863,7 @@
                 <a:spcPts val="0"/>
               </a:spcBef>
               <a:buNone/>
-              <a:defRPr b="1" sz="1800">
+              <a:defRPr sz="1800" b="1">
                 <a:solidFill>
                   <a:srgbClr val="E0C391"/>
                 </a:solidFill>
@@ -3703,7 +3878,7 @@
                 <a:spcPts val="0"/>
               </a:spcBef>
               <a:buNone/>
-              <a:defRPr b="1" sz="1800">
+              <a:defRPr sz="1800" b="1">
                 <a:solidFill>
                   <a:srgbClr val="E0C391"/>
                 </a:solidFill>
@@ -3718,7 +3893,7 @@
                 <a:spcPts val="0"/>
               </a:spcBef>
               <a:buNone/>
-              <a:defRPr b="1" sz="1800">
+              <a:defRPr sz="1800" b="1">
                 <a:solidFill>
                   <a:srgbClr val="E0C391"/>
                 </a:solidFill>
@@ -3733,7 +3908,7 @@
                 <a:spcPts val="0"/>
               </a:spcBef>
               <a:buNone/>
-              <a:defRPr b="1" sz="1800">
+              <a:defRPr sz="1800" b="1">
                 <a:solidFill>
                   <a:srgbClr val="E0C391"/>
                 </a:solidFill>
@@ -3748,7 +3923,7 @@
                 <a:spcPts val="0"/>
               </a:spcBef>
               <a:buNone/>
-              <a:defRPr b="1" sz="1800">
+              <a:defRPr sz="1800" b="1">
                 <a:solidFill>
                   <a:srgbClr val="E0C391"/>
                 </a:solidFill>
@@ -3763,7 +3938,7 @@
                 <a:spcPts val="0"/>
               </a:spcBef>
               <a:buNone/>
-              <a:defRPr b="1" sz="1800">
+              <a:defRPr sz="1800" b="1">
                 <a:solidFill>
                   <a:srgbClr val="E0C391"/>
                 </a:solidFill>
@@ -3774,15 +3949,19 @@
               </a:defRPr>
             </a:lvl9pPr>
           </a:lstStyle>
-          <a:p/>
+          <a:p>
+            <a:endParaRPr/>
+          </a:p>
         </p:txBody>
       </p:sp>
       <p:sp>
         <p:nvSpPr>
           <p:cNvPr id="38" name="Shape 38"/>
-          <p:cNvSpPr txBox="1"/>
+          <p:cNvSpPr txBox="1">
+            <a:spLocks noGrp="1"/>
+          </p:cNvSpPr>
           <p:nvPr>
-            <p:ph idx="1" type="body"/>
+            <p:ph type="body" idx="1"/>
           </p:nvPr>
         </p:nvSpPr>
         <p:spPr>
@@ -3799,7 +3978,7 @@
           </a:ln>
         </p:spPr>
         <p:txBody>
-          <a:bodyPr anchorCtr="0" anchor="t" bIns="91425" lIns="91425" rIns="91425" tIns="91425"/>
+          <a:bodyPr lIns="91425" tIns="91425" rIns="91425" bIns="91425" anchor="t" anchorCtr="0"/>
           <a:lstStyle>
             <a:lvl1pPr lvl="0" rtl="0">
               <a:spcBef>
@@ -3974,15 +4153,19 @@
               </a:defRPr>
             </a:lvl9pPr>
           </a:lstStyle>
-          <a:p/>
+          <a:p>
+            <a:endParaRPr/>
+          </a:p>
         </p:txBody>
       </p:sp>
       <p:sp>
         <p:nvSpPr>
           <p:cNvPr id="39" name="Shape 39"/>
-          <p:cNvSpPr txBox="1"/>
+          <p:cNvSpPr txBox="1">
+            <a:spLocks noGrp="1"/>
+          </p:cNvSpPr>
           <p:nvPr>
-            <p:ph idx="2" type="body"/>
+            <p:ph type="body" idx="2"/>
           </p:nvPr>
         </p:nvSpPr>
         <p:spPr>
@@ -3999,7 +4182,7 @@
           </a:ln>
         </p:spPr>
         <p:txBody>
-          <a:bodyPr anchorCtr="0" anchor="t" bIns="91425" lIns="91425" rIns="91425" tIns="91425"/>
+          <a:bodyPr lIns="91425" tIns="91425" rIns="91425" bIns="91425" anchor="t" anchorCtr="0"/>
           <a:lstStyle>
             <a:lvl1pPr lvl="0" rtl="0">
               <a:spcBef>
@@ -4174,7 +4357,9 @@
               </a:defRPr>
             </a:lvl9pPr>
           </a:lstStyle>
-          <a:p/>
+          <a:p>
+            <a:endParaRPr/>
+          </a:p>
         </p:txBody>
       </p:sp>
     </p:spTree>
@@ -4186,7 +4371,7 @@
 </file>
 
 <file path=ppt/slideLayouts/slideLayout8.xml><?xml version="1.0" encoding="utf-8"?>
-<p:sldLayout xmlns:a="http://schemas.openxmlformats.org/drawingml/2006/main" xmlns:r="http://schemas.openxmlformats.org/officeDocument/2006/relationships" xmlns:mc="http://schemas.openxmlformats.org/markup-compatibility/2006" xmlns:mv="urn:schemas-microsoft-com:mac:vml" xmlns:p="http://schemas.openxmlformats.org/presentationml/2006/main" xmlns:c="http://schemas.openxmlformats.org/drawingml/2006/chart" xmlns:dgm="http://schemas.openxmlformats.org/drawingml/2006/diagram" xmlns:o="urn:schemas-microsoft-com:office:office" xmlns:v="urn:schemas-microsoft-com:vml" xmlns:pvml="urn:schemas-microsoft-com:office:powerpoint" xmlns:com="http://schemas.openxmlformats.org/drawingml/2006/compatibility" xmlns:p14="http://schemas.microsoft.com/office/powerpoint/2010/main">
+<p:sldLayout xmlns:a="http://schemas.openxmlformats.org/drawingml/2006/main" xmlns:r="http://schemas.openxmlformats.org/officeDocument/2006/relationships" xmlns:p="http://schemas.openxmlformats.org/presentationml/2006/main">
   <p:cSld name="Title + 3 columns">
     <p:bg>
       <p:bgPr>
@@ -4198,11 +4383,12 @@
             <a:fillRect/>
           </a:stretch>
         </a:blipFill>
+        <a:effectLst/>
       </p:bgPr>
     </p:bg>
     <p:spTree>
       <p:nvGrpSpPr>
-        <p:cNvPr id="40" name="Shape 40"/>
+        <p:cNvPr id="1" name="Shape 40"/>
         <p:cNvGrpSpPr/>
         <p:nvPr/>
       </p:nvGrpSpPr>
@@ -4238,7 +4424,7 @@
           </a:ln>
         </p:spPr>
         <p:txBody>
-          <a:bodyPr anchorCtr="0" anchor="ctr" bIns="91425" lIns="91425" rIns="91425" tIns="91425">
+          <a:bodyPr lIns="91425" tIns="91425" rIns="91425" bIns="91425" anchor="ctr" anchorCtr="0">
             <a:noAutofit/>
           </a:bodyPr>
           <a:lstStyle/>
@@ -4249,9 +4435,6 @@
               </a:spcBef>
               <a:buNone/>
             </a:pPr>
-            <a:r>
-              <a:t/>
-            </a:r>
             <a:endParaRPr/>
           </a:p>
         </p:txBody>
@@ -4280,7 +4463,7 @@
           </a:ln>
         </p:spPr>
         <p:txBody>
-          <a:bodyPr anchorCtr="0" anchor="ctr" bIns="91425" lIns="91425" rIns="91425" tIns="91425">
+          <a:bodyPr lIns="91425" tIns="91425" rIns="91425" bIns="91425" anchor="ctr" anchorCtr="0">
             <a:noAutofit/>
           </a:bodyPr>
           <a:lstStyle/>
@@ -4291,9 +4474,6 @@
               </a:spcBef>
               <a:buNone/>
             </a:pPr>
-            <a:r>
-              <a:t/>
-            </a:r>
             <a:endParaRPr/>
           </a:p>
         </p:txBody>
@@ -4301,9 +4481,11 @@
       <p:sp>
         <p:nvSpPr>
           <p:cNvPr id="43" name="Shape 43"/>
-          <p:cNvSpPr txBox="1"/>
+          <p:cNvSpPr txBox="1">
+            <a:spLocks noGrp="1"/>
+          </p:cNvSpPr>
           <p:nvPr>
-            <p:ph idx="1" type="body"/>
+            <p:ph type="body" idx="1"/>
           </p:nvPr>
         </p:nvSpPr>
         <p:spPr>
@@ -4320,7 +4502,7 @@
           </a:ln>
         </p:spPr>
         <p:txBody>
-          <a:bodyPr anchorCtr="0" anchor="t" bIns="91425" lIns="91425" rIns="91425" tIns="91425"/>
+          <a:bodyPr lIns="91425" tIns="91425" rIns="91425" bIns="91425" anchor="t" anchorCtr="0"/>
           <a:lstStyle>
             <a:lvl1pPr lvl="0" rtl="0">
               <a:spcBef>
@@ -4486,15 +4668,19 @@
               </a:defRPr>
             </a:lvl9pPr>
           </a:lstStyle>
-          <a:p/>
+          <a:p>
+            <a:endParaRPr/>
+          </a:p>
         </p:txBody>
       </p:sp>
       <p:sp>
         <p:nvSpPr>
           <p:cNvPr id="44" name="Shape 44"/>
-          <p:cNvSpPr txBox="1"/>
+          <p:cNvSpPr txBox="1">
+            <a:spLocks noGrp="1"/>
+          </p:cNvSpPr>
           <p:nvPr>
-            <p:ph idx="2" type="body"/>
+            <p:ph type="body" idx="2"/>
           </p:nvPr>
         </p:nvSpPr>
         <p:spPr>
@@ -4507,7 +4693,7 @@
           </a:prstGeom>
         </p:spPr>
         <p:txBody>
-          <a:bodyPr anchorCtr="0" anchor="t" bIns="91425" lIns="91425" rIns="91425" tIns="91425"/>
+          <a:bodyPr lIns="91425" tIns="91425" rIns="91425" bIns="91425" anchor="t" anchorCtr="0"/>
           <a:lstStyle>
             <a:lvl1pPr lvl="0" rtl="0">
               <a:spcBef>
@@ -4636,15 +4822,19 @@
               </a:defRPr>
             </a:lvl9pPr>
           </a:lstStyle>
-          <a:p/>
+          <a:p>
+            <a:endParaRPr/>
+          </a:p>
         </p:txBody>
       </p:sp>
       <p:sp>
         <p:nvSpPr>
           <p:cNvPr id="45" name="Shape 45"/>
-          <p:cNvSpPr txBox="1"/>
+          <p:cNvSpPr txBox="1">
+            <a:spLocks noGrp="1"/>
+          </p:cNvSpPr>
           <p:nvPr>
-            <p:ph idx="3" type="body"/>
+            <p:ph type="body" idx="3"/>
           </p:nvPr>
         </p:nvSpPr>
         <p:spPr>
@@ -4661,7 +4851,7 @@
           </a:ln>
         </p:spPr>
         <p:txBody>
-          <a:bodyPr anchorCtr="0" anchor="t" bIns="91425" lIns="91425" rIns="91425" tIns="91425"/>
+          <a:bodyPr lIns="91425" tIns="91425" rIns="91425" bIns="91425" anchor="t" anchorCtr="0"/>
           <a:lstStyle>
             <a:lvl1pPr lvl="0" rtl="0">
               <a:spcBef>
@@ -4827,13 +5017,17 @@
               </a:defRPr>
             </a:lvl9pPr>
           </a:lstStyle>
-          <a:p/>
+          <a:p>
+            <a:endParaRPr/>
+          </a:p>
         </p:txBody>
       </p:sp>
       <p:sp>
         <p:nvSpPr>
           <p:cNvPr id="46" name="Shape 46"/>
-          <p:cNvSpPr txBox="1"/>
+          <p:cNvSpPr txBox="1">
+            <a:spLocks noGrp="1"/>
+          </p:cNvSpPr>
           <p:nvPr>
             <p:ph type="title"/>
           </p:nvPr>
@@ -4848,14 +5042,14 @@
           </a:prstGeom>
         </p:spPr>
         <p:txBody>
-          <a:bodyPr anchorCtr="0" anchor="t" bIns="91425" lIns="91425" rIns="91425" tIns="91425"/>
+          <a:bodyPr lIns="91425" tIns="91425" rIns="91425" bIns="91425" anchor="t" anchorCtr="0"/>
           <a:lstStyle>
             <a:lvl1pPr lvl="0" rtl="0">
               <a:spcBef>
                 <a:spcPts val="0"/>
               </a:spcBef>
               <a:buNone/>
-              <a:defRPr b="1" sz="1800">
+              <a:defRPr sz="1800" b="1">
                 <a:solidFill>
                   <a:srgbClr val="E0C391"/>
                 </a:solidFill>
@@ -4870,7 +5064,7 @@
                 <a:spcPts val="0"/>
               </a:spcBef>
               <a:buNone/>
-              <a:defRPr b="1" sz="1800">
+              <a:defRPr sz="1800" b="1">
                 <a:solidFill>
                   <a:srgbClr val="E0C391"/>
                 </a:solidFill>
@@ -4885,7 +5079,7 @@
                 <a:spcPts val="0"/>
               </a:spcBef>
               <a:buNone/>
-              <a:defRPr b="1" sz="1800">
+              <a:defRPr sz="1800" b="1">
                 <a:solidFill>
                   <a:srgbClr val="E0C391"/>
                 </a:solidFill>
@@ -4900,7 +5094,7 @@
                 <a:spcPts val="0"/>
               </a:spcBef>
               <a:buNone/>
-              <a:defRPr b="1" sz="1800">
+              <a:defRPr sz="1800" b="1">
                 <a:solidFill>
                   <a:srgbClr val="E0C391"/>
                 </a:solidFill>
@@ -4915,7 +5109,7 @@
                 <a:spcPts val="0"/>
               </a:spcBef>
               <a:buNone/>
-              <a:defRPr b="1" sz="1800">
+              <a:defRPr sz="1800" b="1">
                 <a:solidFill>
                   <a:srgbClr val="E0C391"/>
                 </a:solidFill>
@@ -4930,7 +5124,7 @@
                 <a:spcPts val="0"/>
               </a:spcBef>
               <a:buNone/>
-              <a:defRPr b="1" sz="1800">
+              <a:defRPr sz="1800" b="1">
                 <a:solidFill>
                   <a:srgbClr val="E0C391"/>
                 </a:solidFill>
@@ -4945,7 +5139,7 @@
                 <a:spcPts val="0"/>
               </a:spcBef>
               <a:buNone/>
-              <a:defRPr b="1" sz="1800">
+              <a:defRPr sz="1800" b="1">
                 <a:solidFill>
                   <a:srgbClr val="E0C391"/>
                 </a:solidFill>
@@ -4960,7 +5154,7 @@
                 <a:spcPts val="0"/>
               </a:spcBef>
               <a:buNone/>
-              <a:defRPr b="1" sz="1800">
+              <a:defRPr sz="1800" b="1">
                 <a:solidFill>
                   <a:srgbClr val="E0C391"/>
                 </a:solidFill>
@@ -4975,7 +5169,7 @@
                 <a:spcPts val="0"/>
               </a:spcBef>
               <a:buNone/>
-              <a:defRPr b="1" sz="1800">
+              <a:defRPr sz="1800" b="1">
                 <a:solidFill>
                   <a:srgbClr val="E0C391"/>
                 </a:solidFill>
@@ -4986,7 +5180,9 @@
               </a:defRPr>
             </a:lvl9pPr>
           </a:lstStyle>
-          <a:p/>
+          <a:p>
+            <a:endParaRPr/>
+          </a:p>
         </p:txBody>
       </p:sp>
     </p:spTree>
@@ -4998,7 +5194,7 @@
 </file>
 
 <file path=ppt/slideLayouts/slideLayout9.xml><?xml version="1.0" encoding="utf-8"?>
-<p:sldLayout xmlns:a="http://schemas.openxmlformats.org/drawingml/2006/main" xmlns:r="http://schemas.openxmlformats.org/officeDocument/2006/relationships" xmlns:mc="http://schemas.openxmlformats.org/markup-compatibility/2006" xmlns:mv="urn:schemas-microsoft-com:mac:vml" xmlns:p="http://schemas.openxmlformats.org/presentationml/2006/main" xmlns:c="http://schemas.openxmlformats.org/drawingml/2006/chart" xmlns:dgm="http://schemas.openxmlformats.org/drawingml/2006/diagram" xmlns:o="urn:schemas-microsoft-com:office:office" xmlns:v="urn:schemas-microsoft-com:vml" xmlns:pvml="urn:schemas-microsoft-com:office:powerpoint" xmlns:com="http://schemas.openxmlformats.org/drawingml/2006/compatibility" xmlns:p14="http://schemas.microsoft.com/office/powerpoint/2010/main" type="titleOnly">
+<p:sldLayout xmlns:a="http://schemas.openxmlformats.org/drawingml/2006/main" xmlns:r="http://schemas.openxmlformats.org/officeDocument/2006/relationships" xmlns:p="http://schemas.openxmlformats.org/presentationml/2006/main" type="titleOnly">
   <p:cSld name="Title only">
     <p:bg>
       <p:bgPr>
@@ -5010,11 +5206,12 @@
             <a:fillRect/>
           </a:stretch>
         </a:blipFill>
+        <a:effectLst/>
       </p:bgPr>
     </p:bg>
     <p:spTree>
       <p:nvGrpSpPr>
-        <p:cNvPr id="47" name="Shape 47"/>
+        <p:cNvPr id="1" name="Shape 47"/>
         <p:cNvGrpSpPr/>
         <p:nvPr/>
       </p:nvGrpSpPr>
@@ -5050,7 +5247,7 @@
           </a:ln>
         </p:spPr>
         <p:txBody>
-          <a:bodyPr anchorCtr="0" anchor="ctr" bIns="91425" lIns="91425" rIns="91425" tIns="91425">
+          <a:bodyPr lIns="91425" tIns="91425" rIns="91425" bIns="91425" anchor="ctr" anchorCtr="0">
             <a:noAutofit/>
           </a:bodyPr>
           <a:lstStyle/>
@@ -5061,9 +5258,6 @@
               </a:spcBef>
               <a:buNone/>
             </a:pPr>
-            <a:r>
-              <a:t/>
-            </a:r>
             <a:endParaRPr/>
           </a:p>
         </p:txBody>
@@ -5092,7 +5286,7 @@
           </a:ln>
         </p:spPr>
         <p:txBody>
-          <a:bodyPr anchorCtr="0" anchor="ctr" bIns="91425" lIns="91425" rIns="91425" tIns="91425">
+          <a:bodyPr lIns="91425" tIns="91425" rIns="91425" bIns="91425" anchor="ctr" anchorCtr="0">
             <a:noAutofit/>
           </a:bodyPr>
           <a:lstStyle/>
@@ -5103,9 +5297,6 @@
               </a:spcBef>
               <a:buNone/>
             </a:pPr>
-            <a:r>
-              <a:t/>
-            </a:r>
             <a:endParaRPr/>
           </a:p>
         </p:txBody>
@@ -5113,7 +5304,9 @@
       <p:sp>
         <p:nvSpPr>
           <p:cNvPr id="50" name="Shape 50"/>
-          <p:cNvSpPr txBox="1"/>
+          <p:cNvSpPr txBox="1">
+            <a:spLocks noGrp="1"/>
+          </p:cNvSpPr>
           <p:nvPr>
             <p:ph type="title"/>
           </p:nvPr>
@@ -5128,14 +5321,14 @@
           </a:prstGeom>
         </p:spPr>
         <p:txBody>
-          <a:bodyPr anchorCtr="0" anchor="t" bIns="91425" lIns="91425" rIns="91425" tIns="91425"/>
+          <a:bodyPr lIns="91425" tIns="91425" rIns="91425" bIns="91425" anchor="t" anchorCtr="0"/>
           <a:lstStyle>
-            <a:lvl1pPr lvl="0" rtl="0" algn="ctr">
-              <a:spcBef>
-                <a:spcPts val="0"/>
-              </a:spcBef>
-              <a:buNone/>
-              <a:defRPr b="1" sz="1800">
+            <a:lvl1pPr lvl="0" algn="ctr" rtl="0">
+              <a:spcBef>
+                <a:spcPts val="0"/>
+              </a:spcBef>
+              <a:buNone/>
+              <a:defRPr sz="1800" b="1">
                 <a:solidFill>
                   <a:srgbClr val="E0C391"/>
                 </a:solidFill>
@@ -5145,12 +5338,12 @@
                 <a:sym typeface="Muli"/>
               </a:defRPr>
             </a:lvl1pPr>
-            <a:lvl2pPr lvl="1" rtl="0" algn="ctr">
-              <a:spcBef>
-                <a:spcPts val="0"/>
-              </a:spcBef>
-              <a:buNone/>
-              <a:defRPr b="1" sz="1800">
+            <a:lvl2pPr lvl="1" algn="ctr" rtl="0">
+              <a:spcBef>
+                <a:spcPts val="0"/>
+              </a:spcBef>
+              <a:buNone/>
+              <a:defRPr sz="1800" b="1">
                 <a:solidFill>
                   <a:srgbClr val="E0C391"/>
                 </a:solidFill>
@@ -5160,12 +5353,12 @@
                 <a:sym typeface="Muli"/>
               </a:defRPr>
             </a:lvl2pPr>
-            <a:lvl3pPr lvl="2" rtl="0" algn="ctr">
-              <a:spcBef>
-                <a:spcPts val="0"/>
-              </a:spcBef>
-              <a:buNone/>
-              <a:defRPr b="1" sz="1800">
+            <a:lvl3pPr lvl="2" algn="ctr" rtl="0">
+              <a:spcBef>
+                <a:spcPts val="0"/>
+              </a:spcBef>
+              <a:buNone/>
+              <a:defRPr sz="1800" b="1">
                 <a:solidFill>
                   <a:srgbClr val="E0C391"/>
                 </a:solidFill>
@@ -5175,12 +5368,12 @@
                 <a:sym typeface="Muli"/>
               </a:defRPr>
             </a:lvl3pPr>
-            <a:lvl4pPr lvl="3" rtl="0" algn="ctr">
-              <a:spcBef>
-                <a:spcPts val="0"/>
-              </a:spcBef>
-              <a:buNone/>
-              <a:defRPr b="1" sz="1800">
+            <a:lvl4pPr lvl="3" algn="ctr" rtl="0">
+              <a:spcBef>
+                <a:spcPts val="0"/>
+              </a:spcBef>
+              <a:buNone/>
+              <a:defRPr sz="1800" b="1">
                 <a:solidFill>
                   <a:srgbClr val="E0C391"/>
                 </a:solidFill>
@@ -5190,12 +5383,12 @@
                 <a:sym typeface="Muli"/>
               </a:defRPr>
             </a:lvl4pPr>
-            <a:lvl5pPr lvl="4" rtl="0" algn="ctr">
-              <a:spcBef>
-                <a:spcPts val="0"/>
-              </a:spcBef>
-              <a:buNone/>
-              <a:defRPr b="1" sz="1800">
+            <a:lvl5pPr lvl="4" algn="ctr" rtl="0">
+              <a:spcBef>
+                <a:spcPts val="0"/>
+              </a:spcBef>
+              <a:buNone/>
+              <a:defRPr sz="1800" b="1">
                 <a:solidFill>
                   <a:srgbClr val="E0C391"/>
                 </a:solidFill>
@@ -5205,12 +5398,12 @@
                 <a:sym typeface="Muli"/>
               </a:defRPr>
             </a:lvl5pPr>
-            <a:lvl6pPr lvl="5" rtl="0" algn="ctr">
-              <a:spcBef>
-                <a:spcPts val="0"/>
-              </a:spcBef>
-              <a:buNone/>
-              <a:defRPr b="1" sz="1800">
+            <a:lvl6pPr lvl="5" algn="ctr" rtl="0">
+              <a:spcBef>
+                <a:spcPts val="0"/>
+              </a:spcBef>
+              <a:buNone/>
+              <a:defRPr sz="1800" b="1">
                 <a:solidFill>
                   <a:srgbClr val="E0C391"/>
                 </a:solidFill>
@@ -5220,12 +5413,12 @@
                 <a:sym typeface="Muli"/>
               </a:defRPr>
             </a:lvl6pPr>
-            <a:lvl7pPr lvl="6" rtl="0" algn="ctr">
-              <a:spcBef>
-                <a:spcPts val="0"/>
-              </a:spcBef>
-              <a:buNone/>
-              <a:defRPr b="1" sz="1800">
+            <a:lvl7pPr lvl="6" algn="ctr" rtl="0">
+              <a:spcBef>
+                <a:spcPts val="0"/>
+              </a:spcBef>
+              <a:buNone/>
+              <a:defRPr sz="1800" b="1">
                 <a:solidFill>
                   <a:srgbClr val="E0C391"/>
                 </a:solidFill>
@@ -5235,12 +5428,12 @@
                 <a:sym typeface="Muli"/>
               </a:defRPr>
             </a:lvl7pPr>
-            <a:lvl8pPr lvl="7" rtl="0" algn="ctr">
-              <a:spcBef>
-                <a:spcPts val="0"/>
-              </a:spcBef>
-              <a:buNone/>
-              <a:defRPr b="1" sz="1800">
+            <a:lvl8pPr lvl="7" algn="ctr" rtl="0">
+              <a:spcBef>
+                <a:spcPts val="0"/>
+              </a:spcBef>
+              <a:buNone/>
+              <a:defRPr sz="1800" b="1">
                 <a:solidFill>
                   <a:srgbClr val="E0C391"/>
                 </a:solidFill>
@@ -5250,12 +5443,12 @@
                 <a:sym typeface="Muli"/>
               </a:defRPr>
             </a:lvl8pPr>
-            <a:lvl9pPr lvl="8" rtl="0" algn="ctr">
-              <a:spcBef>
-                <a:spcPts val="0"/>
-              </a:spcBef>
-              <a:buNone/>
-              <a:defRPr b="1" sz="1800">
+            <a:lvl9pPr lvl="8" algn="ctr" rtl="0">
+              <a:spcBef>
+                <a:spcPts val="0"/>
+              </a:spcBef>
+              <a:buNone/>
+              <a:defRPr sz="1800" b="1">
                 <a:solidFill>
                   <a:srgbClr val="E0C391"/>
                 </a:solidFill>
@@ -5266,7 +5459,9 @@
               </a:defRPr>
             </a:lvl9pPr>
           </a:lstStyle>
-          <a:p/>
+          <a:p>
+            <a:endParaRPr/>
+          </a:p>
         </p:txBody>
       </p:sp>
     </p:spTree>
@@ -5278,18 +5473,19 @@
 </file>
 
 <file path=ppt/slideMasters/slideMaster1.xml><?xml version="1.0" encoding="utf-8"?>
-<p:sldMaster xmlns:a="http://schemas.openxmlformats.org/drawingml/2006/main" xmlns:r="http://schemas.openxmlformats.org/officeDocument/2006/relationships" xmlns:mc="http://schemas.openxmlformats.org/markup-compatibility/2006" xmlns:mv="urn:schemas-microsoft-com:mac:vml" xmlns:p="http://schemas.openxmlformats.org/presentationml/2006/main" xmlns:c="http://schemas.openxmlformats.org/drawingml/2006/chart" xmlns:dgm="http://schemas.openxmlformats.org/drawingml/2006/diagram" xmlns:o="urn:schemas-microsoft-com:office:office" xmlns:v="urn:schemas-microsoft-com:vml" xmlns:pvml="urn:schemas-microsoft-com:office:powerpoint" xmlns:com="http://schemas.openxmlformats.org/drawingml/2006/compatibility" xmlns:p14="http://schemas.microsoft.com/office/powerpoint/2010/main">
+<p:sldMaster xmlns:a="http://schemas.openxmlformats.org/drawingml/2006/main" xmlns:r="http://schemas.openxmlformats.org/officeDocument/2006/relationships" xmlns:p="http://schemas.openxmlformats.org/presentationml/2006/main">
   <p:cSld>
     <p:bg>
       <p:bgPr>
         <a:solidFill>
           <a:srgbClr val="FFFFFF"/>
         </a:solidFill>
+        <a:effectLst/>
       </p:bgPr>
     </p:bg>
     <p:spTree>
       <p:nvGrpSpPr>
-        <p:cNvPr id="5" name="Shape 5"/>
+        <p:cNvPr id="1" name="Shape 5"/>
         <p:cNvGrpSpPr/>
         <p:nvPr/>
       </p:nvGrpSpPr>
@@ -5304,9 +5500,11 @@
       <p:sp>
         <p:nvSpPr>
           <p:cNvPr id="6" name="Shape 6"/>
-          <p:cNvSpPr txBox="1"/>
+          <p:cNvSpPr txBox="1">
+            <a:spLocks noGrp="1"/>
+          </p:cNvSpPr>
           <p:nvPr>
-            <p:ph idx="1" type="body"/>
+            <p:ph type="body" idx="1"/>
           </p:nvPr>
         </p:nvSpPr>
         <p:spPr>
@@ -5323,7 +5521,7 @@
           </a:ln>
         </p:spPr>
         <p:txBody>
-          <a:bodyPr anchorCtr="0" anchor="t" bIns="91425" lIns="91425" rIns="91425" tIns="91425"/>
+          <a:bodyPr lIns="91425" tIns="91425" rIns="91425" bIns="91425" anchor="t" anchorCtr="0"/>
           <a:lstStyle>
             <a:lvl1pPr lvl="0" rtl="0">
               <a:spcBef>
@@ -5498,13 +5696,17 @@
               </a:defRPr>
             </a:lvl9pPr>
           </a:lstStyle>
-          <a:p/>
+          <a:p>
+            <a:endParaRPr/>
+          </a:p>
         </p:txBody>
       </p:sp>
       <p:sp>
         <p:nvSpPr>
           <p:cNvPr id="7" name="Shape 7"/>
-          <p:cNvSpPr txBox="1"/>
+          <p:cNvSpPr txBox="1">
+            <a:spLocks noGrp="1"/>
+          </p:cNvSpPr>
           <p:nvPr>
             <p:ph type="title"/>
           </p:nvPr>
@@ -5523,14 +5725,14 @@
           </a:ln>
         </p:spPr>
         <p:txBody>
-          <a:bodyPr anchorCtr="0" anchor="t" bIns="91425" lIns="91425" rIns="91425" tIns="91425"/>
+          <a:bodyPr lIns="91425" tIns="91425" rIns="91425" bIns="91425" anchor="t" anchorCtr="0"/>
           <a:lstStyle>
             <a:lvl1pPr lvl="0" rtl="0">
               <a:spcBef>
                 <a:spcPts val="0"/>
               </a:spcBef>
               <a:buNone/>
-              <a:defRPr b="1" sz="1800">
+              <a:defRPr sz="1800" b="1">
                 <a:solidFill>
                   <a:srgbClr val="FFFFFF"/>
                 </a:solidFill>
@@ -5545,7 +5747,7 @@
                 <a:spcPts val="0"/>
               </a:spcBef>
               <a:buNone/>
-              <a:defRPr b="1" sz="1800">
+              <a:defRPr sz="1800" b="1">
                 <a:solidFill>
                   <a:srgbClr val="FFFFFF"/>
                 </a:solidFill>
@@ -5560,7 +5762,7 @@
                 <a:spcPts val="0"/>
               </a:spcBef>
               <a:buNone/>
-              <a:defRPr b="1" sz="1800">
+              <a:defRPr sz="1800" b="1">
                 <a:solidFill>
                   <a:srgbClr val="FFFFFF"/>
                 </a:solidFill>
@@ -5575,7 +5777,7 @@
                 <a:spcPts val="0"/>
               </a:spcBef>
               <a:buNone/>
-              <a:defRPr b="1" sz="1800">
+              <a:defRPr sz="1800" b="1">
                 <a:solidFill>
                   <a:srgbClr val="FFFFFF"/>
                 </a:solidFill>
@@ -5590,7 +5792,7 @@
                 <a:spcPts val="0"/>
               </a:spcBef>
               <a:buNone/>
-              <a:defRPr b="1" sz="1800">
+              <a:defRPr sz="1800" b="1">
                 <a:solidFill>
                   <a:srgbClr val="FFFFFF"/>
                 </a:solidFill>
@@ -5605,7 +5807,7 @@
                 <a:spcPts val="0"/>
               </a:spcBef>
               <a:buNone/>
-              <a:defRPr b="1" sz="1800">
+              <a:defRPr sz="1800" b="1">
                 <a:solidFill>
                   <a:srgbClr val="FFFFFF"/>
                 </a:solidFill>
@@ -5620,7 +5822,7 @@
                 <a:spcPts val="0"/>
               </a:spcBef>
               <a:buNone/>
-              <a:defRPr b="1" sz="1800">
+              <a:defRPr sz="1800" b="1">
                 <a:solidFill>
                   <a:srgbClr val="FFFFFF"/>
                 </a:solidFill>
@@ -5635,7 +5837,7 @@
                 <a:spcPts val="0"/>
               </a:spcBef>
               <a:buNone/>
-              <a:defRPr b="1" sz="1800">
+              <a:defRPr sz="1800" b="1">
                 <a:solidFill>
                   <a:srgbClr val="FFFFFF"/>
                 </a:solidFill>
@@ -5650,7 +5852,7 @@
                 <a:spcPts val="0"/>
               </a:spcBef>
               <a:buNone/>
-              <a:defRPr b="1" sz="1800">
+              <a:defRPr sz="1800" b="1">
                 <a:solidFill>
                   <a:srgbClr val="FFFFFF"/>
                 </a:solidFill>
@@ -5661,12 +5863,14 @@
               </a:defRPr>
             </a:lvl9pPr>
           </a:lstStyle>
-          <a:p/>
+          <a:p>
+            <a:endParaRPr/>
+          </a:p>
         </p:txBody>
       </p:sp>
     </p:spTree>
   </p:cSld>
-  <p:clrMap accent1="accent1" accent2="accent2" accent3="accent3" accent4="accent4" accent5="accent5" accent6="accent6" bg1="lt1" bg2="dk2" tx1="dk1" tx2="lt2" folHlink="folHlink" hlink="hlink"/>
+  <p:clrMap bg1="lt1" tx1="dk1" bg2="dk2" tx2="lt2" accent1="accent1" accent2="accent2" accent3="accent3" accent4="accent4" accent5="accent5" accent6="accent6" hlink="hlink" folHlink="folHlink"/>
   <p:sldLayoutIdLst>
     <p:sldLayoutId id="2147483648" r:id="rId1"/>
     <p:sldLayoutId id="2147483649" r:id="rId2"/>
@@ -5680,10 +5884,10 @@
     <p:sldLayoutId id="2147483657" r:id="rId10"/>
     <p:sldLayoutId id="2147483658" r:id="rId11"/>
   </p:sldLayoutIdLst>
-  <p:hf dt="0" ftr="0" hdr="0" sldNum="0"/>
+  <p:hf sldNum="0" hdr="0" ftr="0" dt="0"/>
   <p:txStyles>
     <p:titleStyle>
-      <a:defPPr lvl="0" marR="0" rtl="0" algn="l">
+      <a:defPPr marR="0" lvl="0" algn="l" rtl="0">
         <a:lnSpc>
           <a:spcPct val="100000"/>
         </a:lnSpc>
@@ -5694,7 +5898,7 @@
           <a:spcPts val="0"/>
         </a:spcAft>
       </a:defPPr>
-      <a:lvl1pPr lvl="0" marR="0" rtl="0" algn="l">
+      <a:lvl1pPr marR="0" lvl="0" algn="l" rtl="0">
         <a:lnSpc>
           <a:spcPct val="100000"/>
         </a:lnSpc>
@@ -5705,7 +5909,7 @@
           <a:spcPts val="0"/>
         </a:spcAft>
         <a:buNone/>
-        <a:defRPr b="0" i="0" sz="1400" u="none" cap="none" strike="noStrike">
+        <a:defRPr sz="1400" b="0" i="0" u="none" strike="noStrike" cap="none">
           <a:solidFill>
             <a:srgbClr val="000000"/>
           </a:solidFill>
@@ -5717,7 +5921,7 @@
       </a:lvl1pPr>
     </p:titleStyle>
     <p:bodyStyle>
-      <a:defPPr lvl="0" marR="0" rtl="0" algn="l">
+      <a:defPPr marR="0" lvl="0" algn="l" rtl="0">
         <a:lnSpc>
           <a:spcPct val="100000"/>
         </a:lnSpc>
@@ -5728,7 +5932,7 @@
           <a:spcPts val="0"/>
         </a:spcAft>
       </a:defPPr>
-      <a:lvl1pPr lvl="0" marR="0" rtl="0" algn="l">
+      <a:lvl1pPr marR="0" lvl="0" algn="l" rtl="0">
         <a:lnSpc>
           <a:spcPct val="100000"/>
         </a:lnSpc>
@@ -5739,7 +5943,7 @@
           <a:spcPts val="0"/>
         </a:spcAft>
         <a:buNone/>
-        <a:defRPr b="0" i="0" sz="1400" u="none" cap="none" strike="noStrike">
+        <a:defRPr sz="1400" b="0" i="0" u="none" strike="noStrike" cap="none">
           <a:solidFill>
             <a:srgbClr val="000000"/>
           </a:solidFill>
@@ -5749,7 +5953,7 @@
           <a:sym typeface="Arial"/>
         </a:defRPr>
       </a:lvl1pPr>
-      <a:lvl2pPr lvl="1" marR="0" rtl="0" algn="l">
+      <a:lvl2pPr marR="0" lvl="1" algn="l" rtl="0">
         <a:lnSpc>
           <a:spcPct val="100000"/>
         </a:lnSpc>
@@ -5760,7 +5964,7 @@
           <a:spcPts val="0"/>
         </a:spcAft>
         <a:buNone/>
-        <a:defRPr b="0" i="0" sz="1400" u="none" cap="none" strike="noStrike">
+        <a:defRPr sz="1400" b="0" i="0" u="none" strike="noStrike" cap="none">
           <a:solidFill>
             <a:srgbClr val="000000"/>
           </a:solidFill>
@@ -5770,7 +5974,7 @@
           <a:sym typeface="Arial"/>
         </a:defRPr>
       </a:lvl2pPr>
-      <a:lvl3pPr lvl="2" marR="0" rtl="0" algn="l">
+      <a:lvl3pPr marR="0" lvl="2" algn="l" rtl="0">
         <a:lnSpc>
           <a:spcPct val="100000"/>
         </a:lnSpc>
@@ -5781,7 +5985,7 @@
           <a:spcPts val="0"/>
         </a:spcAft>
         <a:buNone/>
-        <a:defRPr b="0" i="0" sz="1400" u="none" cap="none" strike="noStrike">
+        <a:defRPr sz="1400" b="0" i="0" u="none" strike="noStrike" cap="none">
           <a:solidFill>
             <a:srgbClr val="000000"/>
           </a:solidFill>
@@ -5791,7 +5995,7 @@
           <a:sym typeface="Arial"/>
         </a:defRPr>
       </a:lvl3pPr>
-      <a:lvl4pPr lvl="3" marR="0" rtl="0" algn="l">
+      <a:lvl4pPr marR="0" lvl="3" algn="l" rtl="0">
         <a:lnSpc>
           <a:spcPct val="100000"/>
         </a:lnSpc>
@@ -5802,7 +6006,7 @@
           <a:spcPts val="0"/>
         </a:spcAft>
         <a:buNone/>
-        <a:defRPr b="0" i="0" sz="1400" u="none" cap="none" strike="noStrike">
+        <a:defRPr sz="1400" b="0" i="0" u="none" strike="noStrike" cap="none">
           <a:solidFill>
             <a:srgbClr val="000000"/>
           </a:solidFill>
@@ -5812,7 +6016,7 @@
           <a:sym typeface="Arial"/>
         </a:defRPr>
       </a:lvl4pPr>
-      <a:lvl5pPr lvl="4" marR="0" rtl="0" algn="l">
+      <a:lvl5pPr marR="0" lvl="4" algn="l" rtl="0">
         <a:lnSpc>
           <a:spcPct val="100000"/>
         </a:lnSpc>
@@ -5823,7 +6027,7 @@
           <a:spcPts val="0"/>
         </a:spcAft>
         <a:buNone/>
-        <a:defRPr b="0" i="0" sz="1400" u="none" cap="none" strike="noStrike">
+        <a:defRPr sz="1400" b="0" i="0" u="none" strike="noStrike" cap="none">
           <a:solidFill>
             <a:srgbClr val="000000"/>
           </a:solidFill>
@@ -5833,7 +6037,7 @@
           <a:sym typeface="Arial"/>
         </a:defRPr>
       </a:lvl5pPr>
-      <a:lvl6pPr lvl="5" marR="0" rtl="0" algn="l">
+      <a:lvl6pPr marR="0" lvl="5" algn="l" rtl="0">
         <a:lnSpc>
           <a:spcPct val="100000"/>
         </a:lnSpc>
@@ -5844,7 +6048,7 @@
           <a:spcPts val="0"/>
         </a:spcAft>
         <a:buNone/>
-        <a:defRPr b="0" i="0" sz="1400" u="none" cap="none" strike="noStrike">
+        <a:defRPr sz="1400" b="0" i="0" u="none" strike="noStrike" cap="none">
           <a:solidFill>
             <a:srgbClr val="000000"/>
           </a:solidFill>
@@ -5854,7 +6058,7 @@
           <a:sym typeface="Arial"/>
         </a:defRPr>
       </a:lvl6pPr>
-      <a:lvl7pPr lvl="6" marR="0" rtl="0" algn="l">
+      <a:lvl7pPr marR="0" lvl="6" algn="l" rtl="0">
         <a:lnSpc>
           <a:spcPct val="100000"/>
         </a:lnSpc>
@@ -5865,7 +6069,7 @@
           <a:spcPts val="0"/>
         </a:spcAft>
         <a:buNone/>
-        <a:defRPr b="0" i="0" sz="1400" u="none" cap="none" strike="noStrike">
+        <a:defRPr sz="1400" b="0" i="0" u="none" strike="noStrike" cap="none">
           <a:solidFill>
             <a:srgbClr val="000000"/>
           </a:solidFill>
@@ -5875,7 +6079,7 @@
           <a:sym typeface="Arial"/>
         </a:defRPr>
       </a:lvl7pPr>
-      <a:lvl8pPr lvl="7" marR="0" rtl="0" algn="l">
+      <a:lvl8pPr marR="0" lvl="7" algn="l" rtl="0">
         <a:lnSpc>
           <a:spcPct val="100000"/>
         </a:lnSpc>
@@ -5886,7 +6090,7 @@
           <a:spcPts val="0"/>
         </a:spcAft>
         <a:buNone/>
-        <a:defRPr b="0" i="0" sz="1400" u="none" cap="none" strike="noStrike">
+        <a:defRPr sz="1400" b="0" i="0" u="none" strike="noStrike" cap="none">
           <a:solidFill>
             <a:srgbClr val="000000"/>
           </a:solidFill>
@@ -5896,7 +6100,7 @@
           <a:sym typeface="Arial"/>
         </a:defRPr>
       </a:lvl8pPr>
-      <a:lvl9pPr lvl="8" marR="0" rtl="0" algn="l">
+      <a:lvl9pPr marR="0" lvl="8" algn="l" rtl="0">
         <a:lnSpc>
           <a:spcPct val="100000"/>
         </a:lnSpc>
@@ -5907,7 +6111,7 @@
           <a:spcPts val="0"/>
         </a:spcAft>
         <a:buNone/>
-        <a:defRPr b="0" i="0" sz="1400" u="none" cap="none" strike="noStrike">
+        <a:defRPr sz="1400" b="0" i="0" u="none" strike="noStrike" cap="none">
           <a:solidFill>
             <a:srgbClr val="000000"/>
           </a:solidFill>
@@ -5919,7 +6123,7 @@
       </a:lvl9pPr>
     </p:bodyStyle>
     <p:otherStyle>
-      <a:defPPr lvl="0" marR="0" rtl="0" algn="l">
+      <a:defPPr marR="0" lvl="0" algn="l" rtl="0">
         <a:lnSpc>
           <a:spcPct val="100000"/>
         </a:lnSpc>
@@ -5930,7 +6134,7 @@
           <a:spcPts val="0"/>
         </a:spcAft>
       </a:defPPr>
-      <a:lvl1pPr lvl="0" marR="0" rtl="0" algn="l">
+      <a:lvl1pPr marR="0" lvl="0" algn="l" rtl="0">
         <a:lnSpc>
           <a:spcPct val="100000"/>
         </a:lnSpc>
@@ -5941,7 +6145,7 @@
           <a:spcPts val="0"/>
         </a:spcAft>
         <a:buNone/>
-        <a:defRPr b="0" i="0" sz="1400" u="none" cap="none" strike="noStrike">
+        <a:defRPr sz="1400" b="0" i="0" u="none" strike="noStrike" cap="none">
           <a:solidFill>
             <a:srgbClr val="000000"/>
           </a:solidFill>
@@ -5951,7 +6155,7 @@
           <a:sym typeface="Arial"/>
         </a:defRPr>
       </a:lvl1pPr>
-      <a:lvl2pPr lvl="1" marR="0" rtl="0" algn="l">
+      <a:lvl2pPr marR="0" lvl="1" algn="l" rtl="0">
         <a:lnSpc>
           <a:spcPct val="100000"/>
         </a:lnSpc>
@@ -5962,7 +6166,7 @@
           <a:spcPts val="0"/>
         </a:spcAft>
         <a:buNone/>
-        <a:defRPr b="0" i="0" sz="1400" u="none" cap="none" strike="noStrike">
+        <a:defRPr sz="1400" b="0" i="0" u="none" strike="noStrike" cap="none">
           <a:solidFill>
             <a:srgbClr val="000000"/>
           </a:solidFill>
@@ -5972,7 +6176,7 @@
           <a:sym typeface="Arial"/>
         </a:defRPr>
       </a:lvl2pPr>
-      <a:lvl3pPr lvl="2" marR="0" rtl="0" algn="l">
+      <a:lvl3pPr marR="0" lvl="2" algn="l" rtl="0">
         <a:lnSpc>
           <a:spcPct val="100000"/>
         </a:lnSpc>
@@ -5983,7 +6187,7 @@
           <a:spcPts val="0"/>
         </a:spcAft>
         <a:buNone/>
-        <a:defRPr b="0" i="0" sz="1400" u="none" cap="none" strike="noStrike">
+        <a:defRPr sz="1400" b="0" i="0" u="none" strike="noStrike" cap="none">
           <a:solidFill>
             <a:srgbClr val="000000"/>
           </a:solidFill>
@@ -5993,7 +6197,7 @@
           <a:sym typeface="Arial"/>
         </a:defRPr>
       </a:lvl3pPr>
-      <a:lvl4pPr lvl="3" marR="0" rtl="0" algn="l">
+      <a:lvl4pPr marR="0" lvl="3" algn="l" rtl="0">
         <a:lnSpc>
           <a:spcPct val="100000"/>
         </a:lnSpc>
@@ -6004,7 +6208,7 @@
           <a:spcPts val="0"/>
         </a:spcAft>
         <a:buNone/>
-        <a:defRPr b="0" i="0" sz="1400" u="none" cap="none" strike="noStrike">
+        <a:defRPr sz="1400" b="0" i="0" u="none" strike="noStrike" cap="none">
           <a:solidFill>
             <a:srgbClr val="000000"/>
           </a:solidFill>
@@ -6014,7 +6218,7 @@
           <a:sym typeface="Arial"/>
         </a:defRPr>
       </a:lvl4pPr>
-      <a:lvl5pPr lvl="4" marR="0" rtl="0" algn="l">
+      <a:lvl5pPr marR="0" lvl="4" algn="l" rtl="0">
         <a:lnSpc>
           <a:spcPct val="100000"/>
         </a:lnSpc>
@@ -6025,7 +6229,7 @@
           <a:spcPts val="0"/>
         </a:spcAft>
         <a:buNone/>
-        <a:defRPr b="0" i="0" sz="1400" u="none" cap="none" strike="noStrike">
+        <a:defRPr sz="1400" b="0" i="0" u="none" strike="noStrike" cap="none">
           <a:solidFill>
             <a:srgbClr val="000000"/>
           </a:solidFill>
@@ -6035,7 +6239,7 @@
           <a:sym typeface="Arial"/>
         </a:defRPr>
       </a:lvl5pPr>
-      <a:lvl6pPr lvl="5" marR="0" rtl="0" algn="l">
+      <a:lvl6pPr marR="0" lvl="5" algn="l" rtl="0">
         <a:lnSpc>
           <a:spcPct val="100000"/>
         </a:lnSpc>
@@ -6046,7 +6250,7 @@
           <a:spcPts val="0"/>
         </a:spcAft>
         <a:buNone/>
-        <a:defRPr b="0" i="0" sz="1400" u="none" cap="none" strike="noStrike">
+        <a:defRPr sz="1400" b="0" i="0" u="none" strike="noStrike" cap="none">
           <a:solidFill>
             <a:srgbClr val="000000"/>
           </a:solidFill>
@@ -6056,7 +6260,7 @@
           <a:sym typeface="Arial"/>
         </a:defRPr>
       </a:lvl6pPr>
-      <a:lvl7pPr lvl="6" marR="0" rtl="0" algn="l">
+      <a:lvl7pPr marR="0" lvl="6" algn="l" rtl="0">
         <a:lnSpc>
           <a:spcPct val="100000"/>
         </a:lnSpc>
@@ -6067,7 +6271,7 @@
           <a:spcPts val="0"/>
         </a:spcAft>
         <a:buNone/>
-        <a:defRPr b="0" i="0" sz="1400" u="none" cap="none" strike="noStrike">
+        <a:defRPr sz="1400" b="0" i="0" u="none" strike="noStrike" cap="none">
           <a:solidFill>
             <a:srgbClr val="000000"/>
           </a:solidFill>
@@ -6077,7 +6281,7 @@
           <a:sym typeface="Arial"/>
         </a:defRPr>
       </a:lvl7pPr>
-      <a:lvl8pPr lvl="7" marR="0" rtl="0" algn="l">
+      <a:lvl8pPr marR="0" lvl="7" algn="l" rtl="0">
         <a:lnSpc>
           <a:spcPct val="100000"/>
         </a:lnSpc>
@@ -6088,7 +6292,7 @@
           <a:spcPts val="0"/>
         </a:spcAft>
         <a:buNone/>
-        <a:defRPr b="0" i="0" sz="1400" u="none" cap="none" strike="noStrike">
+        <a:defRPr sz="1400" b="0" i="0" u="none" strike="noStrike" cap="none">
           <a:solidFill>
             <a:srgbClr val="000000"/>
           </a:solidFill>
@@ -6098,7 +6302,7 @@
           <a:sym typeface="Arial"/>
         </a:defRPr>
       </a:lvl8pPr>
-      <a:lvl9pPr lvl="8" marR="0" rtl="0" algn="l">
+      <a:lvl9pPr marR="0" lvl="8" algn="l" rtl="0">
         <a:lnSpc>
           <a:spcPct val="100000"/>
         </a:lnSpc>
@@ -6109,7 +6313,7 @@
           <a:spcPts val="0"/>
         </a:spcAft>
         <a:buNone/>
-        <a:defRPr b="0" i="0" sz="1400" u="none" cap="none" strike="noStrike">
+        <a:defRPr sz="1400" b="0" i="0" u="none" strike="noStrike" cap="none">
           <a:solidFill>
             <a:srgbClr val="000000"/>
           </a:solidFill>
@@ -6125,7 +6329,7 @@
 </file>
 
 <file path=ppt/slides/slide1.xml><?xml version="1.0" encoding="utf-8"?>
-<p:sld xmlns:a="http://schemas.openxmlformats.org/drawingml/2006/main" xmlns:r="http://schemas.openxmlformats.org/officeDocument/2006/relationships" xmlns:mc="http://schemas.openxmlformats.org/markup-compatibility/2006" xmlns:mv="urn:schemas-microsoft-com:mac:vml" xmlns:p="http://schemas.openxmlformats.org/presentationml/2006/main" xmlns:c="http://schemas.openxmlformats.org/drawingml/2006/chart" xmlns:dgm="http://schemas.openxmlformats.org/drawingml/2006/diagram" xmlns:o="urn:schemas-microsoft-com:office:office" xmlns:v="urn:schemas-microsoft-com:vml" xmlns:pvml="urn:schemas-microsoft-com:office:powerpoint" xmlns:com="http://schemas.openxmlformats.org/drawingml/2006/compatibility" xmlns:p14="http://schemas.microsoft.com/office/powerpoint/2010/main">
+<p:sld xmlns:a="http://schemas.openxmlformats.org/drawingml/2006/main" xmlns:r="http://schemas.openxmlformats.org/officeDocument/2006/relationships" xmlns:p="http://schemas.openxmlformats.org/presentationml/2006/main">
   <p:cSld>
     <p:bg>
       <p:bgPr>
@@ -6137,11 +6341,12 @@
             <a:fillRect/>
           </a:stretch>
         </a:blipFill>
+        <a:effectLst/>
       </p:bgPr>
     </p:bg>
     <p:spTree>
       <p:nvGrpSpPr>
-        <p:cNvPr id="59" name="Shape 59"/>
+        <p:cNvPr id="1" name="Shape 59"/>
         <p:cNvGrpSpPr/>
         <p:nvPr/>
       </p:nvGrpSpPr>
@@ -6181,6 +6386,42 @@
           </a:ln>
         </p:spPr>
       </p:pic>
+      <p:sp>
+        <p:nvSpPr>
+          <p:cNvPr id="2" name="TextBox 1"/>
+          <p:cNvSpPr txBox="1"/>
+          <p:nvPr/>
+        </p:nvSpPr>
+        <p:spPr>
+          <a:xfrm>
+            <a:off x="1153086" y="116959"/>
+            <a:ext cx="6742551" cy="307777"/>
+          </a:xfrm>
+          <a:prstGeom prst="rect">
+            <a:avLst/>
+          </a:prstGeom>
+          <a:noFill/>
+        </p:spPr>
+        <p:txBody>
+          <a:bodyPr wrap="none" rtlCol="0">
+            <a:spAutoFit/>
+          </a:bodyPr>
+          <a:lstStyle/>
+          <a:p>
+            <a:r>
+              <a:rPr lang="en-CA" dirty="0">
+                <a:solidFill>
+                  <a:schemeClr val="accent2">
+                    <a:lumMod val="60000"/>
+                    <a:lumOff val="40000"/>
+                  </a:schemeClr>
+                </a:solidFill>
+              </a:rPr>
+              <a:t>Andrew Busto, Tyler Da Costa, Connor Goudie, Sheldon Lynn and Thomas McKay</a:t>
+            </a:r>
+          </a:p>
+        </p:txBody>
+      </p:sp>
     </p:spTree>
   </p:cSld>
   <p:clrMapOvr>
@@ -6193,7 +6434,7 @@
 </file>
 
 <file path=ppt/slides/slide2.xml><?xml version="1.0" encoding="utf-8"?>
-<p:sld xmlns:a="http://schemas.openxmlformats.org/drawingml/2006/main" xmlns:r="http://schemas.openxmlformats.org/officeDocument/2006/relationships" xmlns:mc="http://schemas.openxmlformats.org/markup-compatibility/2006" xmlns:mv="urn:schemas-microsoft-com:mac:vml" xmlns:p="http://schemas.openxmlformats.org/presentationml/2006/main" xmlns:c="http://schemas.openxmlformats.org/drawingml/2006/chart" xmlns:dgm="http://schemas.openxmlformats.org/drawingml/2006/diagram" xmlns:o="urn:schemas-microsoft-com:office:office" xmlns:v="urn:schemas-microsoft-com:vml" xmlns:pvml="urn:schemas-microsoft-com:office:powerpoint" xmlns:com="http://schemas.openxmlformats.org/drawingml/2006/compatibility" xmlns:p14="http://schemas.microsoft.com/office/powerpoint/2010/main">
+<p:sld xmlns:a="http://schemas.openxmlformats.org/drawingml/2006/main" xmlns:r="http://schemas.openxmlformats.org/officeDocument/2006/relationships" xmlns:p="http://schemas.openxmlformats.org/presentationml/2006/main">
   <p:cSld>
     <p:bg>
       <p:bgPr>
@@ -6205,11 +6446,12 @@
             <a:fillRect/>
           </a:stretch>
         </a:blipFill>
+        <a:effectLst/>
       </p:bgPr>
     </p:bg>
     <p:spTree>
       <p:nvGrpSpPr>
-        <p:cNvPr id="64" name="Shape 64"/>
+        <p:cNvPr id="1" name="Shape 64"/>
         <p:cNvGrpSpPr/>
         <p:nvPr/>
       </p:nvGrpSpPr>
@@ -6224,7 +6466,9 @@
       <p:sp>
         <p:nvSpPr>
           <p:cNvPr id="65" name="Shape 65"/>
-          <p:cNvSpPr txBox="1"/>
+          <p:cNvSpPr txBox="1">
+            <a:spLocks noGrp="1"/>
+          </p:cNvSpPr>
           <p:nvPr>
             <p:ph type="title"/>
           </p:nvPr>
@@ -6239,7 +6483,7 @@
           </a:prstGeom>
         </p:spPr>
         <p:txBody>
-          <a:bodyPr anchorCtr="0" anchor="b" bIns="91425" lIns="91425" rIns="91425" tIns="91425">
+          <a:bodyPr lIns="91425" tIns="91425" rIns="91425" bIns="91425" anchor="b" anchorCtr="0">
             <a:noAutofit/>
           </a:bodyPr>
           <a:lstStyle/>
@@ -6251,7 +6495,7 @@
               <a:buNone/>
             </a:pPr>
             <a:r>
-              <a:rPr lang="en" sz="3000">
+              <a:rPr lang="en" sz="3000" dirty="0">
                 <a:solidFill>
                   <a:srgbClr val="E0C391"/>
                 </a:solidFill>
@@ -6273,7 +6517,7 @@
 </file>
 
 <file path=ppt/slides/slide3.xml><?xml version="1.0" encoding="utf-8"?>
-<p:sld xmlns:a="http://schemas.openxmlformats.org/drawingml/2006/main" xmlns:r="http://schemas.openxmlformats.org/officeDocument/2006/relationships" xmlns:mc="http://schemas.openxmlformats.org/markup-compatibility/2006" xmlns:mv="urn:schemas-microsoft-com:mac:vml" xmlns:p="http://schemas.openxmlformats.org/presentationml/2006/main" xmlns:c="http://schemas.openxmlformats.org/drawingml/2006/chart" xmlns:dgm="http://schemas.openxmlformats.org/drawingml/2006/diagram" xmlns:o="urn:schemas-microsoft-com:office:office" xmlns:v="urn:schemas-microsoft-com:vml" xmlns:pvml="urn:schemas-microsoft-com:office:powerpoint" xmlns:com="http://schemas.openxmlformats.org/drawingml/2006/compatibility" xmlns:p14="http://schemas.microsoft.com/office/powerpoint/2010/main">
+<p:sld xmlns:a="http://schemas.openxmlformats.org/drawingml/2006/main" xmlns:r="http://schemas.openxmlformats.org/officeDocument/2006/relationships" xmlns:p="http://schemas.openxmlformats.org/presentationml/2006/main">
   <p:cSld>
     <p:bg>
       <p:bgPr>
@@ -6285,11 +6529,12 @@
             <a:fillRect/>
           </a:stretch>
         </a:blipFill>
+        <a:effectLst/>
       </p:bgPr>
     </p:bg>
     <p:spTree>
       <p:nvGrpSpPr>
-        <p:cNvPr id="69" name="Shape 69"/>
+        <p:cNvPr id="1" name="Shape 69"/>
         <p:cNvGrpSpPr/>
         <p:nvPr/>
       </p:nvGrpSpPr>
@@ -6304,9 +6549,11 @@
       <p:sp>
         <p:nvSpPr>
           <p:cNvPr id="70" name="Shape 70"/>
-          <p:cNvSpPr txBox="1"/>
+          <p:cNvSpPr txBox="1">
+            <a:spLocks noGrp="1"/>
+          </p:cNvSpPr>
           <p:nvPr>
-            <p:ph idx="1" type="body"/>
+            <p:ph type="body" idx="1"/>
           </p:nvPr>
         </p:nvSpPr>
         <p:spPr>
@@ -6323,7 +6570,7 @@
           </a:ln>
         </p:spPr>
         <p:txBody>
-          <a:bodyPr anchorCtr="0" anchor="ctr" bIns="91425" lIns="91425" rIns="91425" tIns="91425">
+          <a:bodyPr lIns="91425" tIns="91425" rIns="91425" bIns="91425" anchor="ctr" anchorCtr="0">
             <a:noAutofit/>
           </a:bodyPr>
           <a:lstStyle/>
@@ -6335,7 +6582,7 @@
               <a:buNone/>
             </a:pPr>
             <a:r>
-              <a:rPr lang="en" sz="2000">
+              <a:rPr lang="en" sz="2000" dirty="0">
                 <a:solidFill>
                   <a:srgbClr val="E0C391"/>
                 </a:solidFill>
@@ -6350,10 +6597,7 @@
               </a:spcBef>
               <a:buNone/>
             </a:pPr>
-            <a:r>
-              <a:t/>
-            </a:r>
-            <a:endParaRPr sz="2000">
+            <a:endParaRPr sz="2000" dirty="0">
               <a:solidFill>
                 <a:srgbClr val="E0C391"/>
               </a:solidFill>
@@ -6367,44 +6611,12 @@
               <a:buNone/>
             </a:pPr>
             <a:r>
-              <a:rPr lang="en" sz="2000">
+              <a:rPr lang="en" sz="2000" dirty="0">
                 <a:solidFill>
                   <a:srgbClr val="E0C391"/>
                 </a:solidFill>
               </a:rPr>
               <a:t>Show off the work of local artists</a:t>
-            </a:r>
-          </a:p>
-          <a:p>
-            <a:pPr lvl="0" rtl="0">
-              <a:spcBef>
-                <a:spcPts val="0"/>
-              </a:spcBef>
-              <a:buNone/>
-            </a:pPr>
-            <a:r>
-              <a:t/>
-            </a:r>
-            <a:endParaRPr sz="2000">
-              <a:solidFill>
-                <a:srgbClr val="E0C391"/>
-              </a:solidFill>
-            </a:endParaRPr>
-          </a:p>
-          <a:p>
-            <a:pPr lvl="0" rtl="0">
-              <a:spcBef>
-                <a:spcPts val="0"/>
-              </a:spcBef>
-              <a:buNone/>
-            </a:pPr>
-            <a:r>
-              <a:rPr lang="en" sz="2000">
-                <a:solidFill>
-                  <a:srgbClr val="E0C391"/>
-                </a:solidFill>
-              </a:rPr>
-              <a:t>Get into co-op</a:t>
             </a:r>
           </a:p>
         </p:txBody>
@@ -6412,9 +6624,11 @@
       <p:sp>
         <p:nvSpPr>
           <p:cNvPr id="71" name="Shape 71"/>
-          <p:cNvSpPr txBox="1"/>
+          <p:cNvSpPr txBox="1">
+            <a:spLocks noGrp="1"/>
+          </p:cNvSpPr>
           <p:nvPr>
-            <p:ph idx="2" type="body"/>
+            <p:ph type="body" idx="2"/>
           </p:nvPr>
         </p:nvSpPr>
         <p:spPr>
@@ -6431,7 +6645,7 @@
           </a:ln>
         </p:spPr>
         <p:txBody>
-          <a:bodyPr anchorCtr="0" anchor="ctr" bIns="91425" lIns="91425" rIns="91425" tIns="91425">
+          <a:bodyPr lIns="91425" tIns="91425" rIns="91425" bIns="91425" anchor="ctr" anchorCtr="0">
             <a:noAutofit/>
           </a:bodyPr>
           <a:lstStyle/>
@@ -6448,7 +6662,7 @@
               <a:buNone/>
             </a:pPr>
             <a:r>
-              <a:rPr lang="en" sz="2000">
+              <a:rPr lang="en" sz="2000" dirty="0">
                 <a:solidFill>
                   <a:srgbClr val="E0C391"/>
                 </a:solidFill>
@@ -6467,10 +6681,7 @@
               <a:buFont typeface="Arial"/>
               <a:buNone/>
             </a:pPr>
-            <a:r>
-              <a:t/>
-            </a:r>
-            <a:endParaRPr sz="2000">
+            <a:endParaRPr sz="2000" dirty="0">
               <a:solidFill>
                 <a:srgbClr val="E0C391"/>
               </a:solidFill>
@@ -6489,7 +6700,7 @@
               <a:buNone/>
             </a:pPr>
             <a:r>
-              <a:rPr lang="en" sz="2000">
+              <a:rPr lang="en" sz="2000" dirty="0">
                 <a:solidFill>
                   <a:srgbClr val="E0C391"/>
                 </a:solidFill>
@@ -6508,35 +6719,11 @@
               <a:buFont typeface="Arial"/>
               <a:buNone/>
             </a:pPr>
-            <a:r>
-              <a:t/>
-            </a:r>
-            <a:endParaRPr sz="2000">
+            <a:endParaRPr sz="2000" dirty="0">
               <a:solidFill>
                 <a:srgbClr val="E0C391"/>
               </a:solidFill>
             </a:endParaRPr>
-          </a:p>
-          <a:p>
-            <a:pPr lvl="0">
-              <a:spcBef>
-                <a:spcPts val="0"/>
-              </a:spcBef>
-              <a:buClr>
-                <a:schemeClr val="dk1"/>
-              </a:buClr>
-              <a:buSzPct val="55000"/>
-              <a:buFont typeface="Arial"/>
-              <a:buNone/>
-            </a:pPr>
-            <a:r>
-              <a:rPr lang="en" sz="2000">
-                <a:solidFill>
-                  <a:srgbClr val="E0C391"/>
-                </a:solidFill>
-              </a:rPr>
-              <a:t>Showcase artists’ work with an online gallery</a:t>
-            </a:r>
           </a:p>
         </p:txBody>
       </p:sp>
@@ -6555,14 +6742,14 @@
             <a:avLst/>
           </a:prstGeom>
           <a:noFill/>
-          <a:ln cap="flat" cmpd="sng" w="9525">
+          <a:ln w="9525" cap="flat" cmpd="sng">
             <a:solidFill>
               <a:schemeClr val="lt1"/>
             </a:solidFill>
             <a:prstDash val="solid"/>
             <a:round/>
-            <a:headEnd len="lg" w="lg" type="none"/>
-            <a:tailEnd len="lg" w="lg" type="none"/>
+            <a:headEnd type="none" w="lg" len="lg"/>
+            <a:tailEnd type="none" w="lg" len="lg"/>
           </a:ln>
         </p:spPr>
       </p:cxnSp>
@@ -6578,7 +6765,7 @@
 </file>
 
 <file path=ppt/slides/slide4.xml><?xml version="1.0" encoding="utf-8"?>
-<p:sld xmlns:a="http://schemas.openxmlformats.org/drawingml/2006/main" xmlns:r="http://schemas.openxmlformats.org/officeDocument/2006/relationships" xmlns:mc="http://schemas.openxmlformats.org/markup-compatibility/2006" xmlns:mv="urn:schemas-microsoft-com:mac:vml" xmlns:p="http://schemas.openxmlformats.org/presentationml/2006/main" xmlns:c="http://schemas.openxmlformats.org/drawingml/2006/chart" xmlns:dgm="http://schemas.openxmlformats.org/drawingml/2006/diagram" xmlns:o="urn:schemas-microsoft-com:office:office" xmlns:v="urn:schemas-microsoft-com:vml" xmlns:pvml="urn:schemas-microsoft-com:office:powerpoint" xmlns:com="http://schemas.openxmlformats.org/drawingml/2006/compatibility" xmlns:p14="http://schemas.microsoft.com/office/powerpoint/2010/main">
+<p:sld xmlns:a="http://schemas.openxmlformats.org/drawingml/2006/main" xmlns:r="http://schemas.openxmlformats.org/officeDocument/2006/relationships" xmlns:p="http://schemas.openxmlformats.org/presentationml/2006/main">
   <p:cSld>
     <p:bg>
       <p:bgPr>
@@ -6590,11 +6777,12 @@
             <a:fillRect/>
           </a:stretch>
         </a:blipFill>
+        <a:effectLst/>
       </p:bgPr>
     </p:bg>
     <p:spTree>
       <p:nvGrpSpPr>
-        <p:cNvPr id="76" name="Shape 76"/>
+        <p:cNvPr id="1" name="Shape 76"/>
         <p:cNvGrpSpPr/>
         <p:nvPr/>
       </p:nvGrpSpPr>
@@ -6609,7 +6797,9 @@
       <p:sp>
         <p:nvSpPr>
           <p:cNvPr id="77" name="Shape 77"/>
-          <p:cNvSpPr txBox="1"/>
+          <p:cNvSpPr txBox="1">
+            <a:spLocks noGrp="1"/>
+          </p:cNvSpPr>
           <p:nvPr>
             <p:ph type="title"/>
           </p:nvPr>
@@ -6624,7 +6814,7 @@
           </a:prstGeom>
         </p:spPr>
         <p:txBody>
-          <a:bodyPr anchorCtr="0" anchor="b" bIns="91425" lIns="91425" rIns="91425" tIns="91425">
+          <a:bodyPr lIns="91425" tIns="91425" rIns="91425" bIns="91425" anchor="b" anchorCtr="0">
             <a:noAutofit/>
           </a:bodyPr>
           <a:lstStyle/>
@@ -6654,18 +6844,19 @@
 </file>
 
 <file path=ppt/slides/slide5.xml><?xml version="1.0" encoding="utf-8"?>
-<p:sld xmlns:a="http://schemas.openxmlformats.org/drawingml/2006/main" xmlns:r="http://schemas.openxmlformats.org/officeDocument/2006/relationships" xmlns:mc="http://schemas.openxmlformats.org/markup-compatibility/2006" xmlns:mv="urn:schemas-microsoft-com:mac:vml" xmlns:p="http://schemas.openxmlformats.org/presentationml/2006/main" xmlns:c="http://schemas.openxmlformats.org/drawingml/2006/chart" xmlns:dgm="http://schemas.openxmlformats.org/drawingml/2006/diagram" xmlns:o="urn:schemas-microsoft-com:office:office" xmlns:v="urn:schemas-microsoft-com:vml" xmlns:pvml="urn:schemas-microsoft-com:office:powerpoint" xmlns:com="http://schemas.openxmlformats.org/drawingml/2006/compatibility" xmlns:p14="http://schemas.microsoft.com/office/powerpoint/2010/main">
+<p:sld xmlns:a="http://schemas.openxmlformats.org/drawingml/2006/main" xmlns:r="http://schemas.openxmlformats.org/officeDocument/2006/relationships" xmlns:p="http://schemas.openxmlformats.org/presentationml/2006/main">
   <p:cSld>
     <p:bg>
       <p:bgPr>
         <a:solidFill>
           <a:srgbClr val="FFFFFF"/>
         </a:solidFill>
+        <a:effectLst/>
       </p:bgPr>
     </p:bg>
     <p:spTree>
       <p:nvGrpSpPr>
-        <p:cNvPr id="81" name="Shape 81"/>
+        <p:cNvPr id="1" name="Shape 81"/>
         <p:cNvGrpSpPr/>
         <p:nvPr/>
       </p:nvGrpSpPr>
@@ -6717,18 +6908,19 @@
 </file>
 
 <file path=ppt/slides/slide6.xml><?xml version="1.0" encoding="utf-8"?>
-<p:sld xmlns:a="http://schemas.openxmlformats.org/drawingml/2006/main" xmlns:r="http://schemas.openxmlformats.org/officeDocument/2006/relationships" xmlns:mc="http://schemas.openxmlformats.org/markup-compatibility/2006" xmlns:mv="urn:schemas-microsoft-com:mac:vml" xmlns:p="http://schemas.openxmlformats.org/presentationml/2006/main" xmlns:c="http://schemas.openxmlformats.org/drawingml/2006/chart" xmlns:dgm="http://schemas.openxmlformats.org/drawingml/2006/diagram" xmlns:o="urn:schemas-microsoft-com:office:office" xmlns:v="urn:schemas-microsoft-com:vml" xmlns:pvml="urn:schemas-microsoft-com:office:powerpoint" xmlns:com="http://schemas.openxmlformats.org/drawingml/2006/compatibility" xmlns:p14="http://schemas.microsoft.com/office/powerpoint/2010/main">
+<p:sld xmlns:a="http://schemas.openxmlformats.org/drawingml/2006/main" xmlns:r="http://schemas.openxmlformats.org/officeDocument/2006/relationships" xmlns:p="http://schemas.openxmlformats.org/presentationml/2006/main">
   <p:cSld>
     <p:bg>
       <p:bgPr>
         <a:solidFill>
           <a:srgbClr val="FFFFFF"/>
         </a:solidFill>
+        <a:effectLst/>
       </p:bgPr>
     </p:bg>
     <p:spTree>
       <p:nvGrpSpPr>
-        <p:cNvPr id="86" name="Shape 86"/>
+        <p:cNvPr id="1" name="Shape 86"/>
         <p:cNvGrpSpPr/>
         <p:nvPr/>
       </p:nvGrpSpPr>
@@ -6780,7 +6972,7 @@
 </file>
 
 <file path=ppt/slides/slide7.xml><?xml version="1.0" encoding="utf-8"?>
-<p:sld xmlns:a="http://schemas.openxmlformats.org/drawingml/2006/main" xmlns:r="http://schemas.openxmlformats.org/officeDocument/2006/relationships" xmlns:mc="http://schemas.openxmlformats.org/markup-compatibility/2006" xmlns:mv="urn:schemas-microsoft-com:mac:vml" xmlns:p="http://schemas.openxmlformats.org/presentationml/2006/main" xmlns:c="http://schemas.openxmlformats.org/drawingml/2006/chart" xmlns:dgm="http://schemas.openxmlformats.org/drawingml/2006/diagram" xmlns:o="urn:schemas-microsoft-com:office:office" xmlns:v="urn:schemas-microsoft-com:vml" xmlns:pvml="urn:schemas-microsoft-com:office:powerpoint" xmlns:com="http://schemas.openxmlformats.org/drawingml/2006/compatibility" xmlns:p14="http://schemas.microsoft.com/office/powerpoint/2010/main">
+<p:sld xmlns:a="http://schemas.openxmlformats.org/drawingml/2006/main" xmlns:r="http://schemas.openxmlformats.org/officeDocument/2006/relationships" xmlns:p="http://schemas.openxmlformats.org/presentationml/2006/main">
   <p:cSld>
     <p:bg>
       <p:bgPr>
@@ -6792,11 +6984,12 @@
             <a:fillRect/>
           </a:stretch>
         </a:blipFill>
+        <a:effectLst/>
       </p:bgPr>
     </p:bg>
     <p:spTree>
       <p:nvGrpSpPr>
-        <p:cNvPr id="91" name="Shape 91"/>
+        <p:cNvPr id="1" name="Shape 91"/>
         <p:cNvGrpSpPr/>
         <p:nvPr/>
       </p:nvGrpSpPr>
@@ -6811,7 +7004,9 @@
       <p:sp>
         <p:nvSpPr>
           <p:cNvPr id="92" name="Shape 92"/>
-          <p:cNvSpPr txBox="1"/>
+          <p:cNvSpPr txBox="1">
+            <a:spLocks noGrp="1"/>
+          </p:cNvSpPr>
           <p:nvPr>
             <p:ph type="title"/>
           </p:nvPr>
@@ -6826,7 +7021,7 @@
           </a:prstGeom>
         </p:spPr>
         <p:txBody>
-          <a:bodyPr anchorCtr="0" anchor="t" bIns="91425" lIns="91425" rIns="91425" tIns="91425">
+          <a:bodyPr lIns="91425" tIns="91425" rIns="91425" bIns="91425" anchor="t" anchorCtr="0">
             <a:noAutofit/>
           </a:bodyPr>
           <a:lstStyle/>
@@ -6851,9 +7046,11 @@
       <p:sp>
         <p:nvSpPr>
           <p:cNvPr id="93" name="Shape 93"/>
-          <p:cNvSpPr txBox="1"/>
+          <p:cNvSpPr txBox="1">
+            <a:spLocks noGrp="1"/>
+          </p:cNvSpPr>
           <p:nvPr>
-            <p:ph idx="4294967295" type="body"/>
+            <p:ph type="body" idx="4294967295"/>
           </p:nvPr>
         </p:nvSpPr>
         <p:spPr>
@@ -6866,7 +7063,7 @@
           </a:prstGeom>
         </p:spPr>
         <p:txBody>
-          <a:bodyPr anchorCtr="0" anchor="t" bIns="91425" lIns="91425" rIns="91425" tIns="91425">
+          <a:bodyPr lIns="91425" tIns="91425" rIns="91425" bIns="91425" anchor="t" anchorCtr="0">
             <a:noAutofit/>
           </a:bodyPr>
           <a:lstStyle/>
@@ -6893,9 +7090,6 @@
               </a:spcBef>
               <a:buNone/>
             </a:pPr>
-            <a:r>
-              <a:t/>
-            </a:r>
             <a:endParaRPr sz="2200">
               <a:solidFill>
                 <a:srgbClr val="E0D8B4"/>
@@ -6925,9 +7119,6 @@
               </a:spcBef>
               <a:buNone/>
             </a:pPr>
-            <a:r>
-              <a:t/>
-            </a:r>
             <a:endParaRPr sz="2200">
               <a:solidFill>
                 <a:srgbClr val="E0D8B4"/>
@@ -6957,9 +7148,6 @@
               </a:spcBef>
               <a:buNone/>
             </a:pPr>
-            <a:r>
-              <a:t/>
-            </a:r>
             <a:endParaRPr sz="2200">
               <a:solidFill>
                 <a:srgbClr val="E0D8B4"/>
@@ -6980,7 +7168,7 @@
 </file>
 
 <file path=ppt/slides/slide8.xml><?xml version="1.0" encoding="utf-8"?>
-<p:sld xmlns:a="http://schemas.openxmlformats.org/drawingml/2006/main" xmlns:r="http://schemas.openxmlformats.org/officeDocument/2006/relationships" xmlns:mc="http://schemas.openxmlformats.org/markup-compatibility/2006" xmlns:mv="urn:schemas-microsoft-com:mac:vml" xmlns:p="http://schemas.openxmlformats.org/presentationml/2006/main" xmlns:c="http://schemas.openxmlformats.org/drawingml/2006/chart" xmlns:dgm="http://schemas.openxmlformats.org/drawingml/2006/diagram" xmlns:o="urn:schemas-microsoft-com:office:office" xmlns:v="urn:schemas-microsoft-com:vml" xmlns:pvml="urn:schemas-microsoft-com:office:powerpoint" xmlns:com="http://schemas.openxmlformats.org/drawingml/2006/compatibility" xmlns:p14="http://schemas.microsoft.com/office/powerpoint/2010/main">
+<p:sld xmlns:a="http://schemas.openxmlformats.org/drawingml/2006/main" xmlns:r="http://schemas.openxmlformats.org/officeDocument/2006/relationships" xmlns:p="http://schemas.openxmlformats.org/presentationml/2006/main">
   <p:cSld>
     <p:bg>
       <p:bgPr>
@@ -6992,11 +7180,12 @@
             <a:fillRect/>
           </a:stretch>
         </a:blipFill>
+        <a:effectLst/>
       </p:bgPr>
     </p:bg>
     <p:spTree>
       <p:nvGrpSpPr>
-        <p:cNvPr id="97" name="Shape 97"/>
+        <p:cNvPr id="1" name="Shape 97"/>
         <p:cNvGrpSpPr/>
         <p:nvPr/>
       </p:nvGrpSpPr>
@@ -7011,7 +7200,9 @@
       <p:sp>
         <p:nvSpPr>
           <p:cNvPr id="98" name="Shape 98"/>
-          <p:cNvSpPr txBox="1"/>
+          <p:cNvSpPr txBox="1">
+            <a:spLocks noGrp="1"/>
+          </p:cNvSpPr>
           <p:nvPr>
             <p:ph type="title"/>
           </p:nvPr>
@@ -7026,7 +7217,7 @@
           </a:prstGeom>
         </p:spPr>
         <p:txBody>
-          <a:bodyPr anchorCtr="0" anchor="t" bIns="91425" lIns="91425" rIns="91425" tIns="91425">
+          <a:bodyPr lIns="91425" tIns="91425" rIns="91425" bIns="91425" anchor="t" anchorCtr="0">
             <a:noAutofit/>
           </a:bodyPr>
           <a:lstStyle/>
@@ -7038,7 +7229,7 @@
               <a:buNone/>
             </a:pPr>
             <a:r>
-              <a:rPr lang="en" sz="3000">
+              <a:rPr lang="en" sz="3000" dirty="0">
                 <a:solidFill>
                   <a:srgbClr val="E0C391"/>
                 </a:solidFill>
@@ -7051,14 +7242,16 @@
       <p:sp>
         <p:nvSpPr>
           <p:cNvPr id="99" name="Shape 99"/>
-          <p:cNvSpPr txBox="1"/>
+          <p:cNvSpPr txBox="1">
+            <a:spLocks noGrp="1"/>
+          </p:cNvSpPr>
           <p:nvPr>
-            <p:ph idx="1" type="body"/>
+            <p:ph type="body" idx="1"/>
           </p:nvPr>
         </p:nvSpPr>
         <p:spPr>
           <a:xfrm>
-            <a:off x="5128481" y="1509475"/>
+            <a:off x="5128375" y="1073540"/>
             <a:ext cx="3493200" cy="3125100"/>
           </a:xfrm>
           <a:prstGeom prst="rect">
@@ -7066,7 +7259,7 @@
           </a:prstGeom>
         </p:spPr>
         <p:txBody>
-          <a:bodyPr anchorCtr="0" anchor="t" bIns="91425" lIns="91425" rIns="91425" tIns="91425">
+          <a:bodyPr lIns="91425" tIns="91425" rIns="91425" bIns="91425" anchor="t" anchorCtr="0">
             <a:noAutofit/>
           </a:bodyPr>
           <a:lstStyle/>
@@ -7078,7 +7271,7 @@
               <a:buNone/>
             </a:pPr>
             <a:r>
-              <a:rPr lang="en" sz="2200"/>
+              <a:rPr lang="en" sz="2200" dirty="0"/>
               <a:t>Flex box is amazing</a:t>
             </a:r>
           </a:p>
@@ -7089,10 +7282,7 @@
               </a:spcBef>
               <a:buNone/>
             </a:pPr>
-            <a:r>
-              <a:t/>
-            </a:r>
-            <a:endParaRPr sz="2200"/>
+            <a:endParaRPr sz="2200" dirty="0"/>
           </a:p>
           <a:p>
             <a:pPr lvl="0" rtl="0">
@@ -7102,7 +7292,7 @@
               <a:buNone/>
             </a:pPr>
             <a:r>
-              <a:rPr lang="en" sz="2200"/>
+              <a:rPr lang="en" sz="2200" dirty="0"/>
               <a:t>How to pick a good colour scheme</a:t>
             </a:r>
           </a:p>
@@ -7113,10 +7303,7 @@
               </a:spcBef>
               <a:buNone/>
             </a:pPr>
-            <a:r>
-              <a:t/>
-            </a:r>
-            <a:endParaRPr sz="2200"/>
+            <a:endParaRPr sz="2200" dirty="0"/>
           </a:p>
           <a:p>
             <a:pPr lvl="0" rtl="0">
@@ -7126,7 +7313,7 @@
               <a:buNone/>
             </a:pPr>
             <a:r>
-              <a:rPr lang="en" sz="2200"/>
+              <a:rPr lang="en" sz="2200" dirty="0"/>
               <a:t>How to make a fluid and responsive design</a:t>
             </a:r>
           </a:p>
@@ -7137,10 +7324,7 @@
               </a:spcBef>
               <a:buNone/>
             </a:pPr>
-            <a:r>
-              <a:t/>
-            </a:r>
-            <a:endParaRPr sz="2200"/>
+            <a:endParaRPr sz="2200" dirty="0"/>
           </a:p>
           <a:p>
             <a:pPr lvl="0" rtl="0">
@@ -7150,9 +7334,10 @@
               <a:buNone/>
             </a:pPr>
             <a:r>
-              <a:t/>
+              <a:rPr lang="en-CA" sz="2200" dirty="0"/>
+              <a:t>We should have finalized website structure before working on other pages</a:t>
             </a:r>
-            <a:endParaRPr sz="2200"/>
+            <a:endParaRPr sz="2200" dirty="0"/>
           </a:p>
           <a:p>
             <a:pPr lvl="0">
@@ -7161,10 +7346,7 @@
               </a:spcBef>
               <a:buNone/>
             </a:pPr>
-            <a:r>
-              <a:t/>
-            </a:r>
-            <a:endParaRPr sz="2200"/>
+            <a:endParaRPr sz="2200" dirty="0"/>
           </a:p>
         </p:txBody>
       </p:sp>
@@ -7180,7 +7362,7 @@
 </file>
 
 <file path=ppt/slides/slide9.xml><?xml version="1.0" encoding="utf-8"?>
-<p:sld xmlns:a="http://schemas.openxmlformats.org/drawingml/2006/main" xmlns:r="http://schemas.openxmlformats.org/officeDocument/2006/relationships" xmlns:mc="http://schemas.openxmlformats.org/markup-compatibility/2006" xmlns:mv="urn:schemas-microsoft-com:mac:vml" xmlns:p="http://schemas.openxmlformats.org/presentationml/2006/main" xmlns:c="http://schemas.openxmlformats.org/drawingml/2006/chart" xmlns:dgm="http://schemas.openxmlformats.org/drawingml/2006/diagram" xmlns:o="urn:schemas-microsoft-com:office:office" xmlns:v="urn:schemas-microsoft-com:vml" xmlns:pvml="urn:schemas-microsoft-com:office:powerpoint" xmlns:com="http://schemas.openxmlformats.org/drawingml/2006/compatibility" xmlns:p14="http://schemas.microsoft.com/office/powerpoint/2010/main">
+<p:sld xmlns:a="http://schemas.openxmlformats.org/drawingml/2006/main" xmlns:r="http://schemas.openxmlformats.org/officeDocument/2006/relationships" xmlns:p="http://schemas.openxmlformats.org/presentationml/2006/main">
   <p:cSld>
     <p:bg>
       <p:bgPr>
@@ -7192,11 +7374,12 @@
             <a:fillRect/>
           </a:stretch>
         </a:blipFill>
+        <a:effectLst/>
       </p:bgPr>
     </p:bg>
     <p:spTree>
       <p:nvGrpSpPr>
-        <p:cNvPr id="103" name="Shape 103"/>
+        <p:cNvPr id="1" name="Shape 103"/>
         <p:cNvGrpSpPr/>
         <p:nvPr/>
       </p:nvGrpSpPr>
@@ -7211,9 +7394,11 @@
       <p:sp>
         <p:nvSpPr>
           <p:cNvPr id="104" name="Shape 104"/>
-          <p:cNvSpPr txBox="1"/>
+          <p:cNvSpPr txBox="1">
+            <a:spLocks noGrp="1"/>
+          </p:cNvSpPr>
           <p:nvPr>
-            <p:ph idx="1" type="body"/>
+            <p:ph type="body" idx="1"/>
           </p:nvPr>
         </p:nvSpPr>
         <p:spPr>
@@ -7226,7 +7411,7 @@
           </a:prstGeom>
         </p:spPr>
         <p:txBody>
-          <a:bodyPr anchorCtr="0" anchor="ctr" bIns="91425" lIns="91425" rIns="91425" tIns="91425">
+          <a:bodyPr lIns="91425" tIns="91425" rIns="91425" bIns="91425" anchor="ctr" anchorCtr="0">
             <a:noAutofit/>
           </a:bodyPr>
           <a:lstStyle/>
@@ -7238,7 +7423,9 @@
               <a:buNone/>
             </a:pPr>
             <a:r>
-              <a:rPr i="0" lang="en" sz="2600"/>
+              <a:rPr lang="en" sz="2600" i="0" dirty="0">
+                <a:latin typeface="Muli" panose="020B0604020202020204" charset="0"/>
+              </a:rPr>
               <a:t>Demonstration of our site</a:t>
             </a:r>
           </a:p>
@@ -7256,7 +7443,7 @@
 </file>
 
 <file path=ppt/theme/theme1.xml><?xml version="1.0" encoding="utf-8"?>
-<a:theme xmlns:a="http://schemas.openxmlformats.org/drawingml/2006/main" xmlns:r="http://schemas.openxmlformats.org/officeDocument/2006/relationships" name="Banquo template">
+<a:theme xmlns:a="http://schemas.openxmlformats.org/drawingml/2006/main" name="Banquo template">
   <a:themeElements>
     <a:clrScheme name="Custom 347">
       <a:dk1>
@@ -7531,11 +7718,13 @@
       </a:bgFillStyleLst>
     </a:fmtScheme>
   </a:themeElements>
+  <a:objectDefaults/>
+  <a:extraClrSchemeLst/>
 </a:theme>
 </file>
 
 <file path=ppt/theme/theme2.xml><?xml version="1.0" encoding="utf-8"?>
-<a:theme xmlns:a="http://schemas.openxmlformats.org/drawingml/2006/main" xmlns:r="http://schemas.openxmlformats.org/officeDocument/2006/relationships" name="Custom Theme">
+<a:theme xmlns:a="http://schemas.openxmlformats.org/drawingml/2006/main" name="Custom Theme">
   <a:themeElements>
     <a:clrScheme name="Default">
       <a:dk1>
@@ -7810,5 +7999,7 @@
       </a:bgFillStyleLst>
     </a:fmtScheme>
   </a:themeElements>
+  <a:objectDefaults/>
+  <a:extraClrSchemeLst/>
 </a:theme>
 </file>
</xml_diff>